<commit_message>
updates through out labs
</commit_message>
<xml_diff>
--- a/labs/Introduction-To-Eagle/Introduction-To-Eagle.pptx
+++ b/labs/Introduction-To-Eagle/Introduction-To-Eagle.pptx
@@ -16,23 +16,24 @@
     <p:sldId id="300" r:id="rId10"/>
     <p:sldId id="320" r:id="rId11"/>
     <p:sldId id="302" r:id="rId12"/>
-    <p:sldId id="307" r:id="rId13"/>
-    <p:sldId id="263" r:id="rId14"/>
-    <p:sldId id="316" r:id="rId15"/>
-    <p:sldId id="314" r:id="rId16"/>
-    <p:sldId id="315" r:id="rId17"/>
-    <p:sldId id="317" r:id="rId18"/>
-    <p:sldId id="257" r:id="rId19"/>
-    <p:sldId id="318" r:id="rId20"/>
-    <p:sldId id="258" r:id="rId21"/>
-    <p:sldId id="279" r:id="rId22"/>
-    <p:sldId id="319" r:id="rId23"/>
-    <p:sldId id="321" r:id="rId24"/>
-    <p:sldId id="305" r:id="rId25"/>
-    <p:sldId id="311" r:id="rId26"/>
-    <p:sldId id="313" r:id="rId27"/>
-    <p:sldId id="312" r:id="rId28"/>
-    <p:sldId id="303" r:id="rId29"/>
+    <p:sldId id="322" r:id="rId13"/>
+    <p:sldId id="307" r:id="rId14"/>
+    <p:sldId id="263" r:id="rId15"/>
+    <p:sldId id="316" r:id="rId16"/>
+    <p:sldId id="314" r:id="rId17"/>
+    <p:sldId id="315" r:id="rId18"/>
+    <p:sldId id="317" r:id="rId19"/>
+    <p:sldId id="257" r:id="rId20"/>
+    <p:sldId id="318" r:id="rId21"/>
+    <p:sldId id="258" r:id="rId22"/>
+    <p:sldId id="279" r:id="rId23"/>
+    <p:sldId id="319" r:id="rId24"/>
+    <p:sldId id="321" r:id="rId25"/>
+    <p:sldId id="305" r:id="rId26"/>
+    <p:sldId id="311" r:id="rId27"/>
+    <p:sldId id="313" r:id="rId28"/>
+    <p:sldId id="312" r:id="rId29"/>
+    <p:sldId id="303" r:id="rId30"/>
   </p:sldIdLst>
   <p:sldSz cx="12192000" cy="6858000"/>
   <p:notesSz cx="6858000" cy="9144000"/>
@@ -131,6 +132,11 @@
       </a:defRPr>
     </a:lvl9pPr>
   </p:defaultTextStyle>
+  <p:extLst>
+    <p:ext uri="{EFAFB233-063F-42B5-8137-9DF3F51BA10A}">
+      <p15:sldGuideLst xmlns:p15="http://schemas.microsoft.com/office/powerpoint/2012/main"/>
+    </p:ext>
+  </p:extLst>
 </p:presentation>
 </file>
 
@@ -281,7 +287,7 @@
           <a:p>
             <a:fld id="{FBBF1B98-3234-894E-85B9-1C10C007841A}" type="datetimeFigureOut">
               <a:rPr lang="en-US" smtClean="0"/>
-              <a:t>3/2/19</a:t>
+              <a:t>3/16/19</a:t>
             </a:fld>
             <a:endParaRPr lang="en-US"/>
           </a:p>
@@ -479,7 +485,7 @@
           <a:p>
             <a:fld id="{FBBF1B98-3234-894E-85B9-1C10C007841A}" type="datetimeFigureOut">
               <a:rPr lang="en-US" smtClean="0"/>
-              <a:t>3/2/19</a:t>
+              <a:t>3/16/19</a:t>
             </a:fld>
             <a:endParaRPr lang="en-US"/>
           </a:p>
@@ -687,7 +693,7 @@
           <a:p>
             <a:fld id="{FBBF1B98-3234-894E-85B9-1C10C007841A}" type="datetimeFigureOut">
               <a:rPr lang="en-US" smtClean="0"/>
-              <a:t>3/2/19</a:t>
+              <a:t>3/16/19</a:t>
             </a:fld>
             <a:endParaRPr lang="en-US"/>
           </a:p>
@@ -885,7 +891,7 @@
           <a:p>
             <a:fld id="{FBBF1B98-3234-894E-85B9-1C10C007841A}" type="datetimeFigureOut">
               <a:rPr lang="en-US" smtClean="0"/>
-              <a:t>3/2/19</a:t>
+              <a:t>3/16/19</a:t>
             </a:fld>
             <a:endParaRPr lang="en-US"/>
           </a:p>
@@ -1160,7 +1166,7 @@
           <a:p>
             <a:fld id="{FBBF1B98-3234-894E-85B9-1C10C007841A}" type="datetimeFigureOut">
               <a:rPr lang="en-US" smtClean="0"/>
-              <a:t>3/2/19</a:t>
+              <a:t>3/16/19</a:t>
             </a:fld>
             <a:endParaRPr lang="en-US"/>
           </a:p>
@@ -1425,7 +1431,7 @@
           <a:p>
             <a:fld id="{FBBF1B98-3234-894E-85B9-1C10C007841A}" type="datetimeFigureOut">
               <a:rPr lang="en-US" smtClean="0"/>
-              <a:t>3/2/19</a:t>
+              <a:t>3/16/19</a:t>
             </a:fld>
             <a:endParaRPr lang="en-US"/>
           </a:p>
@@ -1837,7 +1843,7 @@
           <a:p>
             <a:fld id="{FBBF1B98-3234-894E-85B9-1C10C007841A}" type="datetimeFigureOut">
               <a:rPr lang="en-US" smtClean="0"/>
-              <a:t>3/2/19</a:t>
+              <a:t>3/16/19</a:t>
             </a:fld>
             <a:endParaRPr lang="en-US"/>
           </a:p>
@@ -1978,7 +1984,7 @@
           <a:p>
             <a:fld id="{FBBF1B98-3234-894E-85B9-1C10C007841A}" type="datetimeFigureOut">
               <a:rPr lang="en-US" smtClean="0"/>
-              <a:t>3/2/19</a:t>
+              <a:t>3/16/19</a:t>
             </a:fld>
             <a:endParaRPr lang="en-US"/>
           </a:p>
@@ -2091,7 +2097,7 @@
           <a:p>
             <a:fld id="{FBBF1B98-3234-894E-85B9-1C10C007841A}" type="datetimeFigureOut">
               <a:rPr lang="en-US" smtClean="0"/>
-              <a:t>3/2/19</a:t>
+              <a:t>3/16/19</a:t>
             </a:fld>
             <a:endParaRPr lang="en-US"/>
           </a:p>
@@ -2402,7 +2408,7 @@
           <a:p>
             <a:fld id="{FBBF1B98-3234-894E-85B9-1C10C007841A}" type="datetimeFigureOut">
               <a:rPr lang="en-US" smtClean="0"/>
-              <a:t>3/2/19</a:t>
+              <a:t>3/16/19</a:t>
             </a:fld>
             <a:endParaRPr lang="en-US"/>
           </a:p>
@@ -2690,7 +2696,7 @@
           <a:p>
             <a:fld id="{FBBF1B98-3234-894E-85B9-1C10C007841A}" type="datetimeFigureOut">
               <a:rPr lang="en-US" smtClean="0"/>
-              <a:t>3/2/19</a:t>
+              <a:t>3/16/19</a:t>
             </a:fld>
             <a:endParaRPr lang="en-US"/>
           </a:p>
@@ -2931,7 +2937,7 @@
           <a:p>
             <a:fld id="{FBBF1B98-3234-894E-85B9-1C10C007841A}" type="datetimeFigureOut">
               <a:rPr lang="en-US" smtClean="0"/>
-              <a:t>3/2/19</a:t>
+              <a:t>3/16/19</a:t>
             </a:fld>
             <a:endParaRPr lang="en-US"/>
           </a:p>
@@ -3404,6 +3410,36 @@
           </a:p>
         </p:txBody>
       </p:sp>
+      <p:pic>
+        <p:nvPicPr>
+          <p:cNvPr id="4" name="Content Placeholder 5">
+            <a:extLst>
+              <a:ext uri="{FF2B5EF4-FFF2-40B4-BE49-F238E27FC236}">
+                <a16:creationId xmlns:a16="http://schemas.microsoft.com/office/drawing/2014/main" id="{34535614-48CC-A74F-9802-748ADF73049E}"/>
+              </a:ext>
+            </a:extLst>
+          </p:cNvPr>
+          <p:cNvPicPr>
+            <a:picLocks noChangeAspect="1"/>
+          </p:cNvPicPr>
+          <p:nvPr/>
+        </p:nvPicPr>
+        <p:blipFill>
+          <a:blip r:embed="rId2"/>
+          <a:stretch>
+            <a:fillRect/>
+          </a:stretch>
+        </p:blipFill>
+        <p:spPr>
+          <a:xfrm>
+            <a:off x="5039538" y="4429919"/>
+            <a:ext cx="2112923" cy="2124727"/>
+          </a:xfrm>
+          <a:prstGeom prst="rect">
+            <a:avLst/>
+          </a:prstGeom>
+        </p:spPr>
+      </p:pic>
     </p:spTree>
     <p:extLst>
       <p:ext uri="{BB962C8B-B14F-4D97-AF65-F5344CB8AC3E}">
@@ -3664,7 +3700,7 @@
             <a:pPr lvl="1"/>
             <a:r>
               <a:rPr lang="en-US" dirty="0"/>
-              <a:t>2 or 4 layers</a:t>
+              <a:t>2, 4, or 6 layers</a:t>
             </a:r>
           </a:p>
           <a:p>
@@ -3708,6 +3744,89 @@
       </p:grpSpPr>
       <p:sp>
         <p:nvSpPr>
+          <p:cNvPr id="4" name="Title 3">
+            <a:extLst>
+              <a:ext uri="{FF2B5EF4-FFF2-40B4-BE49-F238E27FC236}">
+                <a16:creationId xmlns:a16="http://schemas.microsoft.com/office/drawing/2014/main" id="{17B053CF-C318-F542-A829-810AB91C9C58}"/>
+              </a:ext>
+            </a:extLst>
+          </p:cNvPr>
+          <p:cNvSpPr>
+            <a:spLocks noGrp="1"/>
+          </p:cNvSpPr>
+          <p:nvPr>
+            <p:ph type="title"/>
+          </p:nvPr>
+        </p:nvSpPr>
+        <p:spPr/>
+        <p:txBody>
+          <a:bodyPr/>
+          <a:lstStyle/>
+          <a:p>
+            <a:r>
+              <a:rPr lang="en-US" dirty="0"/>
+              <a:t>Designing PCBs</a:t>
+            </a:r>
+          </a:p>
+        </p:txBody>
+      </p:sp>
+      <p:sp>
+        <p:nvSpPr>
+          <p:cNvPr id="5" name="Text Placeholder 4">
+            <a:extLst>
+              <a:ext uri="{FF2B5EF4-FFF2-40B4-BE49-F238E27FC236}">
+                <a16:creationId xmlns:a16="http://schemas.microsoft.com/office/drawing/2014/main" id="{9E6F1304-744F-F445-8F16-C43BCF5A8D11}"/>
+              </a:ext>
+            </a:extLst>
+          </p:cNvPr>
+          <p:cNvSpPr>
+            <a:spLocks noGrp="1"/>
+          </p:cNvSpPr>
+          <p:nvPr>
+            <p:ph type="body" idx="1"/>
+          </p:nvPr>
+        </p:nvSpPr>
+        <p:spPr/>
+        <p:txBody>
+          <a:bodyPr/>
+          <a:lstStyle/>
+          <a:p>
+            <a:endParaRPr lang="en-US"/>
+          </a:p>
+        </p:txBody>
+      </p:sp>
+    </p:spTree>
+    <p:extLst>
+      <p:ext uri="{BB962C8B-B14F-4D97-AF65-F5344CB8AC3E}">
+        <p14:creationId xmlns:p14="http://schemas.microsoft.com/office/powerpoint/2010/main" val="1804395044"/>
+      </p:ext>
+    </p:extLst>
+  </p:cSld>
+  <p:clrMapOvr>
+    <a:masterClrMapping/>
+  </p:clrMapOvr>
+</p:sld>
+</file>
+
+<file path=ppt/slides/slide13.xml><?xml version="1.0" encoding="utf-8"?>
+<p:sld xmlns:a="http://schemas.openxmlformats.org/drawingml/2006/main" xmlns:r="http://schemas.openxmlformats.org/officeDocument/2006/relationships" xmlns:p="http://schemas.openxmlformats.org/presentationml/2006/main">
+  <p:cSld>
+    <p:spTree>
+      <p:nvGrpSpPr>
+        <p:cNvPr id="1" name=""/>
+        <p:cNvGrpSpPr/>
+        <p:nvPr/>
+      </p:nvGrpSpPr>
+      <p:grpSpPr>
+        <a:xfrm>
+          <a:off x="0" y="0"/>
+          <a:ext cx="0" cy="0"/>
+          <a:chOff x="0" y="0"/>
+          <a:chExt cx="0" cy="0"/>
+        </a:xfrm>
+      </p:grpSpPr>
+      <p:sp>
+        <p:nvSpPr>
           <p:cNvPr id="2" name="Title 1"/>
           <p:cNvSpPr>
             <a:spLocks noGrp="1"/>
@@ -3799,7 +3918,7 @@
 </p:sld>
 </file>
 
-<file path=ppt/slides/slide13.xml><?xml version="1.0" encoding="utf-8"?>
+<file path=ppt/slides/slide14.xml><?xml version="1.0" encoding="utf-8"?>
 <p:sld xmlns:a="http://schemas.openxmlformats.org/drawingml/2006/main" xmlns:r="http://schemas.openxmlformats.org/officeDocument/2006/relationships" xmlns:p="http://schemas.openxmlformats.org/presentationml/2006/main">
   <p:cSld>
     <p:spTree>
@@ -4199,7 +4318,7 @@
 </p:sld>
 </file>
 
-<file path=ppt/slides/slide14.xml><?xml version="1.0" encoding="utf-8"?>
+<file path=ppt/slides/slide15.xml><?xml version="1.0" encoding="utf-8"?>
 <p:sld xmlns:a="http://schemas.openxmlformats.org/drawingml/2006/main" xmlns:r="http://schemas.openxmlformats.org/officeDocument/2006/relationships" xmlns:p="http://schemas.openxmlformats.org/presentationml/2006/main" show="0">
   <p:cSld>
     <p:spTree>
@@ -5015,7 +5134,7 @@
 </p:sld>
 </file>
 
-<file path=ppt/slides/slide15.xml><?xml version="1.0" encoding="utf-8"?>
+<file path=ppt/slides/slide16.xml><?xml version="1.0" encoding="utf-8"?>
 <p:sld xmlns:a="http://schemas.openxmlformats.org/drawingml/2006/main" xmlns:r="http://schemas.openxmlformats.org/officeDocument/2006/relationships" xmlns:p="http://schemas.openxmlformats.org/presentationml/2006/main">
   <p:cSld>
     <p:spTree>
@@ -5128,7 +5247,7 @@
 </p:sld>
 </file>
 
-<file path=ppt/slides/slide16.xml><?xml version="1.0" encoding="utf-8"?>
+<file path=ppt/slides/slide17.xml><?xml version="1.0" encoding="utf-8"?>
 <p:sld xmlns:a="http://schemas.openxmlformats.org/drawingml/2006/main" xmlns:r="http://schemas.openxmlformats.org/officeDocument/2006/relationships" xmlns:p="http://schemas.openxmlformats.org/presentationml/2006/main">
   <p:cSld>
     <p:spTree>
@@ -5218,7 +5337,7 @@
 </p:sld>
 </file>
 
-<file path=ppt/slides/slide17.xml><?xml version="1.0" encoding="utf-8"?>
+<file path=ppt/slides/slide18.xml><?xml version="1.0" encoding="utf-8"?>
 <p:sld xmlns:a="http://schemas.openxmlformats.org/drawingml/2006/main" xmlns:r="http://schemas.openxmlformats.org/officeDocument/2006/relationships" xmlns:p="http://schemas.openxmlformats.org/presentationml/2006/main">
   <p:cSld>
     <p:spTree>
@@ -5263,841 +5382,885 @@
           </a:p>
         </p:txBody>
       </p:sp>
-      <p:pic>
-        <p:nvPicPr>
-          <p:cNvPr id="4" name="Content Placeholder 3">
+      <p:sp>
+        <p:nvSpPr>
+          <p:cNvPr id="32" name="Content Placeholder 31">
             <a:extLst>
               <a:ext uri="{FF2B5EF4-FFF2-40B4-BE49-F238E27FC236}">
-                <a16:creationId xmlns:a16="http://schemas.microsoft.com/office/drawing/2014/main" id="{25C41EF2-FE5F-584D-B12C-54DADDE1FA26}"/>
+                <a16:creationId xmlns:a16="http://schemas.microsoft.com/office/drawing/2014/main" id="{1D9B473E-C37D-4B4E-89CF-0332774FE2D0}"/>
               </a:ext>
             </a:extLst>
           </p:cNvPr>
-          <p:cNvPicPr>
-            <a:picLocks noGrp="1" noChangeAspect="1"/>
-          </p:cNvPicPr>
+          <p:cNvSpPr>
+            <a:spLocks noGrp="1"/>
+          </p:cNvSpPr>
           <p:nvPr>
             <p:ph idx="1"/>
           </p:nvPr>
-        </p:nvPicPr>
-        <p:blipFill>
-          <a:blip r:embed="rId2"/>
-          <a:stretch>
-            <a:fillRect/>
-          </a:stretch>
-        </p:blipFill>
-        <p:spPr>
-          <a:xfrm>
-            <a:off x="1618035" y="1108030"/>
-            <a:ext cx="4078789" cy="5475332"/>
-          </a:xfrm>
-          <a:prstGeom prst="rect">
-            <a:avLst/>
-          </a:prstGeom>
-        </p:spPr>
-      </p:pic>
-      <p:pic>
-        <p:nvPicPr>
-          <p:cNvPr id="5" name="Picture 4">
+        </p:nvSpPr>
+        <p:spPr/>
+        <p:txBody>
+          <a:bodyPr/>
+          <a:lstStyle/>
+          <a:p>
+            <a:endParaRPr lang="en-US"/>
+          </a:p>
+        </p:txBody>
+      </p:sp>
+      <p:grpSp>
+        <p:nvGrpSpPr>
+          <p:cNvPr id="33" name="Group 32">
             <a:extLst>
               <a:ext uri="{FF2B5EF4-FFF2-40B4-BE49-F238E27FC236}">
-                <a16:creationId xmlns:a16="http://schemas.microsoft.com/office/drawing/2014/main" id="{A607058D-351A-8448-A659-61F0B57F86CA}"/>
+                <a16:creationId xmlns:a16="http://schemas.microsoft.com/office/drawing/2014/main" id="{1A92AEE0-19BA-E14C-A7BB-E96BEE16E91C}"/>
               </a:ext>
             </a:extLst>
           </p:cNvPr>
-          <p:cNvPicPr>
-            <a:picLocks noChangeAspect="1"/>
-          </p:cNvPicPr>
+          <p:cNvGrpSpPr/>
           <p:nvPr/>
-        </p:nvPicPr>
-        <p:blipFill rotWithShape="1">
-          <a:blip r:embed="rId3"/>
-          <a:srcRect r="29015"/>
-          <a:stretch/>
-        </p:blipFill>
-        <p:spPr>
+        </p:nvGrpSpPr>
+        <p:grpSpPr>
           <a:xfrm>
-            <a:off x="5810655" y="1336701"/>
-            <a:ext cx="5188086" cy="5327598"/>
+            <a:off x="2069546" y="1616392"/>
+            <a:ext cx="8052907" cy="4769803"/>
+            <a:chOff x="1618035" y="1108030"/>
+            <a:chExt cx="9380706" cy="5556269"/>
           </a:xfrm>
-          <a:prstGeom prst="rect">
-            <a:avLst/>
-          </a:prstGeom>
-        </p:spPr>
-      </p:pic>
-      <p:cxnSp>
-        <p:nvCxnSpPr>
-          <p:cNvPr id="6" name="Straight Connector 5">
-            <a:extLst>
-              <a:ext uri="{FF2B5EF4-FFF2-40B4-BE49-F238E27FC236}">
-                <a16:creationId xmlns:a16="http://schemas.microsoft.com/office/drawing/2014/main" id="{C7D2E15C-0647-4D47-88F9-7C0B9EC8CD3A}"/>
-              </a:ext>
-            </a:extLst>
-          </p:cNvPr>
-          <p:cNvCxnSpPr>
-            <a:cxnSpLocks/>
-          </p:cNvCxnSpPr>
-          <p:nvPr/>
-        </p:nvCxnSpPr>
-        <p:spPr>
-          <a:xfrm>
-            <a:off x="3472546" y="2551039"/>
-            <a:ext cx="5716279" cy="735423"/>
-          </a:xfrm>
-          <a:prstGeom prst="line">
-            <a:avLst/>
-          </a:prstGeom>
-          <a:ln>
-            <a:solidFill>
-              <a:srgbClr val="FF0000"/>
-            </a:solidFill>
-          </a:ln>
-        </p:spPr>
-        <p:style>
-          <a:lnRef idx="2">
-            <a:schemeClr val="accent1"/>
-          </a:lnRef>
-          <a:fillRef idx="0">
-            <a:schemeClr val="accent1"/>
-          </a:fillRef>
-          <a:effectRef idx="1">
-            <a:schemeClr val="accent1"/>
-          </a:effectRef>
-          <a:fontRef idx="minor">
-            <a:schemeClr val="tx1"/>
-          </a:fontRef>
-        </p:style>
-      </p:cxnSp>
-      <p:cxnSp>
-        <p:nvCxnSpPr>
-          <p:cNvPr id="8" name="Straight Connector 7">
-            <a:extLst>
-              <a:ext uri="{FF2B5EF4-FFF2-40B4-BE49-F238E27FC236}">
-                <a16:creationId xmlns:a16="http://schemas.microsoft.com/office/drawing/2014/main" id="{D0576B5F-6F56-FD4B-ACC3-2E1A202A981B}"/>
-              </a:ext>
-            </a:extLst>
-          </p:cNvPr>
-          <p:cNvCxnSpPr>
-            <a:cxnSpLocks/>
-          </p:cNvCxnSpPr>
-          <p:nvPr/>
-        </p:nvCxnSpPr>
-        <p:spPr>
-          <a:xfrm>
-            <a:off x="4116593" y="4238513"/>
-            <a:ext cx="3485478" cy="296572"/>
-          </a:xfrm>
-          <a:prstGeom prst="line">
-            <a:avLst/>
-          </a:prstGeom>
-          <a:ln>
-            <a:solidFill>
-              <a:srgbClr val="FF0000"/>
-            </a:solidFill>
-          </a:ln>
-        </p:spPr>
-        <p:style>
-          <a:lnRef idx="2">
-            <a:schemeClr val="accent1"/>
-          </a:lnRef>
-          <a:fillRef idx="0">
-            <a:schemeClr val="accent1"/>
-          </a:fillRef>
-          <a:effectRef idx="1">
-            <a:schemeClr val="accent1"/>
-          </a:effectRef>
-          <a:fontRef idx="minor">
-            <a:schemeClr val="tx1"/>
-          </a:fontRef>
-        </p:style>
-      </p:cxnSp>
-      <p:cxnSp>
-        <p:nvCxnSpPr>
-          <p:cNvPr id="11" name="Straight Connector 10">
-            <a:extLst>
-              <a:ext uri="{FF2B5EF4-FFF2-40B4-BE49-F238E27FC236}">
-                <a16:creationId xmlns:a16="http://schemas.microsoft.com/office/drawing/2014/main" id="{5F43C0CD-4BD5-6447-BAF6-80885BCEF14D}"/>
-              </a:ext>
-            </a:extLst>
-          </p:cNvPr>
-          <p:cNvCxnSpPr>
-            <a:cxnSpLocks/>
-          </p:cNvCxnSpPr>
-          <p:nvPr/>
-        </p:nvCxnSpPr>
-        <p:spPr>
-          <a:xfrm flipV="1">
-            <a:off x="4186518" y="3280441"/>
-            <a:ext cx="6481482" cy="2088037"/>
-          </a:xfrm>
-          <a:prstGeom prst="line">
-            <a:avLst/>
-          </a:prstGeom>
-          <a:ln>
-            <a:solidFill>
-              <a:srgbClr val="FF0000"/>
-            </a:solidFill>
-          </a:ln>
-        </p:spPr>
-        <p:style>
-          <a:lnRef idx="2">
-            <a:schemeClr val="accent1"/>
-          </a:lnRef>
-          <a:fillRef idx="0">
-            <a:schemeClr val="accent1"/>
-          </a:fillRef>
-          <a:effectRef idx="1">
-            <a:schemeClr val="accent1"/>
-          </a:effectRef>
-          <a:fontRef idx="minor">
-            <a:schemeClr val="tx1"/>
-          </a:fontRef>
-        </p:style>
-      </p:cxnSp>
-      <p:cxnSp>
-        <p:nvCxnSpPr>
-          <p:cNvPr id="14" name="Straight Connector 13">
-            <a:extLst>
-              <a:ext uri="{FF2B5EF4-FFF2-40B4-BE49-F238E27FC236}">
-                <a16:creationId xmlns:a16="http://schemas.microsoft.com/office/drawing/2014/main" id="{5FC6D6C6-246A-8D42-8D29-03A93643BA41}"/>
-              </a:ext>
-            </a:extLst>
-          </p:cNvPr>
-          <p:cNvCxnSpPr>
-            <a:cxnSpLocks/>
-          </p:cNvCxnSpPr>
-          <p:nvPr/>
-        </p:nvCxnSpPr>
-        <p:spPr>
-          <a:xfrm flipV="1">
-            <a:off x="4116594" y="3845696"/>
-            <a:ext cx="6196405" cy="1215778"/>
-          </a:xfrm>
-          <a:prstGeom prst="line">
-            <a:avLst/>
-          </a:prstGeom>
-          <a:ln>
-            <a:solidFill>
-              <a:srgbClr val="FF0000"/>
-            </a:solidFill>
-          </a:ln>
-        </p:spPr>
-        <p:style>
-          <a:lnRef idx="2">
-            <a:schemeClr val="accent1"/>
-          </a:lnRef>
-          <a:fillRef idx="0">
-            <a:schemeClr val="accent1"/>
-          </a:fillRef>
-          <a:effectRef idx="1">
-            <a:schemeClr val="accent1"/>
-          </a:effectRef>
-          <a:fontRef idx="minor">
-            <a:schemeClr val="tx1"/>
-          </a:fontRef>
-        </p:style>
-      </p:cxnSp>
-      <p:cxnSp>
-        <p:nvCxnSpPr>
-          <p:cNvPr id="17" name="Straight Connector 16">
-            <a:extLst>
-              <a:ext uri="{FF2B5EF4-FFF2-40B4-BE49-F238E27FC236}">
-                <a16:creationId xmlns:a16="http://schemas.microsoft.com/office/drawing/2014/main" id="{858755CB-C7E8-2841-9FB6-F16BE450F00E}"/>
-              </a:ext>
-            </a:extLst>
-          </p:cNvPr>
-          <p:cNvCxnSpPr>
-            <a:cxnSpLocks/>
-          </p:cNvCxnSpPr>
-          <p:nvPr/>
-        </p:nvCxnSpPr>
-        <p:spPr>
-          <a:xfrm flipV="1">
-            <a:off x="4525384" y="3845696"/>
-            <a:ext cx="5394960" cy="1258808"/>
-          </a:xfrm>
-          <a:prstGeom prst="line">
-            <a:avLst/>
-          </a:prstGeom>
-          <a:ln>
-            <a:solidFill>
-              <a:srgbClr val="FF0000"/>
-            </a:solidFill>
-          </a:ln>
-        </p:spPr>
-        <p:style>
-          <a:lnRef idx="2">
-            <a:schemeClr val="accent1"/>
-          </a:lnRef>
-          <a:fillRef idx="0">
-            <a:schemeClr val="accent1"/>
-          </a:fillRef>
-          <a:effectRef idx="1">
-            <a:schemeClr val="accent1"/>
-          </a:effectRef>
-          <a:fontRef idx="minor">
-            <a:schemeClr val="tx1"/>
-          </a:fontRef>
-        </p:style>
-      </p:cxnSp>
-      <p:cxnSp>
-        <p:nvCxnSpPr>
-          <p:cNvPr id="22" name="Straight Connector 21">
-            <a:extLst>
-              <a:ext uri="{FF2B5EF4-FFF2-40B4-BE49-F238E27FC236}">
-                <a16:creationId xmlns:a16="http://schemas.microsoft.com/office/drawing/2014/main" id="{93A1DFD3-AAA6-764C-B060-C6AC4E37A43D}"/>
-              </a:ext>
-            </a:extLst>
-          </p:cNvPr>
-          <p:cNvCxnSpPr>
-            <a:cxnSpLocks/>
-          </p:cNvCxnSpPr>
-          <p:nvPr/>
-        </p:nvCxnSpPr>
-        <p:spPr>
-          <a:xfrm flipV="1">
-            <a:off x="4288716" y="3646842"/>
-            <a:ext cx="6379285" cy="1740142"/>
-          </a:xfrm>
-          <a:prstGeom prst="line">
-            <a:avLst/>
-          </a:prstGeom>
-          <a:ln>
-            <a:solidFill>
-              <a:srgbClr val="FF0000"/>
-            </a:solidFill>
-          </a:ln>
-        </p:spPr>
-        <p:style>
-          <a:lnRef idx="2">
-            <a:schemeClr val="accent1"/>
-          </a:lnRef>
-          <a:fillRef idx="0">
-            <a:schemeClr val="accent1"/>
-          </a:fillRef>
-          <a:effectRef idx="1">
-            <a:schemeClr val="accent1"/>
-          </a:effectRef>
-          <a:fontRef idx="minor">
-            <a:schemeClr val="tx1"/>
-          </a:fontRef>
-        </p:style>
-      </p:cxnSp>
-      <p:cxnSp>
-        <p:nvCxnSpPr>
-          <p:cNvPr id="25" name="Straight Connector 24">
-            <a:extLst>
-              <a:ext uri="{FF2B5EF4-FFF2-40B4-BE49-F238E27FC236}">
-                <a16:creationId xmlns:a16="http://schemas.microsoft.com/office/drawing/2014/main" id="{8F169516-D33C-794C-9DAE-BB01C52DCE8B}"/>
-              </a:ext>
-            </a:extLst>
-          </p:cNvPr>
-          <p:cNvCxnSpPr>
-            <a:cxnSpLocks/>
-          </p:cNvCxnSpPr>
-          <p:nvPr/>
-        </p:nvCxnSpPr>
-        <p:spPr>
-          <a:xfrm>
-            <a:off x="4918038" y="4276166"/>
-            <a:ext cx="4953896" cy="546236"/>
-          </a:xfrm>
-          <a:prstGeom prst="line">
-            <a:avLst/>
-          </a:prstGeom>
-          <a:ln>
-            <a:solidFill>
-              <a:srgbClr val="FF0000"/>
-            </a:solidFill>
-          </a:ln>
-        </p:spPr>
-        <p:style>
-          <a:lnRef idx="2">
-            <a:schemeClr val="accent1"/>
-          </a:lnRef>
-          <a:fillRef idx="0">
-            <a:schemeClr val="accent1"/>
-          </a:fillRef>
-          <a:effectRef idx="1">
-            <a:schemeClr val="accent1"/>
-          </a:effectRef>
-          <a:fontRef idx="minor">
-            <a:schemeClr val="tx1"/>
-          </a:fontRef>
-        </p:style>
-      </p:cxnSp>
-      <p:cxnSp>
-        <p:nvCxnSpPr>
-          <p:cNvPr id="28" name="Straight Connector 27">
-            <a:extLst>
-              <a:ext uri="{FF2B5EF4-FFF2-40B4-BE49-F238E27FC236}">
-                <a16:creationId xmlns:a16="http://schemas.microsoft.com/office/drawing/2014/main" id="{4D2259E6-6205-8246-A69B-B884BB6DF2C3}"/>
-              </a:ext>
-            </a:extLst>
-          </p:cNvPr>
-          <p:cNvCxnSpPr>
-            <a:cxnSpLocks/>
-          </p:cNvCxnSpPr>
-          <p:nvPr/>
-        </p:nvCxnSpPr>
-        <p:spPr>
-          <a:xfrm>
-            <a:off x="3202194" y="4184726"/>
-            <a:ext cx="6158753" cy="418265"/>
-          </a:xfrm>
-          <a:prstGeom prst="line">
-            <a:avLst/>
-          </a:prstGeom>
-          <a:ln>
-            <a:solidFill>
-              <a:srgbClr val="FF0000"/>
-            </a:solidFill>
-          </a:ln>
-        </p:spPr>
-        <p:style>
-          <a:lnRef idx="2">
-            <a:schemeClr val="accent1"/>
-          </a:lnRef>
-          <a:fillRef idx="0">
-            <a:schemeClr val="accent1"/>
-          </a:fillRef>
-          <a:effectRef idx="1">
-            <a:schemeClr val="accent1"/>
-          </a:effectRef>
-          <a:fontRef idx="minor">
-            <a:schemeClr val="tx1"/>
-          </a:fontRef>
-        </p:style>
-      </p:cxnSp>
-      <p:cxnSp>
-        <p:nvCxnSpPr>
-          <p:cNvPr id="31" name="Straight Connector 30">
-            <a:extLst>
-              <a:ext uri="{FF2B5EF4-FFF2-40B4-BE49-F238E27FC236}">
-                <a16:creationId xmlns:a16="http://schemas.microsoft.com/office/drawing/2014/main" id="{F0FD5D2D-F575-D94D-B9BA-37CD627C6CE7}"/>
-              </a:ext>
-            </a:extLst>
-          </p:cNvPr>
-          <p:cNvCxnSpPr>
-            <a:cxnSpLocks/>
-          </p:cNvCxnSpPr>
-          <p:nvPr/>
-        </p:nvCxnSpPr>
-        <p:spPr>
-          <a:xfrm>
-            <a:off x="2809539" y="4475100"/>
-            <a:ext cx="6718150" cy="347302"/>
-          </a:xfrm>
-          <a:prstGeom prst="line">
-            <a:avLst/>
-          </a:prstGeom>
-          <a:ln>
-            <a:solidFill>
-              <a:srgbClr val="FF0000"/>
-            </a:solidFill>
-          </a:ln>
-        </p:spPr>
-        <p:style>
-          <a:lnRef idx="2">
-            <a:schemeClr val="accent1"/>
-          </a:lnRef>
-          <a:fillRef idx="0">
-            <a:schemeClr val="accent1"/>
-          </a:fillRef>
-          <a:effectRef idx="1">
-            <a:schemeClr val="accent1"/>
-          </a:effectRef>
-          <a:fontRef idx="minor">
-            <a:schemeClr val="tx1"/>
-          </a:fontRef>
-        </p:style>
-      </p:cxnSp>
-      <p:cxnSp>
-        <p:nvCxnSpPr>
-          <p:cNvPr id="34" name="Straight Connector 33">
-            <a:extLst>
-              <a:ext uri="{FF2B5EF4-FFF2-40B4-BE49-F238E27FC236}">
-                <a16:creationId xmlns:a16="http://schemas.microsoft.com/office/drawing/2014/main" id="{0786BE00-E156-0241-8CC6-9C03D99980CE}"/>
-              </a:ext>
-            </a:extLst>
-          </p:cNvPr>
-          <p:cNvCxnSpPr>
-            <a:cxnSpLocks/>
-          </p:cNvCxnSpPr>
-          <p:nvPr/>
-        </p:nvCxnSpPr>
-        <p:spPr>
-          <a:xfrm>
-            <a:off x="2809540" y="3849628"/>
-            <a:ext cx="6379285" cy="972775"/>
-          </a:xfrm>
-          <a:prstGeom prst="line">
-            <a:avLst/>
-          </a:prstGeom>
-          <a:ln>
-            <a:solidFill>
-              <a:srgbClr val="FF0000"/>
-            </a:solidFill>
-          </a:ln>
-        </p:spPr>
-        <p:style>
-          <a:lnRef idx="2">
-            <a:schemeClr val="accent1"/>
-          </a:lnRef>
-          <a:fillRef idx="0">
-            <a:schemeClr val="accent1"/>
-          </a:fillRef>
-          <a:effectRef idx="1">
-            <a:schemeClr val="accent1"/>
-          </a:effectRef>
-          <a:fontRef idx="minor">
-            <a:schemeClr val="tx1"/>
-          </a:fontRef>
-        </p:style>
-      </p:cxnSp>
-      <p:cxnSp>
-        <p:nvCxnSpPr>
-          <p:cNvPr id="37" name="Straight Connector 36">
-            <a:extLst>
-              <a:ext uri="{FF2B5EF4-FFF2-40B4-BE49-F238E27FC236}">
-                <a16:creationId xmlns:a16="http://schemas.microsoft.com/office/drawing/2014/main" id="{8775E5F1-3205-534A-9AE6-BBF82501DB9F}"/>
-              </a:ext>
-            </a:extLst>
-          </p:cNvPr>
-          <p:cNvCxnSpPr>
-            <a:cxnSpLocks/>
-          </p:cNvCxnSpPr>
-          <p:nvPr/>
-        </p:nvCxnSpPr>
-        <p:spPr>
-          <a:xfrm>
-            <a:off x="4744085" y="2551038"/>
-            <a:ext cx="4347920" cy="229218"/>
-          </a:xfrm>
-          <a:prstGeom prst="line">
-            <a:avLst/>
-          </a:prstGeom>
-          <a:ln>
-            <a:solidFill>
-              <a:srgbClr val="FF0000"/>
-            </a:solidFill>
-          </a:ln>
-        </p:spPr>
-        <p:style>
-          <a:lnRef idx="2">
-            <a:schemeClr val="accent1"/>
-          </a:lnRef>
-          <a:fillRef idx="0">
-            <a:schemeClr val="accent1"/>
-          </a:fillRef>
-          <a:effectRef idx="1">
-            <a:schemeClr val="accent1"/>
-          </a:effectRef>
-          <a:fontRef idx="minor">
-            <a:schemeClr val="tx1"/>
-          </a:fontRef>
-        </p:style>
-      </p:cxnSp>
-      <p:cxnSp>
-        <p:nvCxnSpPr>
-          <p:cNvPr id="40" name="Straight Connector 39">
-            <a:extLst>
-              <a:ext uri="{FF2B5EF4-FFF2-40B4-BE49-F238E27FC236}">
-                <a16:creationId xmlns:a16="http://schemas.microsoft.com/office/drawing/2014/main" id="{2DCA7A3E-10BD-8A44-AF88-23755295FAAC}"/>
-              </a:ext>
-            </a:extLst>
-          </p:cNvPr>
-          <p:cNvCxnSpPr>
-            <a:cxnSpLocks/>
-          </p:cNvCxnSpPr>
-          <p:nvPr/>
-        </p:nvCxnSpPr>
-        <p:spPr>
-          <a:xfrm flipV="1">
-            <a:off x="4014395" y="2390709"/>
-            <a:ext cx="3684494" cy="895752"/>
-          </a:xfrm>
-          <a:prstGeom prst="line">
-            <a:avLst/>
-          </a:prstGeom>
-          <a:ln>
-            <a:solidFill>
-              <a:srgbClr val="FF0000"/>
-            </a:solidFill>
-          </a:ln>
-        </p:spPr>
-        <p:style>
-          <a:lnRef idx="2">
-            <a:schemeClr val="accent1"/>
-          </a:lnRef>
-          <a:fillRef idx="0">
-            <a:schemeClr val="accent1"/>
-          </a:fillRef>
-          <a:effectRef idx="1">
-            <a:schemeClr val="accent1"/>
-          </a:effectRef>
-          <a:fontRef idx="minor">
-            <a:schemeClr val="tx1"/>
-          </a:fontRef>
-        </p:style>
-      </p:cxnSp>
-      <p:cxnSp>
-        <p:nvCxnSpPr>
-          <p:cNvPr id="43" name="Straight Connector 42">
-            <a:extLst>
-              <a:ext uri="{FF2B5EF4-FFF2-40B4-BE49-F238E27FC236}">
-                <a16:creationId xmlns:a16="http://schemas.microsoft.com/office/drawing/2014/main" id="{94C352C9-706F-024C-A451-7A4B8BA4B745}"/>
-              </a:ext>
-            </a:extLst>
-          </p:cNvPr>
-          <p:cNvCxnSpPr>
-            <a:cxnSpLocks/>
-          </p:cNvCxnSpPr>
-          <p:nvPr/>
-        </p:nvCxnSpPr>
-        <p:spPr>
-          <a:xfrm flipV="1">
-            <a:off x="4424302" y="2369529"/>
-            <a:ext cx="2798562" cy="916933"/>
-          </a:xfrm>
-          <a:prstGeom prst="line">
-            <a:avLst/>
-          </a:prstGeom>
-          <a:ln>
-            <a:solidFill>
-              <a:srgbClr val="FF0000"/>
-            </a:solidFill>
-          </a:ln>
-        </p:spPr>
-        <p:style>
-          <a:lnRef idx="2">
-            <a:schemeClr val="accent1"/>
-          </a:lnRef>
-          <a:fillRef idx="0">
-            <a:schemeClr val="accent1"/>
-          </a:fillRef>
-          <a:effectRef idx="1">
-            <a:schemeClr val="accent1"/>
-          </a:effectRef>
-          <a:fontRef idx="minor">
-            <a:schemeClr val="tx1"/>
-          </a:fontRef>
-        </p:style>
-      </p:cxnSp>
-      <p:cxnSp>
-        <p:nvCxnSpPr>
-          <p:cNvPr id="46" name="Straight Connector 45">
-            <a:extLst>
-              <a:ext uri="{FF2B5EF4-FFF2-40B4-BE49-F238E27FC236}">
-                <a16:creationId xmlns:a16="http://schemas.microsoft.com/office/drawing/2014/main" id="{1CA859FA-E7E2-5F45-8B7E-0BD588281539}"/>
-              </a:ext>
-            </a:extLst>
-          </p:cNvPr>
-          <p:cNvCxnSpPr>
-            <a:cxnSpLocks/>
-          </p:cNvCxnSpPr>
-          <p:nvPr/>
-        </p:nvCxnSpPr>
-        <p:spPr>
-          <a:xfrm>
-            <a:off x="4424303" y="2088667"/>
-            <a:ext cx="2370945" cy="257362"/>
-          </a:xfrm>
-          <a:prstGeom prst="line">
-            <a:avLst/>
-          </a:prstGeom>
-          <a:ln>
-            <a:solidFill>
-              <a:srgbClr val="FF0000"/>
-            </a:solidFill>
-          </a:ln>
-        </p:spPr>
-        <p:style>
-          <a:lnRef idx="2">
-            <a:schemeClr val="accent1"/>
-          </a:lnRef>
-          <a:fillRef idx="0">
-            <a:schemeClr val="accent1"/>
-          </a:fillRef>
-          <a:effectRef idx="1">
-            <a:schemeClr val="accent1"/>
-          </a:effectRef>
-          <a:fontRef idx="minor">
-            <a:schemeClr val="tx1"/>
-          </a:fontRef>
-        </p:style>
-      </p:cxnSp>
-      <p:cxnSp>
-        <p:nvCxnSpPr>
-          <p:cNvPr id="49" name="Straight Connector 48">
-            <a:extLst>
-              <a:ext uri="{FF2B5EF4-FFF2-40B4-BE49-F238E27FC236}">
-                <a16:creationId xmlns:a16="http://schemas.microsoft.com/office/drawing/2014/main" id="{A6C18E3B-8A37-BA40-A513-91CB13C409A4}"/>
-              </a:ext>
-            </a:extLst>
-          </p:cNvPr>
-          <p:cNvCxnSpPr>
-            <a:cxnSpLocks/>
-          </p:cNvCxnSpPr>
-          <p:nvPr/>
-        </p:nvCxnSpPr>
-        <p:spPr>
-          <a:xfrm>
-            <a:off x="4116594" y="2109042"/>
-            <a:ext cx="2214091" cy="258168"/>
-          </a:xfrm>
-          <a:prstGeom prst="line">
-            <a:avLst/>
-          </a:prstGeom>
-          <a:ln>
-            <a:solidFill>
-              <a:srgbClr val="FF0000"/>
-            </a:solidFill>
-          </a:ln>
-        </p:spPr>
-        <p:style>
-          <a:lnRef idx="2">
-            <a:schemeClr val="accent1"/>
-          </a:lnRef>
-          <a:fillRef idx="0">
-            <a:schemeClr val="accent1"/>
-          </a:fillRef>
-          <a:effectRef idx="1">
-            <a:schemeClr val="accent1"/>
-          </a:effectRef>
-          <a:fontRef idx="minor">
-            <a:schemeClr val="tx1"/>
-          </a:fontRef>
-        </p:style>
-      </p:cxnSp>
-      <p:cxnSp>
-        <p:nvCxnSpPr>
-          <p:cNvPr id="52" name="Straight Connector 51">
-            <a:extLst>
-              <a:ext uri="{FF2B5EF4-FFF2-40B4-BE49-F238E27FC236}">
-                <a16:creationId xmlns:a16="http://schemas.microsoft.com/office/drawing/2014/main" id="{0D9529FD-7B10-7E4D-8472-A092705E8DAD}"/>
-              </a:ext>
-            </a:extLst>
-          </p:cNvPr>
-          <p:cNvCxnSpPr>
-            <a:cxnSpLocks/>
-          </p:cNvCxnSpPr>
-          <p:nvPr/>
-        </p:nvCxnSpPr>
-        <p:spPr>
-          <a:xfrm flipV="1">
-            <a:off x="4116594" y="1987873"/>
-            <a:ext cx="2214091" cy="588182"/>
-          </a:xfrm>
-          <a:prstGeom prst="line">
-            <a:avLst/>
-          </a:prstGeom>
-          <a:ln>
-            <a:solidFill>
-              <a:srgbClr val="FF0000"/>
-            </a:solidFill>
-          </a:ln>
-        </p:spPr>
-        <p:style>
-          <a:lnRef idx="2">
-            <a:schemeClr val="accent1"/>
-          </a:lnRef>
-          <a:fillRef idx="0">
-            <a:schemeClr val="accent1"/>
-          </a:fillRef>
-          <a:effectRef idx="1">
-            <a:schemeClr val="accent1"/>
-          </a:effectRef>
-          <a:fontRef idx="minor">
-            <a:schemeClr val="tx1"/>
-          </a:fontRef>
-        </p:style>
-      </p:cxnSp>
-      <p:cxnSp>
-        <p:nvCxnSpPr>
-          <p:cNvPr id="56" name="Straight Connector 55">
-            <a:extLst>
-              <a:ext uri="{FF2B5EF4-FFF2-40B4-BE49-F238E27FC236}">
-                <a16:creationId xmlns:a16="http://schemas.microsoft.com/office/drawing/2014/main" id="{F761C42A-81B8-D147-A14B-0B92BB0C217D}"/>
-              </a:ext>
-            </a:extLst>
-          </p:cNvPr>
-          <p:cNvCxnSpPr>
-            <a:cxnSpLocks/>
-          </p:cNvCxnSpPr>
-          <p:nvPr/>
-        </p:nvCxnSpPr>
-        <p:spPr>
-          <a:xfrm flipV="1">
-            <a:off x="4412459" y="1997152"/>
-            <a:ext cx="2399919" cy="579127"/>
-          </a:xfrm>
-          <a:prstGeom prst="line">
-            <a:avLst/>
-          </a:prstGeom>
-          <a:ln>
-            <a:solidFill>
-              <a:srgbClr val="FF0000"/>
-            </a:solidFill>
-          </a:ln>
-        </p:spPr>
-        <p:style>
-          <a:lnRef idx="2">
-            <a:schemeClr val="accent1"/>
-          </a:lnRef>
-          <a:fillRef idx="0">
-            <a:schemeClr val="accent1"/>
-          </a:fillRef>
-          <a:effectRef idx="1">
-            <a:schemeClr val="accent1"/>
-          </a:effectRef>
-          <a:fontRef idx="minor">
-            <a:schemeClr val="tx1"/>
-          </a:fontRef>
-        </p:style>
-      </p:cxnSp>
-      <p:cxnSp>
-        <p:nvCxnSpPr>
-          <p:cNvPr id="58" name="Straight Connector 57">
-            <a:extLst>
-              <a:ext uri="{FF2B5EF4-FFF2-40B4-BE49-F238E27FC236}">
-                <a16:creationId xmlns:a16="http://schemas.microsoft.com/office/drawing/2014/main" id="{B824821B-2F43-9148-9004-0F4F73AC2B98}"/>
-              </a:ext>
-            </a:extLst>
-          </p:cNvPr>
-          <p:cNvCxnSpPr>
-            <a:cxnSpLocks/>
-          </p:cNvCxnSpPr>
-          <p:nvPr/>
-        </p:nvCxnSpPr>
-        <p:spPr>
-          <a:xfrm>
-            <a:off x="3202194" y="4801925"/>
-            <a:ext cx="7039469" cy="58131"/>
-          </a:xfrm>
-          <a:prstGeom prst="line">
-            <a:avLst/>
-          </a:prstGeom>
-          <a:ln>
-            <a:solidFill>
-              <a:srgbClr val="FF0000"/>
-            </a:solidFill>
-          </a:ln>
-        </p:spPr>
-        <p:style>
-          <a:lnRef idx="2">
-            <a:schemeClr val="accent1"/>
-          </a:lnRef>
-          <a:fillRef idx="0">
-            <a:schemeClr val="accent1"/>
-          </a:fillRef>
-          <a:effectRef idx="1">
-            <a:schemeClr val="accent1"/>
-          </a:effectRef>
-          <a:fontRef idx="minor">
-            <a:schemeClr val="tx1"/>
-          </a:fontRef>
-        </p:style>
-      </p:cxnSp>
+        </p:grpSpPr>
+        <p:pic>
+          <p:nvPicPr>
+            <p:cNvPr id="42" name="Content Placeholder 3">
+              <a:extLst>
+                <a:ext uri="{FF2B5EF4-FFF2-40B4-BE49-F238E27FC236}">
+                  <a16:creationId xmlns:a16="http://schemas.microsoft.com/office/drawing/2014/main" id="{14398FB6-9665-5F48-8C0E-209CCB0472AB}"/>
+                </a:ext>
+              </a:extLst>
+            </p:cNvPr>
+            <p:cNvPicPr>
+              <a:picLocks noChangeAspect="1"/>
+            </p:cNvPicPr>
+            <p:nvPr/>
+          </p:nvPicPr>
+          <p:blipFill>
+            <a:blip r:embed="rId2"/>
+            <a:stretch>
+              <a:fillRect/>
+            </a:stretch>
+          </p:blipFill>
+          <p:spPr>
+            <a:xfrm>
+              <a:off x="1618035" y="1108030"/>
+              <a:ext cx="4078789" cy="5475332"/>
+            </a:xfrm>
+            <a:prstGeom prst="rect">
+              <a:avLst/>
+            </a:prstGeom>
+          </p:spPr>
+        </p:pic>
+        <p:pic>
+          <p:nvPicPr>
+            <p:cNvPr id="44" name="Picture 43">
+              <a:extLst>
+                <a:ext uri="{FF2B5EF4-FFF2-40B4-BE49-F238E27FC236}">
+                  <a16:creationId xmlns:a16="http://schemas.microsoft.com/office/drawing/2014/main" id="{F32E4207-8823-524D-B860-7CB7A7480AB0}"/>
+                </a:ext>
+              </a:extLst>
+            </p:cNvPr>
+            <p:cNvPicPr>
+              <a:picLocks noChangeAspect="1"/>
+            </p:cNvPicPr>
+            <p:nvPr/>
+          </p:nvPicPr>
+          <p:blipFill rotWithShape="1">
+            <a:blip r:embed="rId3"/>
+            <a:srcRect r="29015"/>
+            <a:stretch/>
+          </p:blipFill>
+          <p:spPr>
+            <a:xfrm>
+              <a:off x="5810655" y="1336701"/>
+              <a:ext cx="5188086" cy="5327598"/>
+            </a:xfrm>
+            <a:prstGeom prst="rect">
+              <a:avLst/>
+            </a:prstGeom>
+          </p:spPr>
+        </p:pic>
+        <p:cxnSp>
+          <p:nvCxnSpPr>
+            <p:cNvPr id="45" name="Straight Connector 44">
+              <a:extLst>
+                <a:ext uri="{FF2B5EF4-FFF2-40B4-BE49-F238E27FC236}">
+                  <a16:creationId xmlns:a16="http://schemas.microsoft.com/office/drawing/2014/main" id="{26E8C933-FF9E-1145-A93C-497DCB40F209}"/>
+                </a:ext>
+              </a:extLst>
+            </p:cNvPr>
+            <p:cNvCxnSpPr>
+              <a:cxnSpLocks/>
+            </p:cNvCxnSpPr>
+            <p:nvPr/>
+          </p:nvCxnSpPr>
+          <p:spPr>
+            <a:xfrm>
+              <a:off x="3472546" y="2551039"/>
+              <a:ext cx="5716279" cy="735423"/>
+            </a:xfrm>
+            <a:prstGeom prst="line">
+              <a:avLst/>
+            </a:prstGeom>
+            <a:ln>
+              <a:solidFill>
+                <a:srgbClr val="FF0000"/>
+              </a:solidFill>
+            </a:ln>
+          </p:spPr>
+          <p:style>
+            <a:lnRef idx="2">
+              <a:schemeClr val="accent1"/>
+            </a:lnRef>
+            <a:fillRef idx="0">
+              <a:schemeClr val="accent1"/>
+            </a:fillRef>
+            <a:effectRef idx="1">
+              <a:schemeClr val="accent1"/>
+            </a:effectRef>
+            <a:fontRef idx="minor">
+              <a:schemeClr val="tx1"/>
+            </a:fontRef>
+          </p:style>
+        </p:cxnSp>
+        <p:cxnSp>
+          <p:nvCxnSpPr>
+            <p:cNvPr id="47" name="Straight Connector 46">
+              <a:extLst>
+                <a:ext uri="{FF2B5EF4-FFF2-40B4-BE49-F238E27FC236}">
+                  <a16:creationId xmlns:a16="http://schemas.microsoft.com/office/drawing/2014/main" id="{1105B3CD-E5AD-7D48-ACDB-3A4FC973A3A9}"/>
+                </a:ext>
+              </a:extLst>
+            </p:cNvPr>
+            <p:cNvCxnSpPr>
+              <a:cxnSpLocks/>
+            </p:cNvCxnSpPr>
+            <p:nvPr/>
+          </p:nvCxnSpPr>
+          <p:spPr>
+            <a:xfrm>
+              <a:off x="4116593" y="4238513"/>
+              <a:ext cx="3485478" cy="296572"/>
+            </a:xfrm>
+            <a:prstGeom prst="line">
+              <a:avLst/>
+            </a:prstGeom>
+            <a:ln>
+              <a:solidFill>
+                <a:srgbClr val="FF0000"/>
+              </a:solidFill>
+            </a:ln>
+          </p:spPr>
+          <p:style>
+            <a:lnRef idx="2">
+              <a:schemeClr val="accent1"/>
+            </a:lnRef>
+            <a:fillRef idx="0">
+              <a:schemeClr val="accent1"/>
+            </a:fillRef>
+            <a:effectRef idx="1">
+              <a:schemeClr val="accent1"/>
+            </a:effectRef>
+            <a:fontRef idx="minor">
+              <a:schemeClr val="tx1"/>
+            </a:fontRef>
+          </p:style>
+        </p:cxnSp>
+        <p:cxnSp>
+          <p:nvCxnSpPr>
+            <p:cNvPr id="48" name="Straight Connector 47">
+              <a:extLst>
+                <a:ext uri="{FF2B5EF4-FFF2-40B4-BE49-F238E27FC236}">
+                  <a16:creationId xmlns:a16="http://schemas.microsoft.com/office/drawing/2014/main" id="{0B66FC78-A3FC-8D46-915D-1AD8200F8E12}"/>
+                </a:ext>
+              </a:extLst>
+            </p:cNvPr>
+            <p:cNvCxnSpPr>
+              <a:cxnSpLocks/>
+            </p:cNvCxnSpPr>
+            <p:nvPr/>
+          </p:nvCxnSpPr>
+          <p:spPr>
+            <a:xfrm flipV="1">
+              <a:off x="4186518" y="3280441"/>
+              <a:ext cx="6481482" cy="2088037"/>
+            </a:xfrm>
+            <a:prstGeom prst="line">
+              <a:avLst/>
+            </a:prstGeom>
+            <a:ln>
+              <a:solidFill>
+                <a:srgbClr val="FF0000"/>
+              </a:solidFill>
+            </a:ln>
+          </p:spPr>
+          <p:style>
+            <a:lnRef idx="2">
+              <a:schemeClr val="accent1"/>
+            </a:lnRef>
+            <a:fillRef idx="0">
+              <a:schemeClr val="accent1"/>
+            </a:fillRef>
+            <a:effectRef idx="1">
+              <a:schemeClr val="accent1"/>
+            </a:effectRef>
+            <a:fontRef idx="minor">
+              <a:schemeClr val="tx1"/>
+            </a:fontRef>
+          </p:style>
+        </p:cxnSp>
+        <p:cxnSp>
+          <p:nvCxnSpPr>
+            <p:cNvPr id="50" name="Straight Connector 49">
+              <a:extLst>
+                <a:ext uri="{FF2B5EF4-FFF2-40B4-BE49-F238E27FC236}">
+                  <a16:creationId xmlns:a16="http://schemas.microsoft.com/office/drawing/2014/main" id="{8A7F99CE-DE5A-7749-8F98-209B03514363}"/>
+                </a:ext>
+              </a:extLst>
+            </p:cNvPr>
+            <p:cNvCxnSpPr>
+              <a:cxnSpLocks/>
+            </p:cNvCxnSpPr>
+            <p:nvPr/>
+          </p:nvCxnSpPr>
+          <p:spPr>
+            <a:xfrm flipV="1">
+              <a:off x="4116594" y="3845696"/>
+              <a:ext cx="6196405" cy="1215778"/>
+            </a:xfrm>
+            <a:prstGeom prst="line">
+              <a:avLst/>
+            </a:prstGeom>
+            <a:ln>
+              <a:solidFill>
+                <a:srgbClr val="FF0000"/>
+              </a:solidFill>
+            </a:ln>
+          </p:spPr>
+          <p:style>
+            <a:lnRef idx="2">
+              <a:schemeClr val="accent1"/>
+            </a:lnRef>
+            <a:fillRef idx="0">
+              <a:schemeClr val="accent1"/>
+            </a:fillRef>
+            <a:effectRef idx="1">
+              <a:schemeClr val="accent1"/>
+            </a:effectRef>
+            <a:fontRef idx="minor">
+              <a:schemeClr val="tx1"/>
+            </a:fontRef>
+          </p:style>
+        </p:cxnSp>
+        <p:cxnSp>
+          <p:nvCxnSpPr>
+            <p:cNvPr id="51" name="Straight Connector 50">
+              <a:extLst>
+                <a:ext uri="{FF2B5EF4-FFF2-40B4-BE49-F238E27FC236}">
+                  <a16:creationId xmlns:a16="http://schemas.microsoft.com/office/drawing/2014/main" id="{0BBE19DB-DE63-B44E-B2E6-636E977CFAF8}"/>
+                </a:ext>
+              </a:extLst>
+            </p:cNvPr>
+            <p:cNvCxnSpPr>
+              <a:cxnSpLocks/>
+            </p:cNvCxnSpPr>
+            <p:nvPr/>
+          </p:nvCxnSpPr>
+          <p:spPr>
+            <a:xfrm flipV="1">
+              <a:off x="4525384" y="3845696"/>
+              <a:ext cx="5394960" cy="1258808"/>
+            </a:xfrm>
+            <a:prstGeom prst="line">
+              <a:avLst/>
+            </a:prstGeom>
+            <a:ln>
+              <a:solidFill>
+                <a:srgbClr val="FF0000"/>
+              </a:solidFill>
+            </a:ln>
+          </p:spPr>
+          <p:style>
+            <a:lnRef idx="2">
+              <a:schemeClr val="accent1"/>
+            </a:lnRef>
+            <a:fillRef idx="0">
+              <a:schemeClr val="accent1"/>
+            </a:fillRef>
+            <a:effectRef idx="1">
+              <a:schemeClr val="accent1"/>
+            </a:effectRef>
+            <a:fontRef idx="minor">
+              <a:schemeClr val="tx1"/>
+            </a:fontRef>
+          </p:style>
+        </p:cxnSp>
+        <p:cxnSp>
+          <p:nvCxnSpPr>
+            <p:cNvPr id="53" name="Straight Connector 52">
+              <a:extLst>
+                <a:ext uri="{FF2B5EF4-FFF2-40B4-BE49-F238E27FC236}">
+                  <a16:creationId xmlns:a16="http://schemas.microsoft.com/office/drawing/2014/main" id="{1E7E917C-16C4-DF42-9561-A213FEA5BF00}"/>
+                </a:ext>
+              </a:extLst>
+            </p:cNvPr>
+            <p:cNvCxnSpPr>
+              <a:cxnSpLocks/>
+            </p:cNvCxnSpPr>
+            <p:nvPr/>
+          </p:nvCxnSpPr>
+          <p:spPr>
+            <a:xfrm flipV="1">
+              <a:off x="4288716" y="3646842"/>
+              <a:ext cx="6379285" cy="1740142"/>
+            </a:xfrm>
+            <a:prstGeom prst="line">
+              <a:avLst/>
+            </a:prstGeom>
+            <a:ln>
+              <a:solidFill>
+                <a:srgbClr val="FF0000"/>
+              </a:solidFill>
+            </a:ln>
+          </p:spPr>
+          <p:style>
+            <a:lnRef idx="2">
+              <a:schemeClr val="accent1"/>
+            </a:lnRef>
+            <a:fillRef idx="0">
+              <a:schemeClr val="accent1"/>
+            </a:fillRef>
+            <a:effectRef idx="1">
+              <a:schemeClr val="accent1"/>
+            </a:effectRef>
+            <a:fontRef idx="minor">
+              <a:schemeClr val="tx1"/>
+            </a:fontRef>
+          </p:style>
+        </p:cxnSp>
+        <p:cxnSp>
+          <p:nvCxnSpPr>
+            <p:cNvPr id="54" name="Straight Connector 53">
+              <a:extLst>
+                <a:ext uri="{FF2B5EF4-FFF2-40B4-BE49-F238E27FC236}">
+                  <a16:creationId xmlns:a16="http://schemas.microsoft.com/office/drawing/2014/main" id="{55360BF1-C890-AB42-9CE2-940B682B9F1D}"/>
+                </a:ext>
+              </a:extLst>
+            </p:cNvPr>
+            <p:cNvCxnSpPr>
+              <a:cxnSpLocks/>
+            </p:cNvCxnSpPr>
+            <p:nvPr/>
+          </p:nvCxnSpPr>
+          <p:spPr>
+            <a:xfrm>
+              <a:off x="4918038" y="4276166"/>
+              <a:ext cx="4953896" cy="546236"/>
+            </a:xfrm>
+            <a:prstGeom prst="line">
+              <a:avLst/>
+            </a:prstGeom>
+            <a:ln>
+              <a:solidFill>
+                <a:srgbClr val="FF0000"/>
+              </a:solidFill>
+            </a:ln>
+          </p:spPr>
+          <p:style>
+            <a:lnRef idx="2">
+              <a:schemeClr val="accent1"/>
+            </a:lnRef>
+            <a:fillRef idx="0">
+              <a:schemeClr val="accent1"/>
+            </a:fillRef>
+            <a:effectRef idx="1">
+              <a:schemeClr val="accent1"/>
+            </a:effectRef>
+            <a:fontRef idx="minor">
+              <a:schemeClr val="tx1"/>
+            </a:fontRef>
+          </p:style>
+        </p:cxnSp>
+        <p:cxnSp>
+          <p:nvCxnSpPr>
+            <p:cNvPr id="55" name="Straight Connector 54">
+              <a:extLst>
+                <a:ext uri="{FF2B5EF4-FFF2-40B4-BE49-F238E27FC236}">
+                  <a16:creationId xmlns:a16="http://schemas.microsoft.com/office/drawing/2014/main" id="{9F9256CB-7958-CB45-90E6-D000FBD996D7}"/>
+                </a:ext>
+              </a:extLst>
+            </p:cNvPr>
+            <p:cNvCxnSpPr>
+              <a:cxnSpLocks/>
+            </p:cNvCxnSpPr>
+            <p:nvPr/>
+          </p:nvCxnSpPr>
+          <p:spPr>
+            <a:xfrm>
+              <a:off x="3202194" y="4184726"/>
+              <a:ext cx="6158753" cy="418265"/>
+            </a:xfrm>
+            <a:prstGeom prst="line">
+              <a:avLst/>
+            </a:prstGeom>
+            <a:ln>
+              <a:solidFill>
+                <a:srgbClr val="FF0000"/>
+              </a:solidFill>
+            </a:ln>
+          </p:spPr>
+          <p:style>
+            <a:lnRef idx="2">
+              <a:schemeClr val="accent1"/>
+            </a:lnRef>
+            <a:fillRef idx="0">
+              <a:schemeClr val="accent1"/>
+            </a:fillRef>
+            <a:effectRef idx="1">
+              <a:schemeClr val="accent1"/>
+            </a:effectRef>
+            <a:fontRef idx="minor">
+              <a:schemeClr val="tx1"/>
+            </a:fontRef>
+          </p:style>
+        </p:cxnSp>
+        <p:cxnSp>
+          <p:nvCxnSpPr>
+            <p:cNvPr id="57" name="Straight Connector 56">
+              <a:extLst>
+                <a:ext uri="{FF2B5EF4-FFF2-40B4-BE49-F238E27FC236}">
+                  <a16:creationId xmlns:a16="http://schemas.microsoft.com/office/drawing/2014/main" id="{3F336605-B003-BE4C-BDE7-5AA1BE30F8DF}"/>
+                </a:ext>
+              </a:extLst>
+            </p:cNvPr>
+            <p:cNvCxnSpPr>
+              <a:cxnSpLocks/>
+            </p:cNvCxnSpPr>
+            <p:nvPr/>
+          </p:nvCxnSpPr>
+          <p:spPr>
+            <a:xfrm>
+              <a:off x="2809539" y="4475100"/>
+              <a:ext cx="6718150" cy="347302"/>
+            </a:xfrm>
+            <a:prstGeom prst="line">
+              <a:avLst/>
+            </a:prstGeom>
+            <a:ln>
+              <a:solidFill>
+                <a:srgbClr val="FF0000"/>
+              </a:solidFill>
+            </a:ln>
+          </p:spPr>
+          <p:style>
+            <a:lnRef idx="2">
+              <a:schemeClr val="accent1"/>
+            </a:lnRef>
+            <a:fillRef idx="0">
+              <a:schemeClr val="accent1"/>
+            </a:fillRef>
+            <a:effectRef idx="1">
+              <a:schemeClr val="accent1"/>
+            </a:effectRef>
+            <a:fontRef idx="minor">
+              <a:schemeClr val="tx1"/>
+            </a:fontRef>
+          </p:style>
+        </p:cxnSp>
+        <p:cxnSp>
+          <p:nvCxnSpPr>
+            <p:cNvPr id="59" name="Straight Connector 58">
+              <a:extLst>
+                <a:ext uri="{FF2B5EF4-FFF2-40B4-BE49-F238E27FC236}">
+                  <a16:creationId xmlns:a16="http://schemas.microsoft.com/office/drawing/2014/main" id="{1A90B131-D26A-764C-8DC7-B9092186A6E3}"/>
+                </a:ext>
+              </a:extLst>
+            </p:cNvPr>
+            <p:cNvCxnSpPr>
+              <a:cxnSpLocks/>
+            </p:cNvCxnSpPr>
+            <p:nvPr/>
+          </p:nvCxnSpPr>
+          <p:spPr>
+            <a:xfrm>
+              <a:off x="2809540" y="3849628"/>
+              <a:ext cx="6379285" cy="972775"/>
+            </a:xfrm>
+            <a:prstGeom prst="line">
+              <a:avLst/>
+            </a:prstGeom>
+            <a:ln>
+              <a:solidFill>
+                <a:srgbClr val="FF0000"/>
+              </a:solidFill>
+            </a:ln>
+          </p:spPr>
+          <p:style>
+            <a:lnRef idx="2">
+              <a:schemeClr val="accent1"/>
+            </a:lnRef>
+            <a:fillRef idx="0">
+              <a:schemeClr val="accent1"/>
+            </a:fillRef>
+            <a:effectRef idx="1">
+              <a:schemeClr val="accent1"/>
+            </a:effectRef>
+            <a:fontRef idx="minor">
+              <a:schemeClr val="tx1"/>
+            </a:fontRef>
+          </p:style>
+        </p:cxnSp>
+        <p:cxnSp>
+          <p:nvCxnSpPr>
+            <p:cNvPr id="60" name="Straight Connector 59">
+              <a:extLst>
+                <a:ext uri="{FF2B5EF4-FFF2-40B4-BE49-F238E27FC236}">
+                  <a16:creationId xmlns:a16="http://schemas.microsoft.com/office/drawing/2014/main" id="{6DA11153-EC41-F044-9DA7-530098AE7046}"/>
+                </a:ext>
+              </a:extLst>
+            </p:cNvPr>
+            <p:cNvCxnSpPr>
+              <a:cxnSpLocks/>
+            </p:cNvCxnSpPr>
+            <p:nvPr/>
+          </p:nvCxnSpPr>
+          <p:spPr>
+            <a:xfrm>
+              <a:off x="4744085" y="2551038"/>
+              <a:ext cx="4347920" cy="229218"/>
+            </a:xfrm>
+            <a:prstGeom prst="line">
+              <a:avLst/>
+            </a:prstGeom>
+            <a:ln>
+              <a:solidFill>
+                <a:srgbClr val="FF0000"/>
+              </a:solidFill>
+            </a:ln>
+          </p:spPr>
+          <p:style>
+            <a:lnRef idx="2">
+              <a:schemeClr val="accent1"/>
+            </a:lnRef>
+            <a:fillRef idx="0">
+              <a:schemeClr val="accent1"/>
+            </a:fillRef>
+            <a:effectRef idx="1">
+              <a:schemeClr val="accent1"/>
+            </a:effectRef>
+            <a:fontRef idx="minor">
+              <a:schemeClr val="tx1"/>
+            </a:fontRef>
+          </p:style>
+        </p:cxnSp>
+        <p:cxnSp>
+          <p:nvCxnSpPr>
+            <p:cNvPr id="61" name="Straight Connector 60">
+              <a:extLst>
+                <a:ext uri="{FF2B5EF4-FFF2-40B4-BE49-F238E27FC236}">
+                  <a16:creationId xmlns:a16="http://schemas.microsoft.com/office/drawing/2014/main" id="{F48C0044-DBF0-EB45-9DB4-246BD6E80139}"/>
+                </a:ext>
+              </a:extLst>
+            </p:cNvPr>
+            <p:cNvCxnSpPr>
+              <a:cxnSpLocks/>
+            </p:cNvCxnSpPr>
+            <p:nvPr/>
+          </p:nvCxnSpPr>
+          <p:spPr>
+            <a:xfrm flipV="1">
+              <a:off x="4014395" y="2390709"/>
+              <a:ext cx="3684494" cy="895752"/>
+            </a:xfrm>
+            <a:prstGeom prst="line">
+              <a:avLst/>
+            </a:prstGeom>
+            <a:ln>
+              <a:solidFill>
+                <a:srgbClr val="FF0000"/>
+              </a:solidFill>
+            </a:ln>
+          </p:spPr>
+          <p:style>
+            <a:lnRef idx="2">
+              <a:schemeClr val="accent1"/>
+            </a:lnRef>
+            <a:fillRef idx="0">
+              <a:schemeClr val="accent1"/>
+            </a:fillRef>
+            <a:effectRef idx="1">
+              <a:schemeClr val="accent1"/>
+            </a:effectRef>
+            <a:fontRef idx="minor">
+              <a:schemeClr val="tx1"/>
+            </a:fontRef>
+          </p:style>
+        </p:cxnSp>
+        <p:cxnSp>
+          <p:nvCxnSpPr>
+            <p:cNvPr id="62" name="Straight Connector 61">
+              <a:extLst>
+                <a:ext uri="{FF2B5EF4-FFF2-40B4-BE49-F238E27FC236}">
+                  <a16:creationId xmlns:a16="http://schemas.microsoft.com/office/drawing/2014/main" id="{94EECF65-52DC-214E-B3C2-FFA17D073763}"/>
+                </a:ext>
+              </a:extLst>
+            </p:cNvPr>
+            <p:cNvCxnSpPr>
+              <a:cxnSpLocks/>
+            </p:cNvCxnSpPr>
+            <p:nvPr/>
+          </p:nvCxnSpPr>
+          <p:spPr>
+            <a:xfrm flipV="1">
+              <a:off x="4424302" y="2369529"/>
+              <a:ext cx="2798562" cy="916933"/>
+            </a:xfrm>
+            <a:prstGeom prst="line">
+              <a:avLst/>
+            </a:prstGeom>
+            <a:ln>
+              <a:solidFill>
+                <a:srgbClr val="FF0000"/>
+              </a:solidFill>
+            </a:ln>
+          </p:spPr>
+          <p:style>
+            <a:lnRef idx="2">
+              <a:schemeClr val="accent1"/>
+            </a:lnRef>
+            <a:fillRef idx="0">
+              <a:schemeClr val="accent1"/>
+            </a:fillRef>
+            <a:effectRef idx="1">
+              <a:schemeClr val="accent1"/>
+            </a:effectRef>
+            <a:fontRef idx="minor">
+              <a:schemeClr val="tx1"/>
+            </a:fontRef>
+          </p:style>
+        </p:cxnSp>
+        <p:cxnSp>
+          <p:nvCxnSpPr>
+            <p:cNvPr id="63" name="Straight Connector 62">
+              <a:extLst>
+                <a:ext uri="{FF2B5EF4-FFF2-40B4-BE49-F238E27FC236}">
+                  <a16:creationId xmlns:a16="http://schemas.microsoft.com/office/drawing/2014/main" id="{F3C1590F-2430-1D4B-B184-C4AA80E8E7FC}"/>
+                </a:ext>
+              </a:extLst>
+            </p:cNvPr>
+            <p:cNvCxnSpPr>
+              <a:cxnSpLocks/>
+            </p:cNvCxnSpPr>
+            <p:nvPr/>
+          </p:nvCxnSpPr>
+          <p:spPr>
+            <a:xfrm>
+              <a:off x="4424303" y="2088667"/>
+              <a:ext cx="2370945" cy="257362"/>
+            </a:xfrm>
+            <a:prstGeom prst="line">
+              <a:avLst/>
+            </a:prstGeom>
+            <a:ln>
+              <a:solidFill>
+                <a:srgbClr val="FF0000"/>
+              </a:solidFill>
+            </a:ln>
+          </p:spPr>
+          <p:style>
+            <a:lnRef idx="2">
+              <a:schemeClr val="accent1"/>
+            </a:lnRef>
+            <a:fillRef idx="0">
+              <a:schemeClr val="accent1"/>
+            </a:fillRef>
+            <a:effectRef idx="1">
+              <a:schemeClr val="accent1"/>
+            </a:effectRef>
+            <a:fontRef idx="minor">
+              <a:schemeClr val="tx1"/>
+            </a:fontRef>
+          </p:style>
+        </p:cxnSp>
+        <p:cxnSp>
+          <p:nvCxnSpPr>
+            <p:cNvPr id="64" name="Straight Connector 63">
+              <a:extLst>
+                <a:ext uri="{FF2B5EF4-FFF2-40B4-BE49-F238E27FC236}">
+                  <a16:creationId xmlns:a16="http://schemas.microsoft.com/office/drawing/2014/main" id="{12B420C9-D3D6-034E-B1B4-CA666A873C23}"/>
+                </a:ext>
+              </a:extLst>
+            </p:cNvPr>
+            <p:cNvCxnSpPr>
+              <a:cxnSpLocks/>
+            </p:cNvCxnSpPr>
+            <p:nvPr/>
+          </p:nvCxnSpPr>
+          <p:spPr>
+            <a:xfrm>
+              <a:off x="4116594" y="2109042"/>
+              <a:ext cx="2214091" cy="258168"/>
+            </a:xfrm>
+            <a:prstGeom prst="line">
+              <a:avLst/>
+            </a:prstGeom>
+            <a:ln>
+              <a:solidFill>
+                <a:srgbClr val="FF0000"/>
+              </a:solidFill>
+            </a:ln>
+          </p:spPr>
+          <p:style>
+            <a:lnRef idx="2">
+              <a:schemeClr val="accent1"/>
+            </a:lnRef>
+            <a:fillRef idx="0">
+              <a:schemeClr val="accent1"/>
+            </a:fillRef>
+            <a:effectRef idx="1">
+              <a:schemeClr val="accent1"/>
+            </a:effectRef>
+            <a:fontRef idx="minor">
+              <a:schemeClr val="tx1"/>
+            </a:fontRef>
+          </p:style>
+        </p:cxnSp>
+        <p:cxnSp>
+          <p:nvCxnSpPr>
+            <p:cNvPr id="65" name="Straight Connector 64">
+              <a:extLst>
+                <a:ext uri="{FF2B5EF4-FFF2-40B4-BE49-F238E27FC236}">
+                  <a16:creationId xmlns:a16="http://schemas.microsoft.com/office/drawing/2014/main" id="{E7D83D39-6B42-4242-BAC0-14DCCE8B3DBC}"/>
+                </a:ext>
+              </a:extLst>
+            </p:cNvPr>
+            <p:cNvCxnSpPr>
+              <a:cxnSpLocks/>
+            </p:cNvCxnSpPr>
+            <p:nvPr/>
+          </p:nvCxnSpPr>
+          <p:spPr>
+            <a:xfrm flipV="1">
+              <a:off x="4116594" y="1987873"/>
+              <a:ext cx="2214091" cy="588182"/>
+            </a:xfrm>
+            <a:prstGeom prst="line">
+              <a:avLst/>
+            </a:prstGeom>
+            <a:ln>
+              <a:solidFill>
+                <a:srgbClr val="FF0000"/>
+              </a:solidFill>
+            </a:ln>
+          </p:spPr>
+          <p:style>
+            <a:lnRef idx="2">
+              <a:schemeClr val="accent1"/>
+            </a:lnRef>
+            <a:fillRef idx="0">
+              <a:schemeClr val="accent1"/>
+            </a:fillRef>
+            <a:effectRef idx="1">
+              <a:schemeClr val="accent1"/>
+            </a:effectRef>
+            <a:fontRef idx="minor">
+              <a:schemeClr val="tx1"/>
+            </a:fontRef>
+          </p:style>
+        </p:cxnSp>
+        <p:cxnSp>
+          <p:nvCxnSpPr>
+            <p:cNvPr id="66" name="Straight Connector 65">
+              <a:extLst>
+                <a:ext uri="{FF2B5EF4-FFF2-40B4-BE49-F238E27FC236}">
+                  <a16:creationId xmlns:a16="http://schemas.microsoft.com/office/drawing/2014/main" id="{26F40DAD-D0D8-9E40-935D-94C28F9C3EDE}"/>
+                </a:ext>
+              </a:extLst>
+            </p:cNvPr>
+            <p:cNvCxnSpPr>
+              <a:cxnSpLocks/>
+            </p:cNvCxnSpPr>
+            <p:nvPr/>
+          </p:nvCxnSpPr>
+          <p:spPr>
+            <a:xfrm flipV="1">
+              <a:off x="4412459" y="1997152"/>
+              <a:ext cx="2399919" cy="579127"/>
+            </a:xfrm>
+            <a:prstGeom prst="line">
+              <a:avLst/>
+            </a:prstGeom>
+            <a:ln>
+              <a:solidFill>
+                <a:srgbClr val="FF0000"/>
+              </a:solidFill>
+            </a:ln>
+          </p:spPr>
+          <p:style>
+            <a:lnRef idx="2">
+              <a:schemeClr val="accent1"/>
+            </a:lnRef>
+            <a:fillRef idx="0">
+              <a:schemeClr val="accent1"/>
+            </a:fillRef>
+            <a:effectRef idx="1">
+              <a:schemeClr val="accent1"/>
+            </a:effectRef>
+            <a:fontRef idx="minor">
+              <a:schemeClr val="tx1"/>
+            </a:fontRef>
+          </p:style>
+        </p:cxnSp>
+        <p:cxnSp>
+          <p:nvCxnSpPr>
+            <p:cNvPr id="67" name="Straight Connector 66">
+              <a:extLst>
+                <a:ext uri="{FF2B5EF4-FFF2-40B4-BE49-F238E27FC236}">
+                  <a16:creationId xmlns:a16="http://schemas.microsoft.com/office/drawing/2014/main" id="{69FE8DD4-B4C1-9940-AB0B-BAC2E26460F1}"/>
+                </a:ext>
+              </a:extLst>
+            </p:cNvPr>
+            <p:cNvCxnSpPr>
+              <a:cxnSpLocks/>
+            </p:cNvCxnSpPr>
+            <p:nvPr/>
+          </p:nvCxnSpPr>
+          <p:spPr>
+            <a:xfrm>
+              <a:off x="3202194" y="4801925"/>
+              <a:ext cx="7039469" cy="58131"/>
+            </a:xfrm>
+            <a:prstGeom prst="line">
+              <a:avLst/>
+            </a:prstGeom>
+            <a:ln>
+              <a:solidFill>
+                <a:srgbClr val="FF0000"/>
+              </a:solidFill>
+            </a:ln>
+          </p:spPr>
+          <p:style>
+            <a:lnRef idx="2">
+              <a:schemeClr val="accent1"/>
+            </a:lnRef>
+            <a:fillRef idx="0">
+              <a:schemeClr val="accent1"/>
+            </a:fillRef>
+            <a:effectRef idx="1">
+              <a:schemeClr val="accent1"/>
+            </a:effectRef>
+            <a:fontRef idx="minor">
+              <a:schemeClr val="tx1"/>
+            </a:fontRef>
+          </p:style>
+        </p:cxnSp>
+      </p:grpSp>
     </p:spTree>
     <p:extLst>
       <p:ext uri="{BB962C8B-B14F-4D97-AF65-F5344CB8AC3E}">
@@ -6111,7 +6274,7 @@
 </p:sld>
 </file>
 
-<file path=ppt/slides/slide18.xml><?xml version="1.0" encoding="utf-8"?>
+<file path=ppt/slides/slide19.xml><?xml version="1.0" encoding="utf-8"?>
 <p:sld xmlns:a="http://schemas.openxmlformats.org/drawingml/2006/main" xmlns:r="http://schemas.openxmlformats.org/officeDocument/2006/relationships" xmlns:p="http://schemas.openxmlformats.org/presentationml/2006/main">
   <p:cSld>
     <p:spTree>
@@ -6246,7 +6409,137 @@
 </p:sld>
 </file>
 
-<file path=ppt/slides/slide19.xml><?xml version="1.0" encoding="utf-8"?>
+<file path=ppt/slides/slide2.xml><?xml version="1.0" encoding="utf-8"?>
+<p:sld xmlns:a="http://schemas.openxmlformats.org/drawingml/2006/main" xmlns:r="http://schemas.openxmlformats.org/officeDocument/2006/relationships" xmlns:p="http://schemas.openxmlformats.org/presentationml/2006/main">
+  <p:cSld>
+    <p:spTree>
+      <p:nvGrpSpPr>
+        <p:cNvPr id="1" name=""/>
+        <p:cNvGrpSpPr/>
+        <p:nvPr/>
+      </p:nvGrpSpPr>
+      <p:grpSpPr>
+        <a:xfrm>
+          <a:off x="0" y="0"/>
+          <a:ext cx="0" cy="0"/>
+          <a:chOff x="0" y="0"/>
+          <a:chExt cx="0" cy="0"/>
+        </a:xfrm>
+      </p:grpSpPr>
+      <p:sp>
+        <p:nvSpPr>
+          <p:cNvPr id="2" name="Title 1"/>
+          <p:cNvSpPr>
+            <a:spLocks noGrp="1"/>
+          </p:cNvSpPr>
+          <p:nvPr>
+            <p:ph type="title"/>
+          </p:nvPr>
+        </p:nvSpPr>
+        <p:spPr/>
+        <p:txBody>
+          <a:bodyPr/>
+          <a:lstStyle/>
+          <a:p>
+            <a:r>
+              <a:rPr lang="en-US" dirty="0"/>
+              <a:t>PCBs are Made of Layers</a:t>
+            </a:r>
+          </a:p>
+        </p:txBody>
+      </p:sp>
+      <p:sp>
+        <p:nvSpPr>
+          <p:cNvPr id="3" name="Content Placeholder 2"/>
+          <p:cNvSpPr>
+            <a:spLocks noGrp="1"/>
+          </p:cNvSpPr>
+          <p:nvPr>
+            <p:ph sz="half" idx="1"/>
+          </p:nvPr>
+        </p:nvSpPr>
+        <p:spPr/>
+        <p:txBody>
+          <a:bodyPr>
+            <a:normAutofit/>
+          </a:bodyPr>
+          <a:lstStyle/>
+          <a:p>
+            <a:r>
+              <a:rPr lang="en-US" dirty="0"/>
+              <a:t>Silkscreen – documentation labels</a:t>
+            </a:r>
+          </a:p>
+          <a:p>
+            <a:r>
+              <a:rPr lang="en-US" dirty="0"/>
+              <a:t>Metal – for making wires</a:t>
+            </a:r>
+          </a:p>
+          <a:p>
+            <a:r>
+              <a:rPr lang="en-US" dirty="0" err="1"/>
+              <a:t>Dialectric</a:t>
+            </a:r>
+            <a:r>
+              <a:rPr lang="en-US" dirty="0"/>
+              <a:t> – insulation and structure</a:t>
+            </a:r>
+          </a:p>
+          <a:p>
+            <a:r>
+              <a:rPr lang="en-US" dirty="0"/>
+              <a:t>Solder mask – protective outer coating</a:t>
+            </a:r>
+          </a:p>
+        </p:txBody>
+      </p:sp>
+      <p:pic>
+        <p:nvPicPr>
+          <p:cNvPr id="7" name="Content Placeholder 6">
+            <a:extLst>
+              <a:ext uri="{FF2B5EF4-FFF2-40B4-BE49-F238E27FC236}">
+                <a16:creationId xmlns:a16="http://schemas.microsoft.com/office/drawing/2014/main" id="{722C3E62-3A51-B045-9A50-7A82FB8B8738}"/>
+              </a:ext>
+            </a:extLst>
+          </p:cNvPr>
+          <p:cNvPicPr>
+            <a:picLocks noGrp="1" noChangeAspect="1"/>
+          </p:cNvPicPr>
+          <p:nvPr>
+            <p:ph sz="half" idx="2"/>
+          </p:nvPr>
+        </p:nvPicPr>
+        <p:blipFill>
+          <a:blip r:embed="rId2"/>
+          <a:stretch>
+            <a:fillRect/>
+          </a:stretch>
+        </p:blipFill>
+        <p:spPr>
+          <a:xfrm>
+            <a:off x="6172200" y="1866570"/>
+            <a:ext cx="4038600" cy="3993222"/>
+          </a:xfrm>
+          <a:prstGeom prst="rect">
+            <a:avLst/>
+          </a:prstGeom>
+        </p:spPr>
+      </p:pic>
+    </p:spTree>
+    <p:extLst>
+      <p:ext uri="{BB962C8B-B14F-4D97-AF65-F5344CB8AC3E}">
+        <p14:creationId xmlns:p14="http://schemas.microsoft.com/office/powerpoint/2010/main" val="755142371"/>
+      </p:ext>
+    </p:extLst>
+  </p:cSld>
+  <p:clrMapOvr>
+    <a:masterClrMapping/>
+  </p:clrMapOvr>
+</p:sld>
+</file>
+
+<file path=ppt/slides/slide20.xml><?xml version="1.0" encoding="utf-8"?>
 <p:sld xmlns:a="http://schemas.openxmlformats.org/drawingml/2006/main" xmlns:r="http://schemas.openxmlformats.org/officeDocument/2006/relationships" xmlns:p="http://schemas.openxmlformats.org/presentationml/2006/main">
   <p:cSld>
     <p:spTree>
@@ -6456,7 +6749,7 @@
 </p:sld>
 </file>
 
-<file path=ppt/slides/slide2.xml><?xml version="1.0" encoding="utf-8"?>
+<file path=ppt/slides/slide21.xml><?xml version="1.0" encoding="utf-8"?>
 <p:sld xmlns:a="http://schemas.openxmlformats.org/drawingml/2006/main" xmlns:r="http://schemas.openxmlformats.org/officeDocument/2006/relationships" xmlns:p="http://schemas.openxmlformats.org/presentationml/2006/main">
   <p:cSld>
     <p:spTree>
@@ -6490,136 +6783,6 @@
           <a:p>
             <a:r>
               <a:rPr lang="en-US" dirty="0"/>
-              <a:t>PCBs are Made of Layers</a:t>
-            </a:r>
-          </a:p>
-        </p:txBody>
-      </p:sp>
-      <p:sp>
-        <p:nvSpPr>
-          <p:cNvPr id="3" name="Content Placeholder 2"/>
-          <p:cNvSpPr>
-            <a:spLocks noGrp="1"/>
-          </p:cNvSpPr>
-          <p:nvPr>
-            <p:ph sz="half" idx="1"/>
-          </p:nvPr>
-        </p:nvSpPr>
-        <p:spPr/>
-        <p:txBody>
-          <a:bodyPr>
-            <a:normAutofit/>
-          </a:bodyPr>
-          <a:lstStyle/>
-          <a:p>
-            <a:r>
-              <a:rPr lang="en-US" dirty="0"/>
-              <a:t>Silkscreen – documentation labels</a:t>
-            </a:r>
-          </a:p>
-          <a:p>
-            <a:r>
-              <a:rPr lang="en-US" dirty="0"/>
-              <a:t>Metal – for making wires</a:t>
-            </a:r>
-          </a:p>
-          <a:p>
-            <a:r>
-              <a:rPr lang="en-US" dirty="0" err="1"/>
-              <a:t>Dialectric</a:t>
-            </a:r>
-            <a:r>
-              <a:rPr lang="en-US" dirty="0"/>
-              <a:t> – insulation and structure</a:t>
-            </a:r>
-          </a:p>
-          <a:p>
-            <a:r>
-              <a:rPr lang="en-US" dirty="0"/>
-              <a:t>Solder mask – protective outer coating</a:t>
-            </a:r>
-          </a:p>
-        </p:txBody>
-      </p:sp>
-      <p:pic>
-        <p:nvPicPr>
-          <p:cNvPr id="7" name="Content Placeholder 6">
-            <a:extLst>
-              <a:ext uri="{FF2B5EF4-FFF2-40B4-BE49-F238E27FC236}">
-                <a16:creationId xmlns:a16="http://schemas.microsoft.com/office/drawing/2014/main" id="{722C3E62-3A51-B045-9A50-7A82FB8B8738}"/>
-              </a:ext>
-            </a:extLst>
-          </p:cNvPr>
-          <p:cNvPicPr>
-            <a:picLocks noGrp="1" noChangeAspect="1"/>
-          </p:cNvPicPr>
-          <p:nvPr>
-            <p:ph sz="half" idx="2"/>
-          </p:nvPr>
-        </p:nvPicPr>
-        <p:blipFill>
-          <a:blip r:embed="rId2"/>
-          <a:stretch>
-            <a:fillRect/>
-          </a:stretch>
-        </p:blipFill>
-        <p:spPr>
-          <a:xfrm>
-            <a:off x="6172200" y="1866570"/>
-            <a:ext cx="4038600" cy="3993222"/>
-          </a:xfrm>
-          <a:prstGeom prst="rect">
-            <a:avLst/>
-          </a:prstGeom>
-        </p:spPr>
-      </p:pic>
-    </p:spTree>
-    <p:extLst>
-      <p:ext uri="{BB962C8B-B14F-4D97-AF65-F5344CB8AC3E}">
-        <p14:creationId xmlns:p14="http://schemas.microsoft.com/office/powerpoint/2010/main" val="755142371"/>
-      </p:ext>
-    </p:extLst>
-  </p:cSld>
-  <p:clrMapOvr>
-    <a:masterClrMapping/>
-  </p:clrMapOvr>
-</p:sld>
-</file>
-
-<file path=ppt/slides/slide20.xml><?xml version="1.0" encoding="utf-8"?>
-<p:sld xmlns:a="http://schemas.openxmlformats.org/drawingml/2006/main" xmlns:r="http://schemas.openxmlformats.org/officeDocument/2006/relationships" xmlns:p="http://schemas.openxmlformats.org/presentationml/2006/main">
-  <p:cSld>
-    <p:spTree>
-      <p:nvGrpSpPr>
-        <p:cNvPr id="1" name=""/>
-        <p:cNvGrpSpPr/>
-        <p:nvPr/>
-      </p:nvGrpSpPr>
-      <p:grpSpPr>
-        <a:xfrm>
-          <a:off x="0" y="0"/>
-          <a:ext cx="0" cy="0"/>
-          <a:chOff x="0" y="0"/>
-          <a:chExt cx="0" cy="0"/>
-        </a:xfrm>
-      </p:grpSpPr>
-      <p:sp>
-        <p:nvSpPr>
-          <p:cNvPr id="2" name="Title 1"/>
-          <p:cNvSpPr>
-            <a:spLocks noGrp="1"/>
-          </p:cNvSpPr>
-          <p:nvPr>
-            <p:ph type="title"/>
-          </p:nvPr>
-        </p:nvSpPr>
-        <p:spPr/>
-        <p:txBody>
-          <a:bodyPr/>
-          <a:lstStyle/>
-          <a:p>
-            <a:r>
-              <a:rPr lang="en-US" dirty="0"/>
               <a:t>Eagle Layers</a:t>
             </a:r>
           </a:p>
@@ -6633,68 +6796,72 @@
           </p:cNvGraphicFramePr>
           <p:nvPr>
             <p:ph idx="1"/>
-            <p:extLst/>
+            <p:extLst>
+              <p:ext uri="{D42A27DB-BD31-4B8C-83A1-F6EECF244321}">
+                <p14:modId xmlns:p14="http://schemas.microsoft.com/office/powerpoint/2010/main" val="3908018411"/>
+              </p:ext>
+            </p:extLst>
           </p:nvPr>
         </p:nvGraphicFramePr>
         <p:xfrm>
-          <a:off x="1714006" y="1195297"/>
-          <a:ext cx="8953995" cy="5662702"/>
+          <a:off x="1642821" y="1383620"/>
+          <a:ext cx="8474990" cy="5474380"/>
         </p:xfrm>
         <a:graphic>
           <a:graphicData uri="http://schemas.openxmlformats.org/drawingml/2006/table">
             <a:tbl>
               <a:tblPr/>
               <a:tblGrid>
-                <a:gridCol w="790679">
+                <a:gridCol w="748381">
                   <a:extLst>
                     <a:ext uri="{9D8B030D-6E8A-4147-A177-3AD203B41FA5}">
                       <a16:colId xmlns:a16="http://schemas.microsoft.com/office/drawing/2014/main" val="20000"/>
                     </a:ext>
                   </a:extLst>
                 </a:gridCol>
-                <a:gridCol w="2906937">
+                <a:gridCol w="2751427">
                   <a:extLst>
                     <a:ext uri="{9D8B030D-6E8A-4147-A177-3AD203B41FA5}">
                       <a16:colId xmlns:a16="http://schemas.microsoft.com/office/drawing/2014/main" val="20001"/>
                     </a:ext>
                   </a:extLst>
                 </a:gridCol>
-                <a:gridCol w="159284">
+                <a:gridCol w="150763">
                   <a:extLst>
                     <a:ext uri="{9D8B030D-6E8A-4147-A177-3AD203B41FA5}">
                       <a16:colId xmlns:a16="http://schemas.microsoft.com/office/drawing/2014/main" val="20002"/>
                     </a:ext>
                   </a:extLst>
                 </a:gridCol>
-                <a:gridCol w="258837">
+                <a:gridCol w="244990">
                   <a:extLst>
                     <a:ext uri="{9D8B030D-6E8A-4147-A177-3AD203B41FA5}">
                       <a16:colId xmlns:a16="http://schemas.microsoft.com/office/drawing/2014/main" val="20003"/>
                     </a:ext>
                   </a:extLst>
                 </a:gridCol>
-                <a:gridCol w="836242">
+                <a:gridCol w="791506">
                   <a:extLst>
                     <a:ext uri="{9D8B030D-6E8A-4147-A177-3AD203B41FA5}">
                       <a16:colId xmlns:a16="http://schemas.microsoft.com/office/drawing/2014/main" val="20004"/>
                     </a:ext>
                   </a:extLst>
                 </a:gridCol>
-                <a:gridCol w="2806722">
+                <a:gridCol w="2656573">
                   <a:extLst>
                     <a:ext uri="{9D8B030D-6E8A-4147-A177-3AD203B41FA5}">
                       <a16:colId xmlns:a16="http://schemas.microsoft.com/office/drawing/2014/main" val="20005"/>
                     </a:ext>
                   </a:extLst>
                 </a:gridCol>
-                <a:gridCol w="104588">
+                <a:gridCol w="98993">
                   <a:extLst>
                     <a:ext uri="{9D8B030D-6E8A-4147-A177-3AD203B41FA5}">
                       <a16:colId xmlns:a16="http://schemas.microsoft.com/office/drawing/2014/main" val="20006"/>
                     </a:ext>
                   </a:extLst>
                 </a:gridCol>
-                <a:gridCol w="1090706">
+                <a:gridCol w="1032357">
                   <a:extLst>
                     <a:ext uri="{9D8B030D-6E8A-4147-A177-3AD203B41FA5}">
                       <a16:colId xmlns:a16="http://schemas.microsoft.com/office/drawing/2014/main" val="20007"/>
@@ -6702,7 +6869,7 @@
                   </a:extLst>
                 </a:gridCol>
               </a:tblGrid>
-              <a:tr h="202957">
+              <a:tr h="172197">
                 <a:tc>
                   <a:txBody>
                     <a:bodyPr/>
@@ -6979,7 +7146,7 @@
                   </a:ext>
                 </a:extLst>
               </a:tr>
-              <a:tr h="202957">
+              <a:tr h="172197">
                 <a:tc>
                   <a:txBody>
                     <a:bodyPr/>
@@ -7256,7 +7423,7 @@
                   </a:ext>
                 </a:extLst>
               </a:tr>
-              <a:tr h="202957">
+              <a:tr h="172197">
                 <a:tc>
                   <a:txBody>
                     <a:bodyPr/>
@@ -7539,7 +7706,7 @@
                   </a:ext>
                 </a:extLst>
               </a:tr>
-              <a:tr h="395867">
+              <a:tr h="335870">
                 <a:tc>
                   <a:txBody>
                     <a:bodyPr/>
@@ -7822,7 +7989,7 @@
                   </a:ext>
                 </a:extLst>
               </a:tr>
-              <a:tr h="395867">
+              <a:tr h="335870">
                 <a:tc>
                   <a:txBody>
                     <a:bodyPr/>
@@ -8105,7 +8272,7 @@
                   </a:ext>
                 </a:extLst>
               </a:tr>
-              <a:tr h="202957">
+              <a:tr h="172197">
                 <a:tc>
                   <a:txBody>
                     <a:bodyPr/>
@@ -8382,7 +8549,7 @@
                   </a:ext>
                 </a:extLst>
               </a:tr>
-              <a:tr h="202957">
+              <a:tr h="172197">
                 <a:tc>
                   <a:txBody>
                     <a:bodyPr/>
@@ -8675,7 +8842,7 @@
                   </a:ext>
                 </a:extLst>
               </a:tr>
-              <a:tr h="202957">
+              <a:tr h="172197">
                 <a:tc>
                   <a:txBody>
                     <a:bodyPr/>
@@ -8961,7 +9128,7 @@
                   </a:ext>
                 </a:extLst>
               </a:tr>
-              <a:tr h="202957">
+              <a:tr h="172197">
                 <a:tc>
                   <a:txBody>
                     <a:bodyPr/>
@@ -9247,7 +9414,7 @@
                   </a:ext>
                 </a:extLst>
               </a:tr>
-              <a:tr h="202957">
+              <a:tr h="172197">
                 <a:tc>
                   <a:txBody>
                     <a:bodyPr/>
@@ -9503,7 +9670,7 @@
                     <a:lstStyle/>
                     <a:p>
                       <a:pPr algn="l" fontAlgn="b"/>
-                      <a:endParaRPr lang="en-US" sz="1200" b="0" i="0" u="none" strike="noStrike">
+                      <a:endParaRPr lang="en-US" sz="1200" b="0" i="0" u="none" strike="noStrike" dirty="0">
                         <a:solidFill>
                           <a:srgbClr val="000000"/>
                         </a:solidFill>
@@ -9533,7 +9700,7 @@
                   </a:ext>
                 </a:extLst>
               </a:tr>
-              <a:tr h="202957">
+              <a:tr h="172197">
                 <a:tc>
                   <a:txBody>
                     <a:bodyPr/>
@@ -9819,7 +9986,7 @@
                   </a:ext>
                 </a:extLst>
               </a:tr>
-              <a:tr h="202957">
+              <a:tr h="172197">
                 <a:tc>
                   <a:txBody>
                     <a:bodyPr/>
@@ -9863,7 +10030,7 @@
                     <a:p>
                       <a:pPr algn="l" fontAlgn="b"/>
                       <a:r>
-                        <a:rPr lang="en-US" sz="1200" b="0" i="0" u="none" strike="noStrike">
+                        <a:rPr lang="en-US" sz="1200" b="0" i="0" u="none" strike="noStrike" dirty="0">
                           <a:solidFill>
                             <a:srgbClr val="000000"/>
                           </a:solidFill>
@@ -10105,7 +10272,7 @@
                   </a:ext>
                 </a:extLst>
               </a:tr>
-              <a:tr h="202957">
+              <a:tr h="172197">
                 <a:tc>
                   <a:txBody>
                     <a:bodyPr/>
@@ -10382,7 +10549,7 @@
                   </a:ext>
                 </a:extLst>
               </a:tr>
-              <a:tr h="202957">
+              <a:tr h="172197">
                 <a:tc>
                   <a:txBody>
                     <a:bodyPr/>
@@ -10659,7 +10826,7 @@
                   </a:ext>
                 </a:extLst>
               </a:tr>
-              <a:tr h="202957">
+              <a:tr h="172197">
                 <a:tc>
                   <a:txBody>
                     <a:bodyPr/>
@@ -10942,7 +11109,7 @@
                   </a:ext>
                 </a:extLst>
               </a:tr>
-              <a:tr h="202957">
+              <a:tr h="172197">
                 <a:tc>
                   <a:txBody>
                     <a:bodyPr/>
@@ -11219,7 +11386,7 @@
                   </a:ext>
                 </a:extLst>
               </a:tr>
-              <a:tr h="202957">
+              <a:tr h="172197">
                 <a:tc>
                   <a:txBody>
                     <a:bodyPr/>
@@ -11496,7 +11663,7 @@
                   </a:ext>
                 </a:extLst>
               </a:tr>
-              <a:tr h="202957">
+              <a:tr h="172197">
                 <a:tc>
                   <a:txBody>
                     <a:bodyPr/>
@@ -11773,7 +11940,7 @@
                   </a:ext>
                 </a:extLst>
               </a:tr>
-              <a:tr h="202957">
+              <a:tr h="172197">
                 <a:tc>
                   <a:txBody>
                     <a:bodyPr/>
@@ -12050,7 +12217,7 @@
                   </a:ext>
                 </a:extLst>
               </a:tr>
-              <a:tr h="202957">
+              <a:tr h="172197">
                 <a:tc>
                   <a:txBody>
                     <a:bodyPr/>
@@ -12327,7 +12494,7 @@
                   </a:ext>
                 </a:extLst>
               </a:tr>
-              <a:tr h="202957">
+              <a:tr h="172197">
                 <a:tc>
                   <a:txBody>
                     <a:bodyPr/>
@@ -12604,7 +12771,7 @@
                   </a:ext>
                 </a:extLst>
               </a:tr>
-              <a:tr h="202957">
+              <a:tr h="172197">
                 <a:tc>
                   <a:txBody>
                     <a:bodyPr/>
@@ -12881,7 +13048,7 @@
                   </a:ext>
                 </a:extLst>
               </a:tr>
-              <a:tr h="202957">
+              <a:tr h="172197">
                 <a:tc>
                   <a:txBody>
                     <a:bodyPr/>
@@ -13158,7 +13325,7 @@
                   </a:ext>
                 </a:extLst>
               </a:tr>
-              <a:tr h="202957">
+              <a:tr h="172197">
                 <a:tc>
                   <a:txBody>
                     <a:bodyPr/>
@@ -13435,7 +13602,7 @@
                   </a:ext>
                 </a:extLst>
               </a:tr>
-              <a:tr h="202957">
+              <a:tr h="172197">
                 <a:tc>
                   <a:txBody>
                     <a:bodyPr/>
@@ -13712,7 +13879,7 @@
                   </a:ext>
                 </a:extLst>
               </a:tr>
-              <a:tr h="202957">
+              <a:tr h="172197">
                 <a:tc>
                   <a:txBody>
                     <a:bodyPr/>
@@ -13988,7 +14155,7 @@
 </p:sld>
 </file>
 
-<file path=ppt/slides/slide21.xml><?xml version="1.0" encoding="utf-8"?>
+<file path=ppt/slides/slide22.xml><?xml version="1.0" encoding="utf-8"?>
 <p:sld xmlns:a="http://schemas.openxmlformats.org/drawingml/2006/main" xmlns:r="http://schemas.openxmlformats.org/officeDocument/2006/relationships" xmlns:p="http://schemas.openxmlformats.org/presentationml/2006/main" show="0">
   <p:cSld>
     <p:spTree>
@@ -14094,7 +14261,7 @@
 </p:sld>
 </file>
 
-<file path=ppt/slides/slide22.xml><?xml version="1.0" encoding="utf-8"?>
+<file path=ppt/slides/slide23.xml><?xml version="1.0" encoding="utf-8"?>
 <p:sld xmlns:a="http://schemas.openxmlformats.org/drawingml/2006/main" xmlns:r="http://schemas.openxmlformats.org/officeDocument/2006/relationships" xmlns:p="http://schemas.openxmlformats.org/presentationml/2006/main">
   <p:cSld>
     <p:spTree>
@@ -14276,7 +14443,7 @@
 </p:sld>
 </file>
 
-<file path=ppt/slides/slide23.xml><?xml version="1.0" encoding="utf-8"?>
+<file path=ppt/slides/slide24.xml><?xml version="1.0" encoding="utf-8"?>
 <p:sld xmlns:a="http://schemas.openxmlformats.org/drawingml/2006/main" xmlns:r="http://schemas.openxmlformats.org/officeDocument/2006/relationships" xmlns:p="http://schemas.openxmlformats.org/presentationml/2006/main">
   <p:cSld>
     <p:spTree>
@@ -14411,13 +14578,14 @@
             </a:r>
           </a:p>
           <a:p>
-            <a:r>
-              <a:rPr lang="en-US" sz="1800" dirty="0"/>
-              <a:t>Our manufacturer</a:t>
-            </a:r>
-          </a:p>
-          <a:p>
             <a:pPr lvl="1"/>
+            <a:r>
+              <a:rPr lang="en-US" sz="1600" dirty="0"/>
+              <a:t>Our manufacturer:</a:t>
+            </a:r>
+            <a:br>
+              <a:rPr lang="en-US" sz="1600" dirty="0"/>
+            </a:br>
             <a:r>
               <a:rPr lang="en-US" sz="1600" dirty="0">
                 <a:hlinkClick r:id="rId2"/>
@@ -14429,7 +14597,7 @@
           <a:p>
             <a:r>
               <a:rPr lang="en-US" sz="1800" dirty="0"/>
-              <a:t>Our configuration</a:t>
+              <a:t>Our configuration encodes their requirements</a:t>
             </a:r>
           </a:p>
           <a:p>
@@ -14440,7 +14608,7 @@
             </a:r>
             <a:r>
               <a:rPr lang="en-US" sz="1600" dirty="0"/>
-              <a:t>-Resources/Eagle/DRU/*</a:t>
+              <a:t>-Resources/Eagle/DRU/jlcpcb-4layer-5mil-small-cream.dru</a:t>
             </a:r>
           </a:p>
           <a:p>
@@ -14451,7 +14619,7 @@
             </a:r>
             <a:r>
               <a:rPr lang="en-US" sz="1600" dirty="0"/>
-              <a:t>-Resources/Eagle/CAM/*</a:t>
+              <a:t>-Resources/Eagle/CAM/jlcpcb-4layer-values-eagle9.cam</a:t>
             </a:r>
           </a:p>
           <a:p>
@@ -14640,7 +14808,7 @@
 </p:sld>
 </file>
 
-<file path=ppt/slides/slide24.xml><?xml version="1.0" encoding="utf-8"?>
+<file path=ppt/slides/slide25.xml><?xml version="1.0" encoding="utf-8"?>
 <p:sld xmlns:a="http://schemas.openxmlformats.org/drawingml/2006/main" xmlns:r="http://schemas.openxmlformats.org/officeDocument/2006/relationships" xmlns:p="http://schemas.openxmlformats.org/presentationml/2006/main">
   <p:cSld>
     <p:spTree>
@@ -14731,7 +14899,7 @@
 </p:sld>
 </file>
 
-<file path=ppt/slides/slide25.xml><?xml version="1.0" encoding="utf-8"?>
+<file path=ppt/slides/slide26.xml><?xml version="1.0" encoding="utf-8"?>
 <p:sld xmlns:a="http://schemas.openxmlformats.org/drawingml/2006/main" xmlns:r="http://schemas.openxmlformats.org/officeDocument/2006/relationships" xmlns:p="http://schemas.openxmlformats.org/presentationml/2006/main">
   <p:cSld>
     <p:spTree>
@@ -14910,7 +15078,7 @@
 </p:sld>
 </file>
 
-<file path=ppt/slides/slide26.xml><?xml version="1.0" encoding="utf-8"?>
+<file path=ppt/slides/slide27.xml><?xml version="1.0" encoding="utf-8"?>
 <p:sld xmlns:a="http://schemas.openxmlformats.org/drawingml/2006/main" xmlns:r="http://schemas.openxmlformats.org/officeDocument/2006/relationships" xmlns:p="http://schemas.openxmlformats.org/presentationml/2006/main">
   <p:cSld>
     <p:spTree>
@@ -15146,7 +15314,7 @@
 </p:sld>
 </file>
 
-<file path=ppt/slides/slide27.xml><?xml version="1.0" encoding="utf-8"?>
+<file path=ppt/slides/slide28.xml><?xml version="1.0" encoding="utf-8"?>
 <p:sld xmlns:a="http://schemas.openxmlformats.org/drawingml/2006/main" xmlns:r="http://schemas.openxmlformats.org/officeDocument/2006/relationships" xmlns:p="http://schemas.openxmlformats.org/presentationml/2006/main">
   <p:cSld>
     <p:spTree>
@@ -15257,14 +15425,14 @@
             <a:pPr lvl="1"/>
             <a:r>
               <a:rPr lang="en-US" dirty="0"/>
-              <a:t>A “perfect” score is 20 points</a:t>
+              <a:t>A “perfect” score is 10 points</a:t>
             </a:r>
           </a:p>
           <a:p>
             <a:pPr lvl="1"/>
             <a:r>
               <a:rPr lang="en-US" dirty="0"/>
-              <a:t>You start out with 22-24 points (depending on the lab).</a:t>
+              <a:t>You start out with 11-12 points (depending on the lab).</a:t>
             </a:r>
           </a:p>
           <a:p>
@@ -15307,7 +15475,7 @@
           <a:p>
             <a:r>
               <a:rPr lang="en-US" dirty="0"/>
-              <a:t>”Quick checks” are free.</a:t>
+              <a:t>“Quick checks” are free.</a:t>
             </a:r>
           </a:p>
           <a:p>
@@ -15332,7 +15500,7 @@
 </p:sld>
 </file>
 
-<file path=ppt/slides/slide28.xml><?xml version="1.0" encoding="utf-8"?>
+<file path=ppt/slides/slide29.xml><?xml version="1.0" encoding="utf-8"?>
 <p:sld xmlns:a="http://schemas.openxmlformats.org/drawingml/2006/main" xmlns:r="http://schemas.openxmlformats.org/officeDocument/2006/relationships" xmlns:p="http://schemas.openxmlformats.org/presentationml/2006/main">
   <p:cSld>
     <p:spTree>
@@ -15470,13 +15638,13 @@
         <p:spPr/>
         <p:txBody>
           <a:bodyPr>
-            <a:normAutofit fontScale="77500" lnSpcReduction="20000"/>
+            <a:normAutofit fontScale="92500" lnSpcReduction="20000"/>
           </a:bodyPr>
           <a:lstStyle/>
           <a:p>
             <a:r>
               <a:rPr lang="en-US" dirty="0"/>
-              <a:t>The Metal layers for several components</a:t>
+              <a:t>The Metal layers </a:t>
             </a:r>
           </a:p>
           <a:p>
@@ -15490,34 +15658,17 @@
             <a:pPr lvl="1"/>
             <a:r>
               <a:rPr lang="en-US" dirty="0"/>
-              <a:t>Pads for attaching/connecting components</a:t>
+              <a:t>Attaching components</a:t>
             </a:r>
           </a:p>
           <a:p>
             <a:r>
               <a:rPr lang="en-US" dirty="0"/>
-              <a:t>N-layer boards have N metal layers </a:t>
-            </a:r>
-          </a:p>
-          <a:p>
-            <a:pPr lvl="1"/>
-            <a:r>
-              <a:rPr lang="en-US" dirty="0"/>
-              <a:t>N usually is 2,4,...</a:t>
-            </a:r>
-          </a:p>
-          <a:p>
-            <a:pPr lvl="1"/>
-            <a:r>
-              <a:rPr lang="en-US" dirty="0"/>
-              <a:t>Fewer layers </a:t>
-            </a:r>
-            <a:r>
-              <a:rPr lang="en-US" dirty="0">
-                <a:sym typeface="Wingdings"/>
-              </a:rPr>
-              <a:t> cheaper</a:t>
-            </a:r>
+              <a:t>More layers -&gt; more expensive</a:t>
+            </a:r>
+            <a:endParaRPr lang="en-US" dirty="0">
+              <a:sym typeface="Wingdings"/>
+            </a:endParaRPr>
           </a:p>
           <a:p>
             <a:r>
@@ -15709,12 +15860,6 @@
               <a:t>About 0.034 mm</a:t>
             </a:r>
           </a:p>
-          <a:p>
-            <a:r>
-              <a:rPr lang="en-US" dirty="0"/>
-              <a:t>Thicker metal layers can carry more current</a:t>
-            </a:r>
-          </a:p>
         </p:txBody>
       </p:sp>
       <p:pic>
@@ -15983,33 +16128,16 @@
         <p:spPr/>
         <p:txBody>
           <a:bodyPr>
-            <a:normAutofit fontScale="92500" lnSpcReduction="10000"/>
+            <a:normAutofit/>
           </a:bodyPr>
           <a:lstStyle/>
           <a:p>
             <a:r>
               <a:rPr lang="en-US" dirty="0"/>
-              <a:t>The solder masking is a polymer (plastic) coating on the top and bottom of the board</a:t>
-            </a:r>
-          </a:p>
-          <a:p>
-            <a:r>
-              <a:rPr lang="en-US" dirty="0">
-                <a:sym typeface="Wingdings"/>
-              </a:rPr>
-              <a:t>Solder does not adhere to it.</a:t>
-            </a:r>
-          </a:p>
-          <a:p>
-            <a:r>
-              <a:rPr lang="en-US" dirty="0">
-                <a:sym typeface="Wingdings"/>
-              </a:rPr>
-              <a:t>It serves several needs</a:t>
-            </a:r>
-          </a:p>
-          <a:p>
-            <a:pPr lvl="1"/>
+              <a:t>Plastic coating on the top and bottom of the board</a:t>
+            </a:r>
+          </a:p>
+          <a:p>
             <a:r>
               <a:rPr lang="en-US" dirty="0">
                 <a:sym typeface="Wingdings"/>
@@ -16018,7 +16146,6 @@
             </a:r>
           </a:p>
           <a:p>
-            <a:pPr lvl="1"/>
             <a:r>
               <a:rPr lang="en-US" dirty="0">
                 <a:sym typeface="Wingdings"/>
@@ -16151,7 +16278,7 @@
           <a:p>
             <a:r>
               <a:rPr lang="en-US" dirty="0"/>
-              <a:t>It’s an opaque (usually) white epoxy or polymer</a:t>
+              <a:t>It’s an opaque, (usually) white epoxy or polymer</a:t>
             </a:r>
           </a:p>
           <a:p>
@@ -16305,51 +16432,21 @@
             </a:r>
           </a:p>
           <a:p>
-            <a:pPr lvl="1"/>
             <a:r>
               <a:rPr lang="en-US" dirty="0"/>
               <a:t>Drill a hole</a:t>
             </a:r>
           </a:p>
           <a:p>
-            <a:pPr lvl="1"/>
             <a:r>
               <a:rPr lang="en-US" dirty="0"/>
               <a:t>Electroplate it with copper</a:t>
             </a:r>
           </a:p>
           <a:p>
-            <a:pPr lvl="1"/>
             <a:r>
               <a:rPr lang="en-US" dirty="0"/>
-              <a:t>If it’s exposed to air, plate it with a non-oxidizing metal.</a:t>
-            </a:r>
-          </a:p>
-          <a:p>
-            <a:r>
-              <a:rPr lang="en-US" dirty="0"/>
-              <a:t>Problems</a:t>
-            </a:r>
-          </a:p>
-          <a:p>
-            <a:pPr lvl="1"/>
-            <a:r>
-              <a:rPr lang="en-US" dirty="0"/>
-              <a:t>Takes up space in all layers</a:t>
-            </a:r>
-          </a:p>
-          <a:p>
-            <a:pPr lvl="1"/>
-            <a:r>
-              <a:rPr lang="en-US" dirty="0"/>
-              <a:t>Pins are generally pretty big</a:t>
-            </a:r>
-          </a:p>
-          <a:p>
-            <a:pPr lvl="1"/>
-            <a:r>
-              <a:rPr lang="en-US" dirty="0"/>
-              <a:t>Pin-to-pin spacing &gt;= 1mm</a:t>
+              <a:t>Cover it with a non-corroding metal.</a:t>
             </a:r>
           </a:p>
         </p:txBody>
@@ -16432,8 +16529,12 @@
           <a:lstStyle/>
           <a:p>
             <a:r>
+              <a:rPr lang="en-US" dirty="0" err="1"/>
+              <a:t>Throughholes</a:t>
+            </a:r>
+            <a:r>
               <a:rPr lang="en-US" dirty="0"/>
-              <a:t>Pads and </a:t>
+              <a:t> and </a:t>
             </a:r>
             <a:r>
               <a:rPr lang="en-US" dirty="0" err="1"/>
@@ -16456,7 +16557,7 @@
         <p:spPr/>
         <p:txBody>
           <a:bodyPr>
-            <a:normAutofit/>
+            <a:normAutofit fontScale="92500" lnSpcReduction="10000"/>
           </a:bodyPr>
           <a:lstStyle/>
           <a:p>
@@ -16501,16 +16602,47 @@
             <a:r>
               <a:rPr lang="en-US" dirty="0"/>
               <a:t>As small as possible</a:t>
+            </a:r>
+          </a:p>
+          <a:p>
+            <a:r>
+              <a:rPr lang="en-US" dirty="0"/>
+              <a:t>Problems</a:t>
+            </a:r>
+          </a:p>
+          <a:p>
+            <a:pPr lvl="1"/>
+            <a:r>
+              <a:rPr lang="en-US" dirty="0"/>
+              <a:t>Takes up space in all layers</a:t>
+            </a:r>
+          </a:p>
+          <a:p>
+            <a:pPr lvl="1"/>
+            <a:r>
+              <a:rPr lang="en-US" dirty="0" err="1"/>
+              <a:t>Throughhole</a:t>
+            </a:r>
+            <a:r>
+              <a:rPr lang="en-US" dirty="0"/>
+              <a:t> pins are generally pretty big</a:t>
+            </a:r>
+          </a:p>
+          <a:p>
+            <a:pPr lvl="1"/>
+            <a:r>
+              <a:rPr lang="en-US" dirty="0"/>
+              <a:t>Pin-to-pin spacing &gt;= 1mm</a:t>
             </a:r>
           </a:p>
         </p:txBody>
       </p:sp>
       <p:pic>
         <p:nvPicPr>
-          <p:cNvPr id="7" name="Content Placeholder 6">
+          <p:cNvPr id="8" name="Content Placeholder 7">
             <a:extLst>
               <a:ext uri="{FF2B5EF4-FFF2-40B4-BE49-F238E27FC236}">
-                <a16:creationId xmlns:a16="http://schemas.microsoft.com/office/drawing/2014/main" id="{99F5C374-AB33-8B4E-B413-FA3470AC5619}"/>
+                <a16:creationId xmlns:a16="http://schemas.microsoft.com/office/drawing/2014/main" id="{48B3F6BA-D1C2-FD42-BCA1-DB5A9B955A51}"/>
               </a:ext>
             </a:extLst>
           </p:cNvPr>
@@ -16529,8 +16661,8 @@
         </p:blipFill>
         <p:spPr>
           <a:xfrm>
-            <a:off x="6172200" y="1904781"/>
-            <a:ext cx="4038600" cy="3916800"/>
+            <a:off x="6519675" y="1825625"/>
+            <a:ext cx="4486649" cy="4351338"/>
           </a:xfrm>
           <a:prstGeom prst="rect">
             <a:avLst/>

</xml_diff>

<commit_message>
Fix typo in directory
</commit_message>
<xml_diff>
--- a/labs/Introduction-To-Eagle/Introduction-To-Eagle.pptx
+++ b/labs/Introduction-To-Eagle/Introduction-To-Eagle.pptx
@@ -4,6 +4,9 @@
   <p:sldMasterIdLst>
     <p:sldMasterId id="2147483648" r:id="rId1"/>
   </p:sldMasterIdLst>
+  <p:notesMasterIdLst>
+    <p:notesMasterId r:id="rId32"/>
+  </p:notesMasterIdLst>
   <p:sldIdLst>
     <p:sldId id="292" r:id="rId2"/>
     <p:sldId id="293" r:id="rId3"/>
@@ -12,28 +15,29 @@
     <p:sldId id="296" r:id="rId6"/>
     <p:sldId id="297" r:id="rId7"/>
     <p:sldId id="298" r:id="rId8"/>
-    <p:sldId id="299" r:id="rId9"/>
-    <p:sldId id="300" r:id="rId10"/>
-    <p:sldId id="320" r:id="rId11"/>
-    <p:sldId id="302" r:id="rId12"/>
-    <p:sldId id="322" r:id="rId13"/>
-    <p:sldId id="307" r:id="rId14"/>
-    <p:sldId id="263" r:id="rId15"/>
-    <p:sldId id="316" r:id="rId16"/>
-    <p:sldId id="314" r:id="rId17"/>
-    <p:sldId id="315" r:id="rId18"/>
-    <p:sldId id="317" r:id="rId19"/>
-    <p:sldId id="257" r:id="rId20"/>
-    <p:sldId id="318" r:id="rId21"/>
-    <p:sldId id="258" r:id="rId22"/>
-    <p:sldId id="279" r:id="rId23"/>
-    <p:sldId id="319" r:id="rId24"/>
-    <p:sldId id="321" r:id="rId25"/>
-    <p:sldId id="305" r:id="rId26"/>
-    <p:sldId id="311" r:id="rId27"/>
-    <p:sldId id="313" r:id="rId28"/>
-    <p:sldId id="312" r:id="rId29"/>
-    <p:sldId id="303" r:id="rId30"/>
+    <p:sldId id="302" r:id="rId9"/>
+    <p:sldId id="299" r:id="rId10"/>
+    <p:sldId id="300" r:id="rId11"/>
+    <p:sldId id="320" r:id="rId12"/>
+    <p:sldId id="323" r:id="rId13"/>
+    <p:sldId id="322" r:id="rId14"/>
+    <p:sldId id="307" r:id="rId15"/>
+    <p:sldId id="263" r:id="rId16"/>
+    <p:sldId id="316" r:id="rId17"/>
+    <p:sldId id="314" r:id="rId18"/>
+    <p:sldId id="315" r:id="rId19"/>
+    <p:sldId id="317" r:id="rId20"/>
+    <p:sldId id="257" r:id="rId21"/>
+    <p:sldId id="318" r:id="rId22"/>
+    <p:sldId id="258" r:id="rId23"/>
+    <p:sldId id="279" r:id="rId24"/>
+    <p:sldId id="319" r:id="rId25"/>
+    <p:sldId id="321" r:id="rId26"/>
+    <p:sldId id="305" r:id="rId27"/>
+    <p:sldId id="311" r:id="rId28"/>
+    <p:sldId id="313" r:id="rId29"/>
+    <p:sldId id="312" r:id="rId30"/>
+    <p:sldId id="303" r:id="rId31"/>
   </p:sldIdLst>
   <p:sldSz cx="12192000" cy="6858000"/>
   <p:notesSz cx="6858000" cy="9144000"/>
@@ -138,6 +142,859 @@
     </p:ext>
   </p:extLst>
 </p:presentation>
+</file>
+
+<file path=ppt/notesMasters/notesMaster1.xml><?xml version="1.0" encoding="utf-8"?>
+<p:notesMaster xmlns:a="http://schemas.openxmlformats.org/drawingml/2006/main" xmlns:r="http://schemas.openxmlformats.org/officeDocument/2006/relationships" xmlns:p="http://schemas.openxmlformats.org/presentationml/2006/main">
+  <p:cSld>
+    <p:bg>
+      <p:bgRef idx="1001">
+        <a:schemeClr val="bg1"/>
+      </p:bgRef>
+    </p:bg>
+    <p:spTree>
+      <p:nvGrpSpPr>
+        <p:cNvPr id="1" name=""/>
+        <p:cNvGrpSpPr/>
+        <p:nvPr/>
+      </p:nvGrpSpPr>
+      <p:grpSpPr>
+        <a:xfrm>
+          <a:off x="0" y="0"/>
+          <a:ext cx="0" cy="0"/>
+          <a:chOff x="0" y="0"/>
+          <a:chExt cx="0" cy="0"/>
+        </a:xfrm>
+      </p:grpSpPr>
+      <p:sp>
+        <p:nvSpPr>
+          <p:cNvPr id="2" name="Header Placeholder 1"/>
+          <p:cNvSpPr>
+            <a:spLocks noGrp="1"/>
+          </p:cNvSpPr>
+          <p:nvPr>
+            <p:ph type="hdr" sz="quarter"/>
+          </p:nvPr>
+        </p:nvSpPr>
+        <p:spPr>
+          <a:xfrm>
+            <a:off x="0" y="0"/>
+            <a:ext cx="2971800" cy="458788"/>
+          </a:xfrm>
+          <a:prstGeom prst="rect">
+            <a:avLst/>
+          </a:prstGeom>
+        </p:spPr>
+        <p:txBody>
+          <a:bodyPr vert="horz" lIns="91440" tIns="45720" rIns="91440" bIns="45720" rtlCol="0"/>
+          <a:lstStyle>
+            <a:lvl1pPr algn="l">
+              <a:defRPr sz="1200"/>
+            </a:lvl1pPr>
+          </a:lstStyle>
+          <a:p>
+            <a:endParaRPr lang="en-US"/>
+          </a:p>
+        </p:txBody>
+      </p:sp>
+      <p:sp>
+        <p:nvSpPr>
+          <p:cNvPr id="3" name="Date Placeholder 2"/>
+          <p:cNvSpPr>
+            <a:spLocks noGrp="1"/>
+          </p:cNvSpPr>
+          <p:nvPr>
+            <p:ph type="dt" idx="1"/>
+          </p:nvPr>
+        </p:nvSpPr>
+        <p:spPr>
+          <a:xfrm>
+            <a:off x="3884613" y="0"/>
+            <a:ext cx="2971800" cy="458788"/>
+          </a:xfrm>
+          <a:prstGeom prst="rect">
+            <a:avLst/>
+          </a:prstGeom>
+        </p:spPr>
+        <p:txBody>
+          <a:bodyPr vert="horz" lIns="91440" tIns="45720" rIns="91440" bIns="45720" rtlCol="0"/>
+          <a:lstStyle>
+            <a:lvl1pPr algn="r">
+              <a:defRPr sz="1200"/>
+            </a:lvl1pPr>
+          </a:lstStyle>
+          <a:p>
+            <a:fld id="{728A2E8A-9BD1-4D43-AE04-8A2C74ED08A0}" type="datetimeFigureOut">
+              <a:rPr lang="en-US" smtClean="0"/>
+              <a:t>3/24/19</a:t>
+            </a:fld>
+            <a:endParaRPr lang="en-US"/>
+          </a:p>
+        </p:txBody>
+      </p:sp>
+      <p:sp>
+        <p:nvSpPr>
+          <p:cNvPr id="4" name="Slide Image Placeholder 3"/>
+          <p:cNvSpPr>
+            <a:spLocks noGrp="1" noRot="1" noChangeAspect="1"/>
+          </p:cNvSpPr>
+          <p:nvPr>
+            <p:ph type="sldImg" idx="2"/>
+          </p:nvPr>
+        </p:nvSpPr>
+        <p:spPr>
+          <a:xfrm>
+            <a:off x="685800" y="1143000"/>
+            <a:ext cx="5486400" cy="3086100"/>
+          </a:xfrm>
+          <a:prstGeom prst="rect">
+            <a:avLst/>
+          </a:prstGeom>
+          <a:noFill/>
+          <a:ln w="12700">
+            <a:solidFill>
+              <a:prstClr val="black"/>
+            </a:solidFill>
+          </a:ln>
+        </p:spPr>
+        <p:txBody>
+          <a:bodyPr vert="horz" lIns="91440" tIns="45720" rIns="91440" bIns="45720" rtlCol="0" anchor="ctr"/>
+          <a:lstStyle/>
+          <a:p>
+            <a:endParaRPr lang="en-US"/>
+          </a:p>
+        </p:txBody>
+      </p:sp>
+      <p:sp>
+        <p:nvSpPr>
+          <p:cNvPr id="5" name="Notes Placeholder 4"/>
+          <p:cNvSpPr>
+            <a:spLocks noGrp="1"/>
+          </p:cNvSpPr>
+          <p:nvPr>
+            <p:ph type="body" sz="quarter" idx="3"/>
+          </p:nvPr>
+        </p:nvSpPr>
+        <p:spPr>
+          <a:xfrm>
+            <a:off x="685800" y="4400550"/>
+            <a:ext cx="5486400" cy="3600450"/>
+          </a:xfrm>
+          <a:prstGeom prst="rect">
+            <a:avLst/>
+          </a:prstGeom>
+        </p:spPr>
+        <p:txBody>
+          <a:bodyPr vert="horz" lIns="91440" tIns="45720" rIns="91440" bIns="45720" rtlCol="0"/>
+          <a:lstStyle/>
+          <a:p>
+            <a:pPr lvl="0"/>
+            <a:r>
+              <a:rPr lang="en-US"/>
+              <a:t>Click to edit Master text styles</a:t>
+            </a:r>
+          </a:p>
+          <a:p>
+            <a:pPr lvl="1"/>
+            <a:r>
+              <a:rPr lang="en-US"/>
+              <a:t>Second level</a:t>
+            </a:r>
+          </a:p>
+          <a:p>
+            <a:pPr lvl="2"/>
+            <a:r>
+              <a:rPr lang="en-US"/>
+              <a:t>Third level</a:t>
+            </a:r>
+          </a:p>
+          <a:p>
+            <a:pPr lvl="3"/>
+            <a:r>
+              <a:rPr lang="en-US"/>
+              <a:t>Fourth level</a:t>
+            </a:r>
+          </a:p>
+          <a:p>
+            <a:pPr lvl="4"/>
+            <a:r>
+              <a:rPr lang="en-US"/>
+              <a:t>Fifth level</a:t>
+            </a:r>
+          </a:p>
+        </p:txBody>
+      </p:sp>
+      <p:sp>
+        <p:nvSpPr>
+          <p:cNvPr id="6" name="Footer Placeholder 5"/>
+          <p:cNvSpPr>
+            <a:spLocks noGrp="1"/>
+          </p:cNvSpPr>
+          <p:nvPr>
+            <p:ph type="ftr" sz="quarter" idx="4"/>
+          </p:nvPr>
+        </p:nvSpPr>
+        <p:spPr>
+          <a:xfrm>
+            <a:off x="0" y="8685213"/>
+            <a:ext cx="2971800" cy="458787"/>
+          </a:xfrm>
+          <a:prstGeom prst="rect">
+            <a:avLst/>
+          </a:prstGeom>
+        </p:spPr>
+        <p:txBody>
+          <a:bodyPr vert="horz" lIns="91440" tIns="45720" rIns="91440" bIns="45720" rtlCol="0" anchor="b"/>
+          <a:lstStyle>
+            <a:lvl1pPr algn="l">
+              <a:defRPr sz="1200"/>
+            </a:lvl1pPr>
+          </a:lstStyle>
+          <a:p>
+            <a:endParaRPr lang="en-US"/>
+          </a:p>
+        </p:txBody>
+      </p:sp>
+      <p:sp>
+        <p:nvSpPr>
+          <p:cNvPr id="7" name="Slide Number Placeholder 6"/>
+          <p:cNvSpPr>
+            <a:spLocks noGrp="1"/>
+          </p:cNvSpPr>
+          <p:nvPr>
+            <p:ph type="sldNum" sz="quarter" idx="5"/>
+          </p:nvPr>
+        </p:nvSpPr>
+        <p:spPr>
+          <a:xfrm>
+            <a:off x="3884613" y="8685213"/>
+            <a:ext cx="2971800" cy="458787"/>
+          </a:xfrm>
+          <a:prstGeom prst="rect">
+            <a:avLst/>
+          </a:prstGeom>
+        </p:spPr>
+        <p:txBody>
+          <a:bodyPr vert="horz" lIns="91440" tIns="45720" rIns="91440" bIns="45720" rtlCol="0" anchor="b"/>
+          <a:lstStyle>
+            <a:lvl1pPr algn="r">
+              <a:defRPr sz="1200"/>
+            </a:lvl1pPr>
+          </a:lstStyle>
+          <a:p>
+            <a:fld id="{1BA40016-3836-F54E-B8D5-7EE3D91AD907}" type="slidenum">
+              <a:rPr lang="en-US" smtClean="0"/>
+              <a:t>‹#›</a:t>
+            </a:fld>
+            <a:endParaRPr lang="en-US"/>
+          </a:p>
+        </p:txBody>
+      </p:sp>
+    </p:spTree>
+    <p:extLst>
+      <p:ext uri="{BB962C8B-B14F-4D97-AF65-F5344CB8AC3E}">
+        <p14:creationId xmlns:p14="http://schemas.microsoft.com/office/powerpoint/2010/main" val="1882137954"/>
+      </p:ext>
+    </p:extLst>
+  </p:cSld>
+  <p:clrMap bg1="lt1" tx1="dk1" bg2="lt2" tx2="dk2" accent1="accent1" accent2="accent2" accent3="accent3" accent4="accent4" accent5="accent5" accent6="accent6" hlink="hlink" folHlink="folHlink"/>
+  <p:notesStyle>
+    <a:lvl1pPr marL="0" algn="l" defTabSz="914400" rtl="0" eaLnBrk="1" latinLnBrk="0" hangingPunct="1">
+      <a:defRPr sz="1200" kern="1200">
+        <a:solidFill>
+          <a:schemeClr val="tx1"/>
+        </a:solidFill>
+        <a:latin typeface="+mn-lt"/>
+        <a:ea typeface="+mn-ea"/>
+        <a:cs typeface="+mn-cs"/>
+      </a:defRPr>
+    </a:lvl1pPr>
+    <a:lvl2pPr marL="457200" algn="l" defTabSz="914400" rtl="0" eaLnBrk="1" latinLnBrk="0" hangingPunct="1">
+      <a:defRPr sz="1200" kern="1200">
+        <a:solidFill>
+          <a:schemeClr val="tx1"/>
+        </a:solidFill>
+        <a:latin typeface="+mn-lt"/>
+        <a:ea typeface="+mn-ea"/>
+        <a:cs typeface="+mn-cs"/>
+      </a:defRPr>
+    </a:lvl2pPr>
+    <a:lvl3pPr marL="914400" algn="l" defTabSz="914400" rtl="0" eaLnBrk="1" latinLnBrk="0" hangingPunct="1">
+      <a:defRPr sz="1200" kern="1200">
+        <a:solidFill>
+          <a:schemeClr val="tx1"/>
+        </a:solidFill>
+        <a:latin typeface="+mn-lt"/>
+        <a:ea typeface="+mn-ea"/>
+        <a:cs typeface="+mn-cs"/>
+      </a:defRPr>
+    </a:lvl3pPr>
+    <a:lvl4pPr marL="1371600" algn="l" defTabSz="914400" rtl="0" eaLnBrk="1" latinLnBrk="0" hangingPunct="1">
+      <a:defRPr sz="1200" kern="1200">
+        <a:solidFill>
+          <a:schemeClr val="tx1"/>
+        </a:solidFill>
+        <a:latin typeface="+mn-lt"/>
+        <a:ea typeface="+mn-ea"/>
+        <a:cs typeface="+mn-cs"/>
+      </a:defRPr>
+    </a:lvl4pPr>
+    <a:lvl5pPr marL="1828800" algn="l" defTabSz="914400" rtl="0" eaLnBrk="1" latinLnBrk="0" hangingPunct="1">
+      <a:defRPr sz="1200" kern="1200">
+        <a:solidFill>
+          <a:schemeClr val="tx1"/>
+        </a:solidFill>
+        <a:latin typeface="+mn-lt"/>
+        <a:ea typeface="+mn-ea"/>
+        <a:cs typeface="+mn-cs"/>
+      </a:defRPr>
+    </a:lvl5pPr>
+    <a:lvl6pPr marL="2286000" algn="l" defTabSz="914400" rtl="0" eaLnBrk="1" latinLnBrk="0" hangingPunct="1">
+      <a:defRPr sz="1200" kern="1200">
+        <a:solidFill>
+          <a:schemeClr val="tx1"/>
+        </a:solidFill>
+        <a:latin typeface="+mn-lt"/>
+        <a:ea typeface="+mn-ea"/>
+        <a:cs typeface="+mn-cs"/>
+      </a:defRPr>
+    </a:lvl6pPr>
+    <a:lvl7pPr marL="2743200" algn="l" defTabSz="914400" rtl="0" eaLnBrk="1" latinLnBrk="0" hangingPunct="1">
+      <a:defRPr sz="1200" kern="1200">
+        <a:solidFill>
+          <a:schemeClr val="tx1"/>
+        </a:solidFill>
+        <a:latin typeface="+mn-lt"/>
+        <a:ea typeface="+mn-ea"/>
+        <a:cs typeface="+mn-cs"/>
+      </a:defRPr>
+    </a:lvl7pPr>
+    <a:lvl8pPr marL="3200400" algn="l" defTabSz="914400" rtl="0" eaLnBrk="1" latinLnBrk="0" hangingPunct="1">
+      <a:defRPr sz="1200" kern="1200">
+        <a:solidFill>
+          <a:schemeClr val="tx1"/>
+        </a:solidFill>
+        <a:latin typeface="+mn-lt"/>
+        <a:ea typeface="+mn-ea"/>
+        <a:cs typeface="+mn-cs"/>
+      </a:defRPr>
+    </a:lvl8pPr>
+    <a:lvl9pPr marL="3657600" algn="l" defTabSz="914400" rtl="0" eaLnBrk="1" latinLnBrk="0" hangingPunct="1">
+      <a:defRPr sz="1200" kern="1200">
+        <a:solidFill>
+          <a:schemeClr val="tx1"/>
+        </a:solidFill>
+        <a:latin typeface="+mn-lt"/>
+        <a:ea typeface="+mn-ea"/>
+        <a:cs typeface="+mn-cs"/>
+      </a:defRPr>
+    </a:lvl9pPr>
+  </p:notesStyle>
+</p:notesMaster>
+</file>
+
+<file path=ppt/notesSlides/notesSlide1.xml><?xml version="1.0" encoding="utf-8"?>
+<p:notes xmlns:a="http://schemas.openxmlformats.org/drawingml/2006/main" xmlns:r="http://schemas.openxmlformats.org/officeDocument/2006/relationships" xmlns:p="http://schemas.openxmlformats.org/presentationml/2006/main">
+  <p:cSld>
+    <p:spTree>
+      <p:nvGrpSpPr>
+        <p:cNvPr id="1" name=""/>
+        <p:cNvGrpSpPr/>
+        <p:nvPr/>
+      </p:nvGrpSpPr>
+      <p:grpSpPr>
+        <a:xfrm>
+          <a:off x="0" y="0"/>
+          <a:ext cx="0" cy="0"/>
+          <a:chOff x="0" y="0"/>
+          <a:chExt cx="0" cy="0"/>
+        </a:xfrm>
+      </p:grpSpPr>
+      <p:sp>
+        <p:nvSpPr>
+          <p:cNvPr id="2" name="Slide Image Placeholder 1"/>
+          <p:cNvSpPr>
+            <a:spLocks noGrp="1" noRot="1" noChangeAspect="1"/>
+          </p:cNvSpPr>
+          <p:nvPr>
+            <p:ph type="sldImg"/>
+          </p:nvPr>
+        </p:nvSpPr>
+        <p:spPr/>
+      </p:sp>
+      <p:sp>
+        <p:nvSpPr>
+          <p:cNvPr id="3" name="Notes Placeholder 2"/>
+          <p:cNvSpPr>
+            <a:spLocks noGrp="1"/>
+          </p:cNvSpPr>
+          <p:nvPr>
+            <p:ph type="body" idx="1"/>
+          </p:nvPr>
+        </p:nvSpPr>
+        <p:spPr/>
+        <p:txBody>
+          <a:bodyPr/>
+          <a:lstStyle/>
+          <a:p>
+            <a:endParaRPr lang="en-US"/>
+          </a:p>
+        </p:txBody>
+      </p:sp>
+      <p:sp>
+        <p:nvSpPr>
+          <p:cNvPr id="4" name="Slide Number Placeholder 3"/>
+          <p:cNvSpPr>
+            <a:spLocks noGrp="1"/>
+          </p:cNvSpPr>
+          <p:nvPr>
+            <p:ph type="sldNum" sz="quarter" idx="5"/>
+          </p:nvPr>
+        </p:nvSpPr>
+        <p:spPr/>
+        <p:txBody>
+          <a:bodyPr/>
+          <a:lstStyle/>
+          <a:p>
+            <a:fld id="{1BA40016-3836-F54E-B8D5-7EE3D91AD907}" type="slidenum">
+              <a:rPr lang="en-US" smtClean="0"/>
+              <a:t>8</a:t>
+            </a:fld>
+            <a:endParaRPr lang="en-US"/>
+          </a:p>
+        </p:txBody>
+      </p:sp>
+    </p:spTree>
+    <p:extLst>
+      <p:ext uri="{BB962C8B-B14F-4D97-AF65-F5344CB8AC3E}">
+        <p14:creationId xmlns:p14="http://schemas.microsoft.com/office/powerpoint/2010/main" val="1043640188"/>
+      </p:ext>
+    </p:extLst>
+  </p:cSld>
+  <p:clrMapOvr>
+    <a:masterClrMapping/>
+  </p:clrMapOvr>
+</p:notes>
+</file>
+
+<file path=ppt/notesSlides/notesSlide2.xml><?xml version="1.0" encoding="utf-8"?>
+<p:notes xmlns:a="http://schemas.openxmlformats.org/drawingml/2006/main" xmlns:r="http://schemas.openxmlformats.org/officeDocument/2006/relationships" xmlns:p="http://schemas.openxmlformats.org/presentationml/2006/main">
+  <p:cSld>
+    <p:spTree>
+      <p:nvGrpSpPr>
+        <p:cNvPr id="1" name=""/>
+        <p:cNvGrpSpPr/>
+        <p:nvPr/>
+      </p:nvGrpSpPr>
+      <p:grpSpPr>
+        <a:xfrm>
+          <a:off x="0" y="0"/>
+          <a:ext cx="0" cy="0"/>
+          <a:chOff x="0" y="0"/>
+          <a:chExt cx="0" cy="0"/>
+        </a:xfrm>
+      </p:grpSpPr>
+      <p:sp>
+        <p:nvSpPr>
+          <p:cNvPr id="2" name="Slide Image Placeholder 1"/>
+          <p:cNvSpPr>
+            <a:spLocks noGrp="1" noRot="1" noChangeAspect="1"/>
+          </p:cNvSpPr>
+          <p:nvPr>
+            <p:ph type="sldImg"/>
+          </p:nvPr>
+        </p:nvSpPr>
+        <p:spPr/>
+      </p:sp>
+      <p:sp>
+        <p:nvSpPr>
+          <p:cNvPr id="3" name="Notes Placeholder 2"/>
+          <p:cNvSpPr>
+            <a:spLocks noGrp="1"/>
+          </p:cNvSpPr>
+          <p:nvPr>
+            <p:ph type="body" idx="1"/>
+          </p:nvPr>
+        </p:nvSpPr>
+        <p:spPr/>
+        <p:txBody>
+          <a:bodyPr/>
+          <a:lstStyle/>
+          <a:p>
+            <a:endParaRPr lang="en-US"/>
+          </a:p>
+        </p:txBody>
+      </p:sp>
+      <p:sp>
+        <p:nvSpPr>
+          <p:cNvPr id="4" name="Slide Number Placeholder 3"/>
+          <p:cNvSpPr>
+            <a:spLocks noGrp="1"/>
+          </p:cNvSpPr>
+          <p:nvPr>
+            <p:ph type="sldNum" sz="quarter" idx="5"/>
+          </p:nvPr>
+        </p:nvSpPr>
+        <p:spPr/>
+        <p:txBody>
+          <a:bodyPr/>
+          <a:lstStyle/>
+          <a:p>
+            <a:fld id="{1BA40016-3836-F54E-B8D5-7EE3D91AD907}" type="slidenum">
+              <a:rPr lang="en-US" smtClean="0"/>
+              <a:t>9</a:t>
+            </a:fld>
+            <a:endParaRPr lang="en-US"/>
+          </a:p>
+        </p:txBody>
+      </p:sp>
+    </p:spTree>
+    <p:extLst>
+      <p:ext uri="{BB962C8B-B14F-4D97-AF65-F5344CB8AC3E}">
+        <p14:creationId xmlns:p14="http://schemas.microsoft.com/office/powerpoint/2010/main" val="848721823"/>
+      </p:ext>
+    </p:extLst>
+  </p:cSld>
+  <p:clrMapOvr>
+    <a:masterClrMapping/>
+  </p:clrMapOvr>
+</p:notes>
+</file>
+
+<file path=ppt/notesSlides/notesSlide3.xml><?xml version="1.0" encoding="utf-8"?>
+<p:notes xmlns:a="http://schemas.openxmlformats.org/drawingml/2006/main" xmlns:r="http://schemas.openxmlformats.org/officeDocument/2006/relationships" xmlns:p="http://schemas.openxmlformats.org/presentationml/2006/main">
+  <p:cSld>
+    <p:spTree>
+      <p:nvGrpSpPr>
+        <p:cNvPr id="1" name=""/>
+        <p:cNvGrpSpPr/>
+        <p:nvPr/>
+      </p:nvGrpSpPr>
+      <p:grpSpPr>
+        <a:xfrm>
+          <a:off x="0" y="0"/>
+          <a:ext cx="0" cy="0"/>
+          <a:chOff x="0" y="0"/>
+          <a:chExt cx="0" cy="0"/>
+        </a:xfrm>
+      </p:grpSpPr>
+      <p:sp>
+        <p:nvSpPr>
+          <p:cNvPr id="2" name="Slide Image Placeholder 1"/>
+          <p:cNvSpPr>
+            <a:spLocks noGrp="1" noRot="1" noChangeAspect="1"/>
+          </p:cNvSpPr>
+          <p:nvPr>
+            <p:ph type="sldImg"/>
+          </p:nvPr>
+        </p:nvSpPr>
+        <p:spPr/>
+      </p:sp>
+      <p:sp>
+        <p:nvSpPr>
+          <p:cNvPr id="3" name="Notes Placeholder 2"/>
+          <p:cNvSpPr>
+            <a:spLocks noGrp="1"/>
+          </p:cNvSpPr>
+          <p:nvPr>
+            <p:ph type="body" idx="1"/>
+          </p:nvPr>
+        </p:nvSpPr>
+        <p:spPr/>
+        <p:txBody>
+          <a:bodyPr/>
+          <a:lstStyle/>
+          <a:p>
+            <a:endParaRPr lang="en-US"/>
+          </a:p>
+        </p:txBody>
+      </p:sp>
+      <p:sp>
+        <p:nvSpPr>
+          <p:cNvPr id="4" name="Slide Number Placeholder 3"/>
+          <p:cNvSpPr>
+            <a:spLocks noGrp="1"/>
+          </p:cNvSpPr>
+          <p:nvPr>
+            <p:ph type="sldNum" sz="quarter" idx="5"/>
+          </p:nvPr>
+        </p:nvSpPr>
+        <p:spPr/>
+        <p:txBody>
+          <a:bodyPr/>
+          <a:lstStyle/>
+          <a:p>
+            <a:fld id="{1BA40016-3836-F54E-B8D5-7EE3D91AD907}" type="slidenum">
+              <a:rPr lang="en-US" smtClean="0"/>
+              <a:t>10</a:t>
+            </a:fld>
+            <a:endParaRPr lang="en-US"/>
+          </a:p>
+        </p:txBody>
+      </p:sp>
+    </p:spTree>
+    <p:extLst>
+      <p:ext uri="{BB962C8B-B14F-4D97-AF65-F5344CB8AC3E}">
+        <p14:creationId xmlns:p14="http://schemas.microsoft.com/office/powerpoint/2010/main" val="1120791602"/>
+      </p:ext>
+    </p:extLst>
+  </p:cSld>
+  <p:clrMapOvr>
+    <a:masterClrMapping/>
+  </p:clrMapOvr>
+</p:notes>
+</file>
+
+<file path=ppt/notesSlides/notesSlide4.xml><?xml version="1.0" encoding="utf-8"?>
+<p:notes xmlns:a="http://schemas.openxmlformats.org/drawingml/2006/main" xmlns:r="http://schemas.openxmlformats.org/officeDocument/2006/relationships" xmlns:p="http://schemas.openxmlformats.org/presentationml/2006/main">
+  <p:cSld>
+    <p:spTree>
+      <p:nvGrpSpPr>
+        <p:cNvPr id="1" name=""/>
+        <p:cNvGrpSpPr/>
+        <p:nvPr/>
+      </p:nvGrpSpPr>
+      <p:grpSpPr>
+        <a:xfrm>
+          <a:off x="0" y="0"/>
+          <a:ext cx="0" cy="0"/>
+          <a:chOff x="0" y="0"/>
+          <a:chExt cx="0" cy="0"/>
+        </a:xfrm>
+      </p:grpSpPr>
+      <p:sp>
+        <p:nvSpPr>
+          <p:cNvPr id="2" name="Slide Image Placeholder 1"/>
+          <p:cNvSpPr>
+            <a:spLocks noGrp="1" noRot="1" noChangeAspect="1"/>
+          </p:cNvSpPr>
+          <p:nvPr>
+            <p:ph type="sldImg"/>
+          </p:nvPr>
+        </p:nvSpPr>
+        <p:spPr/>
+      </p:sp>
+      <p:sp>
+        <p:nvSpPr>
+          <p:cNvPr id="3" name="Notes Placeholder 2"/>
+          <p:cNvSpPr>
+            <a:spLocks noGrp="1"/>
+          </p:cNvSpPr>
+          <p:nvPr>
+            <p:ph type="body" idx="1"/>
+          </p:nvPr>
+        </p:nvSpPr>
+        <p:spPr/>
+        <p:txBody>
+          <a:bodyPr/>
+          <a:lstStyle/>
+          <a:p>
+            <a:endParaRPr lang="en-US"/>
+          </a:p>
+        </p:txBody>
+      </p:sp>
+      <p:sp>
+        <p:nvSpPr>
+          <p:cNvPr id="4" name="Slide Number Placeholder 3"/>
+          <p:cNvSpPr>
+            <a:spLocks noGrp="1"/>
+          </p:cNvSpPr>
+          <p:nvPr>
+            <p:ph type="sldNum" sz="quarter" idx="5"/>
+          </p:nvPr>
+        </p:nvSpPr>
+        <p:spPr/>
+        <p:txBody>
+          <a:bodyPr/>
+          <a:lstStyle/>
+          <a:p>
+            <a:fld id="{1BA40016-3836-F54E-B8D5-7EE3D91AD907}" type="slidenum">
+              <a:rPr lang="en-US" smtClean="0"/>
+              <a:t>11</a:t>
+            </a:fld>
+            <a:endParaRPr lang="en-US"/>
+          </a:p>
+        </p:txBody>
+      </p:sp>
+    </p:spTree>
+    <p:extLst>
+      <p:ext uri="{BB962C8B-B14F-4D97-AF65-F5344CB8AC3E}">
+        <p14:creationId xmlns:p14="http://schemas.microsoft.com/office/powerpoint/2010/main" val="1414380554"/>
+      </p:ext>
+    </p:extLst>
+  </p:cSld>
+  <p:clrMapOvr>
+    <a:masterClrMapping/>
+  </p:clrMapOvr>
+</p:notes>
+</file>
+
+<file path=ppt/notesSlides/notesSlide5.xml><?xml version="1.0" encoding="utf-8"?>
+<p:notes xmlns:a="http://schemas.openxmlformats.org/drawingml/2006/main" xmlns:r="http://schemas.openxmlformats.org/officeDocument/2006/relationships" xmlns:p="http://schemas.openxmlformats.org/presentationml/2006/main">
+  <p:cSld>
+    <p:spTree>
+      <p:nvGrpSpPr>
+        <p:cNvPr id="1" name=""/>
+        <p:cNvGrpSpPr/>
+        <p:nvPr/>
+      </p:nvGrpSpPr>
+      <p:grpSpPr>
+        <a:xfrm>
+          <a:off x="0" y="0"/>
+          <a:ext cx="0" cy="0"/>
+          <a:chOff x="0" y="0"/>
+          <a:chExt cx="0" cy="0"/>
+        </a:xfrm>
+      </p:grpSpPr>
+      <p:sp>
+        <p:nvSpPr>
+          <p:cNvPr id="2" name="Slide Image Placeholder 1"/>
+          <p:cNvSpPr>
+            <a:spLocks noGrp="1" noRot="1" noChangeAspect="1"/>
+          </p:cNvSpPr>
+          <p:nvPr>
+            <p:ph type="sldImg"/>
+          </p:nvPr>
+        </p:nvSpPr>
+        <p:spPr/>
+      </p:sp>
+      <p:sp>
+        <p:nvSpPr>
+          <p:cNvPr id="3" name="Notes Placeholder 2"/>
+          <p:cNvSpPr>
+            <a:spLocks noGrp="1"/>
+          </p:cNvSpPr>
+          <p:nvPr>
+            <p:ph type="body" idx="1"/>
+          </p:nvPr>
+        </p:nvSpPr>
+        <p:spPr/>
+        <p:txBody>
+          <a:bodyPr/>
+          <a:lstStyle/>
+          <a:p>
+            <a:endParaRPr lang="en-US"/>
+          </a:p>
+        </p:txBody>
+      </p:sp>
+      <p:sp>
+        <p:nvSpPr>
+          <p:cNvPr id="4" name="Slide Number Placeholder 3"/>
+          <p:cNvSpPr>
+            <a:spLocks noGrp="1"/>
+          </p:cNvSpPr>
+          <p:nvPr>
+            <p:ph type="sldNum" sz="quarter" idx="5"/>
+          </p:nvPr>
+        </p:nvSpPr>
+        <p:spPr/>
+        <p:txBody>
+          <a:bodyPr/>
+          <a:lstStyle/>
+          <a:p>
+            <a:fld id="{1BA40016-3836-F54E-B8D5-7EE3D91AD907}" type="slidenum">
+              <a:rPr lang="en-US" smtClean="0"/>
+              <a:t>12</a:t>
+            </a:fld>
+            <a:endParaRPr lang="en-US"/>
+          </a:p>
+        </p:txBody>
+      </p:sp>
+    </p:spTree>
+    <p:extLst>
+      <p:ext uri="{BB962C8B-B14F-4D97-AF65-F5344CB8AC3E}">
+        <p14:creationId xmlns:p14="http://schemas.microsoft.com/office/powerpoint/2010/main" val="4244404705"/>
+      </p:ext>
+    </p:extLst>
+  </p:cSld>
+  <p:clrMapOvr>
+    <a:masterClrMapping/>
+  </p:clrMapOvr>
+</p:notes>
+</file>
+
+<file path=ppt/notesSlides/notesSlide6.xml><?xml version="1.0" encoding="utf-8"?>
+<p:notes xmlns:a="http://schemas.openxmlformats.org/drawingml/2006/main" xmlns:r="http://schemas.openxmlformats.org/officeDocument/2006/relationships" xmlns:p="http://schemas.openxmlformats.org/presentationml/2006/main">
+  <p:cSld>
+    <p:spTree>
+      <p:nvGrpSpPr>
+        <p:cNvPr id="1" name=""/>
+        <p:cNvGrpSpPr/>
+        <p:nvPr/>
+      </p:nvGrpSpPr>
+      <p:grpSpPr>
+        <a:xfrm>
+          <a:off x="0" y="0"/>
+          <a:ext cx="0" cy="0"/>
+          <a:chOff x="0" y="0"/>
+          <a:chExt cx="0" cy="0"/>
+        </a:xfrm>
+      </p:grpSpPr>
+      <p:sp>
+        <p:nvSpPr>
+          <p:cNvPr id="2" name="Slide Image Placeholder 1"/>
+          <p:cNvSpPr>
+            <a:spLocks noGrp="1" noRot="1" noChangeAspect="1"/>
+          </p:cNvSpPr>
+          <p:nvPr>
+            <p:ph type="sldImg"/>
+          </p:nvPr>
+        </p:nvSpPr>
+        <p:spPr/>
+      </p:sp>
+      <p:sp>
+        <p:nvSpPr>
+          <p:cNvPr id="3" name="Notes Placeholder 2"/>
+          <p:cNvSpPr>
+            <a:spLocks noGrp="1"/>
+          </p:cNvSpPr>
+          <p:nvPr>
+            <p:ph type="body" idx="1"/>
+          </p:nvPr>
+        </p:nvSpPr>
+        <p:spPr/>
+        <p:txBody>
+          <a:bodyPr/>
+          <a:lstStyle/>
+          <a:p>
+            <a:endParaRPr lang="en-US"/>
+          </a:p>
+        </p:txBody>
+      </p:sp>
+      <p:sp>
+        <p:nvSpPr>
+          <p:cNvPr id="4" name="Slide Number Placeholder 3"/>
+          <p:cNvSpPr>
+            <a:spLocks noGrp="1"/>
+          </p:cNvSpPr>
+          <p:nvPr>
+            <p:ph type="sldNum" sz="quarter" idx="5"/>
+          </p:nvPr>
+        </p:nvSpPr>
+        <p:spPr/>
+        <p:txBody>
+          <a:bodyPr/>
+          <a:lstStyle/>
+          <a:p>
+            <a:fld id="{1BA40016-3836-F54E-B8D5-7EE3D91AD907}" type="slidenum">
+              <a:rPr lang="en-US" smtClean="0"/>
+              <a:t>13</a:t>
+            </a:fld>
+            <a:endParaRPr lang="en-US"/>
+          </a:p>
+        </p:txBody>
+      </p:sp>
+    </p:spTree>
+    <p:extLst>
+      <p:ext uri="{BB962C8B-B14F-4D97-AF65-F5344CB8AC3E}">
+        <p14:creationId xmlns:p14="http://schemas.microsoft.com/office/powerpoint/2010/main" val="8614936"/>
+      </p:ext>
+    </p:extLst>
+  </p:cSld>
+  <p:clrMapOvr>
+    <a:masterClrMapping/>
+  </p:clrMapOvr>
+</p:notes>
 </file>
 
 <file path=ppt/slideLayouts/slideLayout1.xml><?xml version="1.0" encoding="utf-8"?>
@@ -3371,22 +4228,14 @@
           <a:p>
             <a:r>
               <a:rPr lang="en-US" dirty="0"/>
-              <a:t>Introduction To </a:t>
-            </a:r>
-            <a:r>
-              <a:rPr lang="en-US"/>
-              <a:t>Eagle </a:t>
+              <a:t>Introduction To Eagle </a:t>
             </a:r>
             <a:br>
-              <a:rPr lang="en-US"/>
+              <a:rPr lang="en-US" dirty="0"/>
             </a:br>
             <a:r>
-              <a:rPr lang="en-US"/>
-              <a:t>(</a:t>
-            </a:r>
-            <a:r>
               <a:rPr lang="en-US" dirty="0"/>
-              <a:t>and PCBs)</a:t>
+              <a:t>(and PCBs)</a:t>
             </a:r>
           </a:p>
         </p:txBody>
@@ -3472,13 +4321,7 @@
       </p:grpSpPr>
       <p:sp>
         <p:nvSpPr>
-          <p:cNvPr id="2" name="Title 1">
-            <a:extLst>
-              <a:ext uri="{FF2B5EF4-FFF2-40B4-BE49-F238E27FC236}">
-                <a16:creationId xmlns:a16="http://schemas.microsoft.com/office/drawing/2014/main" id="{10EF42EE-C498-784B-8F84-4B24F62B1B93}"/>
-              </a:ext>
-            </a:extLst>
-          </p:cNvPr>
+          <p:cNvPr id="2" name="Title 1"/>
           <p:cNvSpPr>
             <a:spLocks noGrp="1"/>
           </p:cNvSpPr>
@@ -3492,21 +4335,24 @@
           <a:lstStyle/>
           <a:p>
             <a:r>
+              <a:rPr lang="en-US" dirty="0" err="1"/>
+              <a:t>Throughholes</a:t>
+            </a:r>
+            <a:r>
               <a:rPr lang="en-US" dirty="0"/>
-              <a:t>Surface Mount Devices (SMD)</a:t>
-            </a:r>
+              <a:t> and </a:t>
+            </a:r>
+            <a:r>
+              <a:rPr lang="en-US" dirty="0" err="1"/>
+              <a:t>Vias</a:t>
+            </a:r>
+            <a:endParaRPr lang="en-US" dirty="0"/>
           </a:p>
         </p:txBody>
       </p:sp>
       <p:sp>
         <p:nvSpPr>
-          <p:cNvPr id="8" name="Content Placeholder 7">
-            <a:extLst>
-              <a:ext uri="{FF2B5EF4-FFF2-40B4-BE49-F238E27FC236}">
-                <a16:creationId xmlns:a16="http://schemas.microsoft.com/office/drawing/2014/main" id="{F915F3D4-FBAC-2E42-8724-FB97787DD230}"/>
-              </a:ext>
-            </a:extLst>
-          </p:cNvPr>
+          <p:cNvPr id="3" name="Content Placeholder 2"/>
           <p:cNvSpPr>
             <a:spLocks noGrp="1"/>
           </p:cNvSpPr>
@@ -3517,59 +4363,92 @@
         <p:spPr/>
         <p:txBody>
           <a:bodyPr>
-            <a:normAutofit/>
+            <a:normAutofit fontScale="92500" lnSpcReduction="10000"/>
           </a:bodyPr>
           <a:lstStyle/>
           <a:p>
             <a:r>
               <a:rPr lang="en-US" dirty="0"/>
-              <a:t>No drill required</a:t>
-            </a:r>
-          </a:p>
-          <a:p>
+              <a:t>Through hole pads </a:t>
+            </a:r>
+          </a:p>
+          <a:p>
+            <a:pPr lvl="1"/>
             <a:r>
               <a:rPr lang="en-US" dirty="0"/>
-              <a:t>No pins</a:t>
-            </a:r>
-          </a:p>
-          <a:p>
+              <a:t>Mount devices with pins</a:t>
+            </a:r>
+          </a:p>
+          <a:p>
+            <a:pPr lvl="1"/>
             <a:r>
               <a:rPr lang="en-US" dirty="0"/>
-              <a:t>Smaller parts</a:t>
-            </a:r>
-          </a:p>
-          <a:p>
+              <a:t>Sized for the pin + solder</a:t>
+            </a:r>
+          </a:p>
+          <a:p>
+            <a:pPr lvl="1"/>
             <a:r>
               <a:rPr lang="en-US" dirty="0"/>
-              <a:t>Finer ‘pitch’ (pin-to-pin distance)</a:t>
-            </a:r>
-          </a:p>
-          <a:p>
+              <a:t>Always plated with non-oxidizing metal.</a:t>
+            </a:r>
+          </a:p>
+          <a:p>
+            <a:r>
+              <a:rPr lang="en-US" dirty="0" err="1"/>
+              <a:t>Vias</a:t>
+            </a:r>
             <a:r>
               <a:rPr lang="en-US" dirty="0"/>
-              <a:t>Parts on both sides</a:t>
-            </a:r>
-          </a:p>
-          <a:p>
+              <a:t> are electrical connections</a:t>
+            </a:r>
+          </a:p>
+          <a:p>
+            <a:pPr lvl="1"/>
             <a:r>
               <a:rPr lang="en-US" dirty="0"/>
-              <a:t>Easier automated placement</a:t>
+              <a:t>As small as possible</a:t>
             </a:r>
           </a:p>
           <a:p>
             <a:r>
               <a:rPr lang="en-US" dirty="0"/>
-              <a:t>Pitch &gt;= ~0.3 mm</a:t>
+              <a:t>Problems</a:t>
+            </a:r>
+          </a:p>
+          <a:p>
+            <a:pPr lvl="1"/>
+            <a:r>
+              <a:rPr lang="en-US" dirty="0"/>
+              <a:t>Takes up space in all layers</a:t>
+            </a:r>
+          </a:p>
+          <a:p>
+            <a:pPr lvl="1"/>
+            <a:r>
+              <a:rPr lang="en-US" dirty="0" err="1"/>
+              <a:t>Throughhole</a:t>
+            </a:r>
+            <a:r>
+              <a:rPr lang="en-US" dirty="0"/>
+              <a:t> pins are generally pretty big</a:t>
+            </a:r>
+          </a:p>
+          <a:p>
+            <a:pPr lvl="1"/>
+            <a:r>
+              <a:rPr lang="en-US" dirty="0"/>
+              <a:t>Pin-to-pin spacing &gt;= 1mm</a:t>
             </a:r>
           </a:p>
         </p:txBody>
       </p:sp>
       <p:pic>
         <p:nvPicPr>
-          <p:cNvPr id="13" name="Content Placeholder 12">
+          <p:cNvPr id="8" name="Content Placeholder 7">
             <a:extLst>
               <a:ext uri="{FF2B5EF4-FFF2-40B4-BE49-F238E27FC236}">
-                <a16:creationId xmlns:a16="http://schemas.microsoft.com/office/drawing/2014/main" id="{4A436E1D-297E-EF4B-A144-0688E7F3CF36}"/>
+                <a16:creationId xmlns:a16="http://schemas.microsoft.com/office/drawing/2014/main" id="{48B3F6BA-D1C2-FD42-BCA1-DB5A9B955A51}"/>
               </a:ext>
             </a:extLst>
           </p:cNvPr>
@@ -3581,15 +4460,15 @@
           </p:nvPr>
         </p:nvPicPr>
         <p:blipFill>
-          <a:blip r:embed="rId2"/>
+          <a:blip r:embed="rId3"/>
           <a:stretch>
             <a:fillRect/>
           </a:stretch>
         </p:blipFill>
         <p:spPr>
           <a:xfrm>
-            <a:off x="6172200" y="2755644"/>
-            <a:ext cx="4038600" cy="2215077"/>
+            <a:off x="6519675" y="1825625"/>
+            <a:ext cx="4486649" cy="4351338"/>
           </a:xfrm>
           <a:prstGeom prst="rect">
             <a:avLst/>
@@ -3599,7 +4478,7 @@
     </p:spTree>
     <p:extLst>
       <p:ext uri="{BB962C8B-B14F-4D97-AF65-F5344CB8AC3E}">
-        <p14:creationId xmlns:p14="http://schemas.microsoft.com/office/powerpoint/2010/main" val="484122908"/>
+        <p14:creationId xmlns:p14="http://schemas.microsoft.com/office/powerpoint/2010/main" val="4067957370"/>
       </p:ext>
     </p:extLst>
   </p:cSld>
@@ -3628,7 +4507,13 @@
       </p:grpSpPr>
       <p:sp>
         <p:nvSpPr>
-          <p:cNvPr id="2" name="Title 1"/>
+          <p:cNvPr id="2" name="Title 1">
+            <a:extLst>
+              <a:ext uri="{FF2B5EF4-FFF2-40B4-BE49-F238E27FC236}">
+                <a16:creationId xmlns:a16="http://schemas.microsoft.com/office/drawing/2014/main" id="{10EF42EE-C498-784B-8F84-4B24F62B1B93}"/>
+              </a:ext>
+            </a:extLst>
+          </p:cNvPr>
           <p:cNvSpPr>
             <a:spLocks noGrp="1"/>
           </p:cNvSpPr>
@@ -3643,19 +4528,25 @@
           <a:p>
             <a:r>
               <a:rPr lang="en-US" dirty="0"/>
-              <a:t>Lots of Choices, in Theory</a:t>
+              <a:t>Surface Mount Devices (SMD)</a:t>
             </a:r>
           </a:p>
         </p:txBody>
       </p:sp>
       <p:sp>
         <p:nvSpPr>
-          <p:cNvPr id="3" name="Content Placeholder 2"/>
+          <p:cNvPr id="8" name="Content Placeholder 7">
+            <a:extLst>
+              <a:ext uri="{FF2B5EF4-FFF2-40B4-BE49-F238E27FC236}">
+                <a16:creationId xmlns:a16="http://schemas.microsoft.com/office/drawing/2014/main" id="{F915F3D4-FBAC-2E42-8724-FB97787DD230}"/>
+              </a:ext>
+            </a:extLst>
+          </p:cNvPr>
           <p:cNvSpPr>
             <a:spLocks noGrp="1"/>
           </p:cNvSpPr>
           <p:nvPr>
-            <p:ph idx="1"/>
+            <p:ph sz="half" idx="1"/>
           </p:nvPr>
         </p:nvSpPr>
         <p:spPr/>
@@ -3667,55 +4558,83 @@
           <a:p>
             <a:r>
               <a:rPr lang="en-US" dirty="0"/>
-              <a:t>There are many, many choices when designing a PCB</a:t>
+              <a:t>No drill required</a:t>
             </a:r>
           </a:p>
           <a:p>
             <a:r>
               <a:rPr lang="en-US" dirty="0"/>
-              <a:t>We will get to make very few of them</a:t>
+              <a:t>No pins</a:t>
             </a:r>
           </a:p>
           <a:p>
             <a:r>
               <a:rPr lang="en-US" dirty="0"/>
-              <a:t>Cheap, fast PCB manufacturers provide a standard setup.  E.g.:</a:t>
-            </a:r>
-          </a:p>
-          <a:p>
-            <a:pPr lvl="1"/>
+              <a:t>Smaller parts</a:t>
+            </a:r>
+          </a:p>
+          <a:p>
             <a:r>
               <a:rPr lang="en-US" dirty="0"/>
-              <a:t>FR4</a:t>
-            </a:r>
-          </a:p>
-          <a:p>
-            <a:pPr lvl="1"/>
+              <a:t>Finer ‘pitch’ (pin-to-pin distance)</a:t>
+            </a:r>
+          </a:p>
+          <a:p>
             <a:r>
               <a:rPr lang="en-US" dirty="0"/>
-              <a:t>1oz copper</a:t>
-            </a:r>
-          </a:p>
-          <a:p>
-            <a:pPr lvl="1"/>
+              <a:t>Parts on both sides</a:t>
+            </a:r>
+          </a:p>
+          <a:p>
             <a:r>
               <a:rPr lang="en-US" dirty="0"/>
-              <a:t>2, 4, or 6 layers</a:t>
-            </a:r>
-          </a:p>
-          <a:p>
-            <a:pPr lvl="1"/>
+              <a:t>Easier automated placement</a:t>
+            </a:r>
+          </a:p>
+          <a:p>
             <a:r>
               <a:rPr lang="en-US" dirty="0"/>
-              <a:t>A few colors</a:t>
+              <a:t>Pitch &gt;= ~0.3 mm</a:t>
             </a:r>
           </a:p>
         </p:txBody>
       </p:sp>
+      <p:pic>
+        <p:nvPicPr>
+          <p:cNvPr id="13" name="Content Placeholder 12">
+            <a:extLst>
+              <a:ext uri="{FF2B5EF4-FFF2-40B4-BE49-F238E27FC236}">
+                <a16:creationId xmlns:a16="http://schemas.microsoft.com/office/drawing/2014/main" id="{4A436E1D-297E-EF4B-A144-0688E7F3CF36}"/>
+              </a:ext>
+            </a:extLst>
+          </p:cNvPr>
+          <p:cNvPicPr>
+            <a:picLocks noGrp="1" noChangeAspect="1"/>
+          </p:cNvPicPr>
+          <p:nvPr>
+            <p:ph sz="half" idx="2"/>
+          </p:nvPr>
+        </p:nvPicPr>
+        <p:blipFill>
+          <a:blip r:embed="rId3"/>
+          <a:stretch>
+            <a:fillRect/>
+          </a:stretch>
+        </p:blipFill>
+        <p:spPr>
+          <a:xfrm>
+            <a:off x="6172200" y="2755644"/>
+            <a:ext cx="4038600" cy="2215077"/>
+          </a:xfrm>
+          <a:prstGeom prst="rect">
+            <a:avLst/>
+          </a:prstGeom>
+        </p:spPr>
+      </p:pic>
     </p:spTree>
     <p:extLst>
       <p:ext uri="{BB962C8B-B14F-4D97-AF65-F5344CB8AC3E}">
-        <p14:creationId xmlns:p14="http://schemas.microsoft.com/office/powerpoint/2010/main" val="2318203006"/>
+        <p14:creationId xmlns:p14="http://schemas.microsoft.com/office/powerpoint/2010/main" val="484122908"/>
       </p:ext>
     </p:extLst>
   </p:cSld>
@@ -3726,6 +4645,101 @@
 </file>
 
 <file path=ppt/slides/slide12.xml><?xml version="1.0" encoding="utf-8"?>
+<p:sld xmlns:a="http://schemas.openxmlformats.org/drawingml/2006/main" xmlns:r="http://schemas.openxmlformats.org/officeDocument/2006/relationships" xmlns:p="http://schemas.openxmlformats.org/presentationml/2006/main">
+  <p:cSld>
+    <p:spTree>
+      <p:nvGrpSpPr>
+        <p:cNvPr id="1" name=""/>
+        <p:cNvGrpSpPr/>
+        <p:nvPr/>
+      </p:nvGrpSpPr>
+      <p:grpSpPr>
+        <a:xfrm>
+          <a:off x="0" y="0"/>
+          <a:ext cx="0" cy="0"/>
+          <a:chOff x="0" y="0"/>
+          <a:chExt cx="0" cy="0"/>
+        </a:xfrm>
+      </p:grpSpPr>
+      <p:sp>
+        <p:nvSpPr>
+          <p:cNvPr id="2" name="Title 1">
+            <a:extLst>
+              <a:ext uri="{FF2B5EF4-FFF2-40B4-BE49-F238E27FC236}">
+                <a16:creationId xmlns:a16="http://schemas.microsoft.com/office/drawing/2014/main" id="{69EDBEF0-AD41-CE4D-8833-D89820FC4C0B}"/>
+              </a:ext>
+            </a:extLst>
+          </p:cNvPr>
+          <p:cNvSpPr>
+            <a:spLocks noGrp="1"/>
+          </p:cNvSpPr>
+          <p:nvPr>
+            <p:ph type="title"/>
+          </p:nvPr>
+        </p:nvSpPr>
+        <p:spPr/>
+        <p:txBody>
+          <a:bodyPr/>
+          <a:lstStyle/>
+          <a:p>
+            <a:pPr lvl="0"/>
+            <a:r>
+              <a:rPr lang="en-US" dirty="0"/>
+              <a:t>Eagle uses odd terminology</a:t>
+            </a:r>
+          </a:p>
+        </p:txBody>
+      </p:sp>
+      <p:sp>
+        <p:nvSpPr>
+          <p:cNvPr id="3" name="Content Placeholder 2">
+            <a:extLst>
+              <a:ext uri="{FF2B5EF4-FFF2-40B4-BE49-F238E27FC236}">
+                <a16:creationId xmlns:a16="http://schemas.microsoft.com/office/drawing/2014/main" id="{289E7D6C-DEFA-A643-8407-53AD84059DA9}"/>
+              </a:ext>
+            </a:extLst>
+          </p:cNvPr>
+          <p:cNvSpPr>
+            <a:spLocks noGrp="1"/>
+          </p:cNvSpPr>
+          <p:nvPr>
+            <p:ph idx="1"/>
+          </p:nvPr>
+        </p:nvSpPr>
+        <p:spPr/>
+        <p:txBody>
+          <a:bodyPr/>
+          <a:lstStyle/>
+          <a:p>
+            <a:pPr lvl="0"/>
+            <a:r>
+              <a:rPr lang="en-US" dirty="0"/>
+              <a:t>”Pads” are through hole connections</a:t>
+            </a:r>
+          </a:p>
+          <a:p>
+            <a:pPr lvl="0"/>
+            <a:r>
+              <a:rPr lang="en-US" dirty="0"/>
+              <a:t>SMD (surface mount device) are surface mount connections.</a:t>
+            </a:r>
+          </a:p>
+        </p:txBody>
+      </p:sp>
+    </p:spTree>
+    <p:extLst>
+      <p:ext uri="{BB962C8B-B14F-4D97-AF65-F5344CB8AC3E}">
+        <p14:creationId xmlns:p14="http://schemas.microsoft.com/office/powerpoint/2010/main" val="2215530981"/>
+      </p:ext>
+    </p:extLst>
+  </p:cSld>
+  <p:clrMapOvr>
+    <a:masterClrMapping/>
+  </p:clrMapOvr>
+</p:sld>
+</file>
+
+<file path=ppt/slides/slide13.xml><?xml version="1.0" encoding="utf-8"?>
 <p:sld xmlns:a="http://schemas.openxmlformats.org/drawingml/2006/main" xmlns:r="http://schemas.openxmlformats.org/officeDocument/2006/relationships" xmlns:p="http://schemas.openxmlformats.org/presentationml/2006/main">
   <p:cSld>
     <p:spTree>
@@ -3808,7 +4822,7 @@
 </p:sld>
 </file>
 
-<file path=ppt/slides/slide13.xml><?xml version="1.0" encoding="utf-8"?>
+<file path=ppt/slides/slide14.xml><?xml version="1.0" encoding="utf-8"?>
 <p:sld xmlns:a="http://schemas.openxmlformats.org/drawingml/2006/main" xmlns:r="http://schemas.openxmlformats.org/officeDocument/2006/relationships" xmlns:p="http://schemas.openxmlformats.org/presentationml/2006/main">
   <p:cSld>
     <p:spTree>
@@ -3918,7 +4932,7 @@
 </p:sld>
 </file>
 
-<file path=ppt/slides/slide14.xml><?xml version="1.0" encoding="utf-8"?>
+<file path=ppt/slides/slide15.xml><?xml version="1.0" encoding="utf-8"?>
 <p:sld xmlns:a="http://schemas.openxmlformats.org/drawingml/2006/main" xmlns:r="http://schemas.openxmlformats.org/officeDocument/2006/relationships" xmlns:p="http://schemas.openxmlformats.org/presentationml/2006/main">
   <p:cSld>
     <p:spTree>
@@ -4318,7 +5332,7 @@
 </p:sld>
 </file>
 
-<file path=ppt/slides/slide15.xml><?xml version="1.0" encoding="utf-8"?>
+<file path=ppt/slides/slide16.xml><?xml version="1.0" encoding="utf-8"?>
 <p:sld xmlns:a="http://schemas.openxmlformats.org/drawingml/2006/main" xmlns:r="http://schemas.openxmlformats.org/officeDocument/2006/relationships" xmlns:p="http://schemas.openxmlformats.org/presentationml/2006/main" show="0">
   <p:cSld>
     <p:spTree>
@@ -5134,7 +6148,7 @@
 </p:sld>
 </file>
 
-<file path=ppt/slides/slide16.xml><?xml version="1.0" encoding="utf-8"?>
+<file path=ppt/slides/slide17.xml><?xml version="1.0" encoding="utf-8"?>
 <p:sld xmlns:a="http://schemas.openxmlformats.org/drawingml/2006/main" xmlns:r="http://schemas.openxmlformats.org/officeDocument/2006/relationships" xmlns:p="http://schemas.openxmlformats.org/presentationml/2006/main">
   <p:cSld>
     <p:spTree>
@@ -5247,7 +6261,7 @@
 </p:sld>
 </file>
 
-<file path=ppt/slides/slide17.xml><?xml version="1.0" encoding="utf-8"?>
+<file path=ppt/slides/slide18.xml><?xml version="1.0" encoding="utf-8"?>
 <p:sld xmlns:a="http://schemas.openxmlformats.org/drawingml/2006/main" xmlns:r="http://schemas.openxmlformats.org/officeDocument/2006/relationships" xmlns:p="http://schemas.openxmlformats.org/presentationml/2006/main">
   <p:cSld>
     <p:spTree>
@@ -5337,7 +6351,7 @@
 </p:sld>
 </file>
 
-<file path=ppt/slides/slide18.xml><?xml version="1.0" encoding="utf-8"?>
+<file path=ppt/slides/slide19.xml><?xml version="1.0" encoding="utf-8"?>
 <p:sld xmlns:a="http://schemas.openxmlformats.org/drawingml/2006/main" xmlns:r="http://schemas.openxmlformats.org/officeDocument/2006/relationships" xmlns:p="http://schemas.openxmlformats.org/presentationml/2006/main">
   <p:cSld>
     <p:spTree>
@@ -6274,141 +7288,6 @@
 </p:sld>
 </file>
 
-<file path=ppt/slides/slide19.xml><?xml version="1.0" encoding="utf-8"?>
-<p:sld xmlns:a="http://schemas.openxmlformats.org/drawingml/2006/main" xmlns:r="http://schemas.openxmlformats.org/officeDocument/2006/relationships" xmlns:p="http://schemas.openxmlformats.org/presentationml/2006/main">
-  <p:cSld>
-    <p:spTree>
-      <p:nvGrpSpPr>
-        <p:cNvPr id="1" name=""/>
-        <p:cNvGrpSpPr/>
-        <p:nvPr/>
-      </p:nvGrpSpPr>
-      <p:grpSpPr>
-        <a:xfrm>
-          <a:off x="0" y="0"/>
-          <a:ext cx="0" cy="0"/>
-          <a:chOff x="0" y="0"/>
-          <a:chExt cx="0" cy="0"/>
-        </a:xfrm>
-      </p:grpSpPr>
-      <p:sp>
-        <p:nvSpPr>
-          <p:cNvPr id="2" name="Title 1"/>
-          <p:cNvSpPr>
-            <a:spLocks noGrp="1"/>
-          </p:cNvSpPr>
-          <p:nvPr>
-            <p:ph type="title"/>
-          </p:nvPr>
-        </p:nvSpPr>
-        <p:spPr/>
-        <p:txBody>
-          <a:bodyPr/>
-          <a:lstStyle/>
-          <a:p>
-            <a:r>
-              <a:rPr lang="en-US" dirty="0"/>
-              <a:t>Designing with Layers</a:t>
-            </a:r>
-          </a:p>
-        </p:txBody>
-      </p:sp>
-      <p:sp>
-        <p:nvSpPr>
-          <p:cNvPr id="3" name="Content Placeholder 2"/>
-          <p:cNvSpPr>
-            <a:spLocks noGrp="1"/>
-          </p:cNvSpPr>
-          <p:nvPr>
-            <p:ph idx="1"/>
-          </p:nvPr>
-        </p:nvSpPr>
-        <p:spPr>
-          <a:xfrm>
-            <a:off x="1981200" y="1437904"/>
-            <a:ext cx="8229600" cy="5021240"/>
-          </a:xfrm>
-        </p:spPr>
-        <p:txBody>
-          <a:bodyPr>
-            <a:normAutofit/>
-          </a:bodyPr>
-          <a:lstStyle/>
-          <a:p>
-            <a:r>
-              <a:rPr lang="en-US" dirty="0"/>
-              <a:t>Eagle (and other board design tools) use layers to specify different types of information about a board. </a:t>
-            </a:r>
-            <a:r>
-              <a:rPr lang="en-US" dirty="0" err="1"/>
-              <a:t>E.g</a:t>
-            </a:r>
-            <a:r>
-              <a:rPr lang="en-US" dirty="0"/>
-              <a:t>:</a:t>
-            </a:r>
-          </a:p>
-          <a:p>
-            <a:pPr lvl="1"/>
-            <a:r>
-              <a:rPr lang="en-US" dirty="0"/>
-              <a:t>Where wires should go on each physical layer</a:t>
-            </a:r>
-          </a:p>
-          <a:p>
-            <a:pPr lvl="1"/>
-            <a:r>
-              <a:rPr lang="en-US" dirty="0"/>
-              <a:t>Where wires should not go on each physical layer</a:t>
-            </a:r>
-          </a:p>
-          <a:p>
-            <a:pPr lvl="1"/>
-            <a:r>
-              <a:rPr lang="en-US" dirty="0"/>
-              <a:t>Documentation</a:t>
-            </a:r>
-          </a:p>
-          <a:p>
-            <a:pPr lvl="1"/>
-            <a:r>
-              <a:rPr lang="en-US" dirty="0"/>
-              <a:t>Mechanical information</a:t>
-            </a:r>
-          </a:p>
-          <a:p>
-            <a:r>
-              <a:rPr lang="en-US" dirty="0"/>
-              <a:t>Eagle defines 52 layers by default</a:t>
-            </a:r>
-          </a:p>
-          <a:p>
-            <a:r>
-              <a:rPr lang="en-US" dirty="0"/>
-              <a:t>‘t’ prefix means top.</a:t>
-            </a:r>
-          </a:p>
-          <a:p>
-            <a:r>
-              <a:rPr lang="en-US" dirty="0"/>
-              <a:t>‘b’ prefix means bottom (displayed mirrored)</a:t>
-            </a:r>
-          </a:p>
-        </p:txBody>
-      </p:sp>
-    </p:spTree>
-    <p:extLst>
-      <p:ext uri="{BB962C8B-B14F-4D97-AF65-F5344CB8AC3E}">
-        <p14:creationId xmlns:p14="http://schemas.microsoft.com/office/powerpoint/2010/main" val="3433987351"/>
-      </p:ext>
-    </p:extLst>
-  </p:cSld>
-  <p:clrMapOvr>
-    <a:masterClrMapping/>
-  </p:clrMapOvr>
-</p:sld>
-</file>
-
 <file path=ppt/slides/slide2.xml><?xml version="1.0" encoding="utf-8"?>
 <p:sld xmlns:a="http://schemas.openxmlformats.org/drawingml/2006/main" xmlns:r="http://schemas.openxmlformats.org/officeDocument/2006/relationships" xmlns:p="http://schemas.openxmlformats.org/presentationml/2006/main">
   <p:cSld>
@@ -6540,6 +7419,141 @@
 </file>
 
 <file path=ppt/slides/slide20.xml><?xml version="1.0" encoding="utf-8"?>
+<p:sld xmlns:a="http://schemas.openxmlformats.org/drawingml/2006/main" xmlns:r="http://schemas.openxmlformats.org/officeDocument/2006/relationships" xmlns:p="http://schemas.openxmlformats.org/presentationml/2006/main">
+  <p:cSld>
+    <p:spTree>
+      <p:nvGrpSpPr>
+        <p:cNvPr id="1" name=""/>
+        <p:cNvGrpSpPr/>
+        <p:nvPr/>
+      </p:nvGrpSpPr>
+      <p:grpSpPr>
+        <a:xfrm>
+          <a:off x="0" y="0"/>
+          <a:ext cx="0" cy="0"/>
+          <a:chOff x="0" y="0"/>
+          <a:chExt cx="0" cy="0"/>
+        </a:xfrm>
+      </p:grpSpPr>
+      <p:sp>
+        <p:nvSpPr>
+          <p:cNvPr id="2" name="Title 1"/>
+          <p:cNvSpPr>
+            <a:spLocks noGrp="1"/>
+          </p:cNvSpPr>
+          <p:nvPr>
+            <p:ph type="title"/>
+          </p:nvPr>
+        </p:nvSpPr>
+        <p:spPr/>
+        <p:txBody>
+          <a:bodyPr/>
+          <a:lstStyle/>
+          <a:p>
+            <a:r>
+              <a:rPr lang="en-US" dirty="0"/>
+              <a:t>Designing with Layers</a:t>
+            </a:r>
+          </a:p>
+        </p:txBody>
+      </p:sp>
+      <p:sp>
+        <p:nvSpPr>
+          <p:cNvPr id="3" name="Content Placeholder 2"/>
+          <p:cNvSpPr>
+            <a:spLocks noGrp="1"/>
+          </p:cNvSpPr>
+          <p:nvPr>
+            <p:ph idx="1"/>
+          </p:nvPr>
+        </p:nvSpPr>
+        <p:spPr>
+          <a:xfrm>
+            <a:off x="1981200" y="1437904"/>
+            <a:ext cx="8229600" cy="5021240"/>
+          </a:xfrm>
+        </p:spPr>
+        <p:txBody>
+          <a:bodyPr>
+            <a:normAutofit/>
+          </a:bodyPr>
+          <a:lstStyle/>
+          <a:p>
+            <a:r>
+              <a:rPr lang="en-US" dirty="0"/>
+              <a:t>Eagle (and other board design tools) use layers to specify different types of information about a board. </a:t>
+            </a:r>
+            <a:r>
+              <a:rPr lang="en-US" dirty="0" err="1"/>
+              <a:t>E.g</a:t>
+            </a:r>
+            <a:r>
+              <a:rPr lang="en-US" dirty="0"/>
+              <a:t>:</a:t>
+            </a:r>
+          </a:p>
+          <a:p>
+            <a:pPr lvl="1"/>
+            <a:r>
+              <a:rPr lang="en-US" dirty="0"/>
+              <a:t>Where wires should go on each physical layer</a:t>
+            </a:r>
+          </a:p>
+          <a:p>
+            <a:pPr lvl="1"/>
+            <a:r>
+              <a:rPr lang="en-US" dirty="0"/>
+              <a:t>Where wires should not go on each physical layer</a:t>
+            </a:r>
+          </a:p>
+          <a:p>
+            <a:pPr lvl="1"/>
+            <a:r>
+              <a:rPr lang="en-US" dirty="0"/>
+              <a:t>Documentation</a:t>
+            </a:r>
+          </a:p>
+          <a:p>
+            <a:pPr lvl="1"/>
+            <a:r>
+              <a:rPr lang="en-US" dirty="0"/>
+              <a:t>Mechanical information</a:t>
+            </a:r>
+          </a:p>
+          <a:p>
+            <a:r>
+              <a:rPr lang="en-US" dirty="0"/>
+              <a:t>Eagle defines 52 layers by default</a:t>
+            </a:r>
+          </a:p>
+          <a:p>
+            <a:r>
+              <a:rPr lang="en-US" dirty="0"/>
+              <a:t>‘t’ prefix means top.</a:t>
+            </a:r>
+          </a:p>
+          <a:p>
+            <a:r>
+              <a:rPr lang="en-US" dirty="0"/>
+              <a:t>‘b’ prefix means bottom (displayed mirrored)</a:t>
+            </a:r>
+          </a:p>
+        </p:txBody>
+      </p:sp>
+    </p:spTree>
+    <p:extLst>
+      <p:ext uri="{BB962C8B-B14F-4D97-AF65-F5344CB8AC3E}">
+        <p14:creationId xmlns:p14="http://schemas.microsoft.com/office/powerpoint/2010/main" val="3433987351"/>
+      </p:ext>
+    </p:extLst>
+  </p:cSld>
+  <p:clrMapOvr>
+    <a:masterClrMapping/>
+  </p:clrMapOvr>
+</p:sld>
+</file>
+
+<file path=ppt/slides/slide21.xml><?xml version="1.0" encoding="utf-8"?>
 <p:sld xmlns:a="http://schemas.openxmlformats.org/drawingml/2006/main" xmlns:r="http://schemas.openxmlformats.org/officeDocument/2006/relationships" xmlns:p="http://schemas.openxmlformats.org/presentationml/2006/main">
   <p:cSld>
     <p:spTree>
@@ -6749,7 +7763,7 @@
 </p:sld>
 </file>
 
-<file path=ppt/slides/slide21.xml><?xml version="1.0" encoding="utf-8"?>
+<file path=ppt/slides/slide22.xml><?xml version="1.0" encoding="utf-8"?>
 <p:sld xmlns:a="http://schemas.openxmlformats.org/drawingml/2006/main" xmlns:r="http://schemas.openxmlformats.org/officeDocument/2006/relationships" xmlns:p="http://schemas.openxmlformats.org/presentationml/2006/main">
   <p:cSld>
     <p:spTree>
@@ -14155,7 +15169,7 @@
 </p:sld>
 </file>
 
-<file path=ppt/slides/slide22.xml><?xml version="1.0" encoding="utf-8"?>
+<file path=ppt/slides/slide23.xml><?xml version="1.0" encoding="utf-8"?>
 <p:sld xmlns:a="http://schemas.openxmlformats.org/drawingml/2006/main" xmlns:r="http://schemas.openxmlformats.org/officeDocument/2006/relationships" xmlns:p="http://schemas.openxmlformats.org/presentationml/2006/main" show="0">
   <p:cSld>
     <p:spTree>
@@ -14261,7 +15275,7 @@
 </p:sld>
 </file>
 
-<file path=ppt/slides/slide23.xml><?xml version="1.0" encoding="utf-8"?>
+<file path=ppt/slides/slide24.xml><?xml version="1.0" encoding="utf-8"?>
 <p:sld xmlns:a="http://schemas.openxmlformats.org/drawingml/2006/main" xmlns:r="http://schemas.openxmlformats.org/officeDocument/2006/relationships" xmlns:p="http://schemas.openxmlformats.org/presentationml/2006/main">
   <p:cSld>
     <p:spTree>
@@ -14443,7 +15457,7 @@
 </p:sld>
 </file>
 
-<file path=ppt/slides/slide24.xml><?xml version="1.0" encoding="utf-8"?>
+<file path=ppt/slides/slide25.xml><?xml version="1.0" encoding="utf-8"?>
 <p:sld xmlns:a="http://schemas.openxmlformats.org/drawingml/2006/main" xmlns:r="http://schemas.openxmlformats.org/officeDocument/2006/relationships" xmlns:p="http://schemas.openxmlformats.org/presentationml/2006/main">
   <p:cSld>
     <p:spTree>
@@ -14808,7 +15822,7 @@
 </p:sld>
 </file>
 
-<file path=ppt/slides/slide25.xml><?xml version="1.0" encoding="utf-8"?>
+<file path=ppt/slides/slide26.xml><?xml version="1.0" encoding="utf-8"?>
 <p:sld xmlns:a="http://schemas.openxmlformats.org/drawingml/2006/main" xmlns:r="http://schemas.openxmlformats.org/officeDocument/2006/relationships" xmlns:p="http://schemas.openxmlformats.org/presentationml/2006/main">
   <p:cSld>
     <p:spTree>
@@ -14899,7 +15913,7 @@
 </p:sld>
 </file>
 
-<file path=ppt/slides/slide26.xml><?xml version="1.0" encoding="utf-8"?>
+<file path=ppt/slides/slide27.xml><?xml version="1.0" encoding="utf-8"?>
 <p:sld xmlns:a="http://schemas.openxmlformats.org/drawingml/2006/main" xmlns:r="http://schemas.openxmlformats.org/officeDocument/2006/relationships" xmlns:p="http://schemas.openxmlformats.org/presentationml/2006/main">
   <p:cSld>
     <p:spTree>
@@ -15078,7 +16092,7 @@
 </p:sld>
 </file>
 
-<file path=ppt/slides/slide27.xml><?xml version="1.0" encoding="utf-8"?>
+<file path=ppt/slides/slide28.xml><?xml version="1.0" encoding="utf-8"?>
 <p:sld xmlns:a="http://schemas.openxmlformats.org/drawingml/2006/main" xmlns:r="http://schemas.openxmlformats.org/officeDocument/2006/relationships" xmlns:p="http://schemas.openxmlformats.org/presentationml/2006/main">
   <p:cSld>
     <p:spTree>
@@ -15314,7 +16328,7 @@
 </p:sld>
 </file>
 
-<file path=ppt/slides/slide28.xml><?xml version="1.0" encoding="utf-8"?>
+<file path=ppt/slides/slide29.xml><?xml version="1.0" encoding="utf-8"?>
 <p:sld xmlns:a="http://schemas.openxmlformats.org/drawingml/2006/main" xmlns:r="http://schemas.openxmlformats.org/officeDocument/2006/relationships" xmlns:p="http://schemas.openxmlformats.org/presentationml/2006/main">
   <p:cSld>
     <p:spTree>
@@ -15491,92 +16505,6 @@
     <p:extLst>
       <p:ext uri="{BB962C8B-B14F-4D97-AF65-F5344CB8AC3E}">
         <p14:creationId xmlns:p14="http://schemas.microsoft.com/office/powerpoint/2010/main" val="1825034168"/>
-      </p:ext>
-    </p:extLst>
-  </p:cSld>
-  <p:clrMapOvr>
-    <a:masterClrMapping/>
-  </p:clrMapOvr>
-</p:sld>
-</file>
-
-<file path=ppt/slides/slide29.xml><?xml version="1.0" encoding="utf-8"?>
-<p:sld xmlns:a="http://schemas.openxmlformats.org/drawingml/2006/main" xmlns:r="http://schemas.openxmlformats.org/officeDocument/2006/relationships" xmlns:p="http://schemas.openxmlformats.org/presentationml/2006/main">
-  <p:cSld>
-    <p:spTree>
-      <p:nvGrpSpPr>
-        <p:cNvPr id="1" name=""/>
-        <p:cNvGrpSpPr/>
-        <p:nvPr/>
-      </p:nvGrpSpPr>
-      <p:grpSpPr>
-        <a:xfrm>
-          <a:off x="0" y="0"/>
-          <a:ext cx="0" cy="0"/>
-          <a:chOff x="0" y="0"/>
-          <a:chExt cx="0" cy="0"/>
-        </a:xfrm>
-      </p:grpSpPr>
-      <p:sp>
-        <p:nvSpPr>
-          <p:cNvPr id="2" name="Title 1"/>
-          <p:cNvSpPr>
-            <a:spLocks noGrp="1"/>
-          </p:cNvSpPr>
-          <p:nvPr>
-            <p:ph type="title"/>
-          </p:nvPr>
-        </p:nvSpPr>
-        <p:spPr/>
-        <p:txBody>
-          <a:bodyPr/>
-          <a:lstStyle/>
-          <a:p>
-            <a:r>
-              <a:rPr lang="en-US" dirty="0"/>
-              <a:t>Resources</a:t>
-            </a:r>
-          </a:p>
-        </p:txBody>
-      </p:sp>
-      <p:sp>
-        <p:nvSpPr>
-          <p:cNvPr id="3" name="Content Placeholder 2"/>
-          <p:cNvSpPr>
-            <a:spLocks noGrp="1"/>
-          </p:cNvSpPr>
-          <p:nvPr>
-            <p:ph idx="1"/>
-          </p:nvPr>
-        </p:nvSpPr>
-        <p:spPr/>
-        <p:txBody>
-          <a:bodyPr>
-            <a:normAutofit/>
-          </a:bodyPr>
-          <a:lstStyle/>
-          <a:p>
-            <a:r>
-              <a:rPr lang="en-US" dirty="0"/>
-              <a:t>Good PCB manufacturing videos</a:t>
-            </a:r>
-          </a:p>
-          <a:p>
-            <a:pPr lvl="1"/>
-            <a:r>
-              <a:rPr lang="en-US" dirty="0">
-                <a:hlinkClick r:id="rId2"/>
-              </a:rPr>
-              <a:t>https://www.youtube.com/playlist?list=PL8zP8UuDk8a0ZNWiteC-7PHx1HCeBY0qB</a:t>
-            </a:r>
-            <a:endParaRPr lang="en-US" dirty="0"/>
-          </a:p>
-        </p:txBody>
-      </p:sp>
-    </p:spTree>
-    <p:extLst>
-      <p:ext uri="{BB962C8B-B14F-4D97-AF65-F5344CB8AC3E}">
-        <p14:creationId xmlns:p14="http://schemas.microsoft.com/office/powerpoint/2010/main" val="2006250544"/>
       </p:ext>
     </p:extLst>
   </p:cSld>
@@ -15759,6 +16687,92 @@
     <p:extLst>
       <p:ext uri="{BB962C8B-B14F-4D97-AF65-F5344CB8AC3E}">
         <p14:creationId xmlns:p14="http://schemas.microsoft.com/office/powerpoint/2010/main" val="908997859"/>
+      </p:ext>
+    </p:extLst>
+  </p:cSld>
+  <p:clrMapOvr>
+    <a:masterClrMapping/>
+  </p:clrMapOvr>
+</p:sld>
+</file>
+
+<file path=ppt/slides/slide30.xml><?xml version="1.0" encoding="utf-8"?>
+<p:sld xmlns:a="http://schemas.openxmlformats.org/drawingml/2006/main" xmlns:r="http://schemas.openxmlformats.org/officeDocument/2006/relationships" xmlns:p="http://schemas.openxmlformats.org/presentationml/2006/main">
+  <p:cSld>
+    <p:spTree>
+      <p:nvGrpSpPr>
+        <p:cNvPr id="1" name=""/>
+        <p:cNvGrpSpPr/>
+        <p:nvPr/>
+      </p:nvGrpSpPr>
+      <p:grpSpPr>
+        <a:xfrm>
+          <a:off x="0" y="0"/>
+          <a:ext cx="0" cy="0"/>
+          <a:chOff x="0" y="0"/>
+          <a:chExt cx="0" cy="0"/>
+        </a:xfrm>
+      </p:grpSpPr>
+      <p:sp>
+        <p:nvSpPr>
+          <p:cNvPr id="2" name="Title 1"/>
+          <p:cNvSpPr>
+            <a:spLocks noGrp="1"/>
+          </p:cNvSpPr>
+          <p:nvPr>
+            <p:ph type="title"/>
+          </p:nvPr>
+        </p:nvSpPr>
+        <p:spPr/>
+        <p:txBody>
+          <a:bodyPr/>
+          <a:lstStyle/>
+          <a:p>
+            <a:r>
+              <a:rPr lang="en-US" dirty="0"/>
+              <a:t>Resources</a:t>
+            </a:r>
+          </a:p>
+        </p:txBody>
+      </p:sp>
+      <p:sp>
+        <p:nvSpPr>
+          <p:cNvPr id="3" name="Content Placeholder 2"/>
+          <p:cNvSpPr>
+            <a:spLocks noGrp="1"/>
+          </p:cNvSpPr>
+          <p:nvPr>
+            <p:ph idx="1"/>
+          </p:nvPr>
+        </p:nvSpPr>
+        <p:spPr/>
+        <p:txBody>
+          <a:bodyPr>
+            <a:normAutofit/>
+          </a:bodyPr>
+          <a:lstStyle/>
+          <a:p>
+            <a:r>
+              <a:rPr lang="en-US" dirty="0"/>
+              <a:t>Good PCB manufacturing videos</a:t>
+            </a:r>
+          </a:p>
+          <a:p>
+            <a:pPr lvl="1"/>
+            <a:r>
+              <a:rPr lang="en-US" dirty="0">
+                <a:hlinkClick r:id="rId2"/>
+              </a:rPr>
+              <a:t>https://www.youtube.com/playlist?list=PL8zP8UuDk8a0ZNWiteC-7PHx1HCeBY0qB</a:t>
+            </a:r>
+            <a:endParaRPr lang="en-US" dirty="0"/>
+          </a:p>
+        </p:txBody>
+      </p:sp>
+    </p:spTree>
+    <p:extLst>
+      <p:ext uri="{BB962C8B-B14F-4D97-AF65-F5344CB8AC3E}">
+        <p14:creationId xmlns:p14="http://schemas.microsoft.com/office/powerpoint/2010/main" val="2006250544"/>
       </p:ext>
     </p:extLst>
   </p:cSld>
@@ -16397,14 +17411,12 @@
         </p:nvSpPr>
         <p:spPr/>
         <p:txBody>
-          <a:bodyPr>
-            <a:normAutofit/>
-          </a:bodyPr>
+          <a:bodyPr/>
           <a:lstStyle/>
           <a:p>
             <a:r>
               <a:rPr lang="en-US" dirty="0"/>
-              <a:t>Making Connections Between Layers</a:t>
+              <a:t>Lots of Choices, in Theory</a:t>
             </a:r>
           </a:p>
         </p:txBody>
@@ -16416,7 +17428,7 @@
             <a:spLocks noGrp="1"/>
           </p:cNvSpPr>
           <p:nvPr>
-            <p:ph sz="half" idx="1"/>
+            <p:ph idx="1"/>
           </p:nvPr>
         </p:nvSpPr>
         <p:spPr/>
@@ -16428,65 +17440,55 @@
           <a:p>
             <a:r>
               <a:rPr lang="en-US" dirty="0"/>
-              <a:t>Plated holes connect metal layers.</a:t>
+              <a:t>There are many, many choices when designing a PCB</a:t>
             </a:r>
           </a:p>
           <a:p>
             <a:r>
               <a:rPr lang="en-US" dirty="0"/>
-              <a:t>Drill a hole</a:t>
+              <a:t>We will get to make very few of them</a:t>
             </a:r>
           </a:p>
           <a:p>
             <a:r>
               <a:rPr lang="en-US" dirty="0"/>
-              <a:t>Electroplate it with copper</a:t>
-            </a:r>
-          </a:p>
-          <a:p>
+              <a:t>Cheap, fast PCB manufacturers provide a standard setup.  E.g.:</a:t>
+            </a:r>
+          </a:p>
+          <a:p>
+            <a:pPr lvl="1"/>
             <a:r>
               <a:rPr lang="en-US" dirty="0"/>
-              <a:t>Cover it with a non-corroding metal.</a:t>
+              <a:t>FR4</a:t>
+            </a:r>
+          </a:p>
+          <a:p>
+            <a:pPr lvl="1"/>
+            <a:r>
+              <a:rPr lang="en-US" dirty="0"/>
+              <a:t>1oz copper</a:t>
+            </a:r>
+          </a:p>
+          <a:p>
+            <a:pPr lvl="1"/>
+            <a:r>
+              <a:rPr lang="en-US" dirty="0"/>
+              <a:t>2, 4, or 6 layers</a:t>
+            </a:r>
+          </a:p>
+          <a:p>
+            <a:pPr lvl="1"/>
+            <a:r>
+              <a:rPr lang="en-US" dirty="0"/>
+              <a:t>A few colors</a:t>
             </a:r>
           </a:p>
         </p:txBody>
       </p:sp>
-      <p:pic>
-        <p:nvPicPr>
-          <p:cNvPr id="9" name="Content Placeholder 8">
-            <a:extLst>
-              <a:ext uri="{FF2B5EF4-FFF2-40B4-BE49-F238E27FC236}">
-                <a16:creationId xmlns:a16="http://schemas.microsoft.com/office/drawing/2014/main" id="{D1FF62B7-73CD-5549-8F6B-E883D253B2E9}"/>
-              </a:ext>
-            </a:extLst>
-          </p:cNvPr>
-          <p:cNvPicPr>
-            <a:picLocks noGrp="1" noChangeAspect="1"/>
-          </p:cNvPicPr>
-          <p:nvPr>
-            <p:ph sz="half" idx="2"/>
-          </p:nvPr>
-        </p:nvPicPr>
-        <p:blipFill>
-          <a:blip r:embed="rId2"/>
-          <a:stretch>
-            <a:fillRect/>
-          </a:stretch>
-        </p:blipFill>
-        <p:spPr>
-          <a:xfrm>
-            <a:off x="6172200" y="2084175"/>
-            <a:ext cx="4038600" cy="3558015"/>
-          </a:xfrm>
-          <a:prstGeom prst="rect">
-            <a:avLst/>
-          </a:prstGeom>
-        </p:spPr>
-      </p:pic>
     </p:spTree>
     <p:extLst>
       <p:ext uri="{BB962C8B-B14F-4D97-AF65-F5344CB8AC3E}">
-        <p14:creationId xmlns:p14="http://schemas.microsoft.com/office/powerpoint/2010/main" val="4020792462"/>
+        <p14:creationId xmlns:p14="http://schemas.microsoft.com/office/powerpoint/2010/main" val="2318203006"/>
       </p:ext>
     </p:extLst>
   </p:cSld>
@@ -16525,22 +17527,15 @@
         </p:nvSpPr>
         <p:spPr/>
         <p:txBody>
-          <a:bodyPr/>
+          <a:bodyPr>
+            <a:normAutofit/>
+          </a:bodyPr>
           <a:lstStyle/>
           <a:p>
             <a:r>
-              <a:rPr lang="en-US" dirty="0" err="1"/>
-              <a:t>Throughholes</a:t>
-            </a:r>
-            <a:r>
               <a:rPr lang="en-US" dirty="0"/>
-              <a:t> and </a:t>
-            </a:r>
-            <a:r>
-              <a:rPr lang="en-US" dirty="0" err="1"/>
-              <a:t>Vias</a:t>
-            </a:r>
-            <a:endParaRPr lang="en-US" dirty="0"/>
+              <a:t>Making Connections Between Layers</a:t>
+            </a:r>
           </a:p>
         </p:txBody>
       </p:sp>
@@ -16557,92 +17552,41 @@
         <p:spPr/>
         <p:txBody>
           <a:bodyPr>
-            <a:normAutofit fontScale="92500" lnSpcReduction="10000"/>
+            <a:normAutofit/>
           </a:bodyPr>
           <a:lstStyle/>
           <a:p>
             <a:r>
               <a:rPr lang="en-US" dirty="0"/>
-              <a:t>Through hole pads </a:t>
-            </a:r>
-          </a:p>
-          <a:p>
-            <a:pPr lvl="1"/>
+              <a:t>Plated holes connect metal layers.</a:t>
+            </a:r>
+          </a:p>
+          <a:p>
             <a:r>
               <a:rPr lang="en-US" dirty="0"/>
-              <a:t>Mount devices with pins</a:t>
-            </a:r>
-          </a:p>
-          <a:p>
-            <a:pPr lvl="1"/>
+              <a:t>Drill a hole</a:t>
+            </a:r>
+          </a:p>
+          <a:p>
             <a:r>
               <a:rPr lang="en-US" dirty="0"/>
-              <a:t>Sized for the pin + solder</a:t>
-            </a:r>
-          </a:p>
-          <a:p>
-            <a:pPr lvl="1"/>
+              <a:t>Electroplate it with copper</a:t>
+            </a:r>
+          </a:p>
+          <a:p>
             <a:r>
               <a:rPr lang="en-US" dirty="0"/>
-              <a:t>Always plated with non-oxidizing metal.</a:t>
-            </a:r>
-          </a:p>
-          <a:p>
-            <a:r>
-              <a:rPr lang="en-US" dirty="0" err="1"/>
-              <a:t>Vias</a:t>
-            </a:r>
-            <a:r>
-              <a:rPr lang="en-US" dirty="0"/>
-              <a:t> are electrical connections</a:t>
-            </a:r>
-          </a:p>
-          <a:p>
-            <a:pPr lvl="1"/>
-            <a:r>
-              <a:rPr lang="en-US" dirty="0"/>
-              <a:t>As small as possible</a:t>
-            </a:r>
-          </a:p>
-          <a:p>
-            <a:r>
-              <a:rPr lang="en-US" dirty="0"/>
-              <a:t>Problems</a:t>
-            </a:r>
-          </a:p>
-          <a:p>
-            <a:pPr lvl="1"/>
-            <a:r>
-              <a:rPr lang="en-US" dirty="0"/>
-              <a:t>Takes up space in all layers</a:t>
-            </a:r>
-          </a:p>
-          <a:p>
-            <a:pPr lvl="1"/>
-            <a:r>
-              <a:rPr lang="en-US" dirty="0" err="1"/>
-              <a:t>Throughhole</a:t>
-            </a:r>
-            <a:r>
-              <a:rPr lang="en-US" dirty="0"/>
-              <a:t> pins are generally pretty big</a:t>
-            </a:r>
-          </a:p>
-          <a:p>
-            <a:pPr lvl="1"/>
-            <a:r>
-              <a:rPr lang="en-US" dirty="0"/>
-              <a:t>Pin-to-pin spacing &gt;= 1mm</a:t>
+              <a:t>Cover it with a non-corroding metal.</a:t>
             </a:r>
           </a:p>
         </p:txBody>
       </p:sp>
       <p:pic>
         <p:nvPicPr>
-          <p:cNvPr id="8" name="Content Placeholder 7">
+          <p:cNvPr id="9" name="Content Placeholder 8">
             <a:extLst>
               <a:ext uri="{FF2B5EF4-FFF2-40B4-BE49-F238E27FC236}">
-                <a16:creationId xmlns:a16="http://schemas.microsoft.com/office/drawing/2014/main" id="{48B3F6BA-D1C2-FD42-BCA1-DB5A9B955A51}"/>
+                <a16:creationId xmlns:a16="http://schemas.microsoft.com/office/drawing/2014/main" id="{D1FF62B7-73CD-5549-8F6B-E883D253B2E9}"/>
               </a:ext>
             </a:extLst>
           </p:cNvPr>
@@ -16654,15 +17598,15 @@
           </p:nvPr>
         </p:nvPicPr>
         <p:blipFill>
-          <a:blip r:embed="rId2"/>
+          <a:blip r:embed="rId3"/>
           <a:stretch>
             <a:fillRect/>
           </a:stretch>
         </p:blipFill>
         <p:spPr>
           <a:xfrm>
-            <a:off x="6519675" y="1825625"/>
-            <a:ext cx="4486649" cy="4351338"/>
+            <a:off x="6172200" y="2084175"/>
+            <a:ext cx="4038600" cy="3558015"/>
           </a:xfrm>
           <a:prstGeom prst="rect">
             <a:avLst/>
@@ -16672,7 +17616,7 @@
     </p:spTree>
     <p:extLst>
       <p:ext uri="{BB962C8B-B14F-4D97-AF65-F5344CB8AC3E}">
-        <p14:creationId xmlns:p14="http://schemas.microsoft.com/office/powerpoint/2010/main" val="4067957370"/>
+        <p14:creationId xmlns:p14="http://schemas.microsoft.com/office/powerpoint/2010/main" val="4020792462"/>
       </p:ext>
     </p:extLst>
   </p:cSld>
@@ -16975,4 +17919,299 @@
     </a:ext>
   </a:extLst>
 </a:theme>
+</file>
+
+<file path=ppt/theme/theme2.xml><?xml version="1.0" encoding="utf-8"?>
+<a:theme xmlns:a="http://schemas.openxmlformats.org/drawingml/2006/main" name="Office Theme">
+  <a:themeElements>
+    <a:clrScheme name="Office">
+      <a:dk1>
+        <a:sysClr val="windowText" lastClr="000000"/>
+      </a:dk1>
+      <a:lt1>
+        <a:sysClr val="window" lastClr="FFFFFF"/>
+      </a:lt1>
+      <a:dk2>
+        <a:srgbClr val="44546A"/>
+      </a:dk2>
+      <a:lt2>
+        <a:srgbClr val="E7E6E6"/>
+      </a:lt2>
+      <a:accent1>
+        <a:srgbClr val="4472C4"/>
+      </a:accent1>
+      <a:accent2>
+        <a:srgbClr val="ED7D31"/>
+      </a:accent2>
+      <a:accent3>
+        <a:srgbClr val="A5A5A5"/>
+      </a:accent3>
+      <a:accent4>
+        <a:srgbClr val="FFC000"/>
+      </a:accent4>
+      <a:accent5>
+        <a:srgbClr val="5B9BD5"/>
+      </a:accent5>
+      <a:accent6>
+        <a:srgbClr val="70AD47"/>
+      </a:accent6>
+      <a:hlink>
+        <a:srgbClr val="0563C1"/>
+      </a:hlink>
+      <a:folHlink>
+        <a:srgbClr val="954F72"/>
+      </a:folHlink>
+    </a:clrScheme>
+    <a:fontScheme name="Office">
+      <a:majorFont>
+        <a:latin typeface="Calibri Light" panose="020F0302020204030204"/>
+        <a:ea typeface=""/>
+        <a:cs typeface=""/>
+        <a:font script="Jpan" typeface="游ゴシック Light"/>
+        <a:font script="Hang" typeface="맑은 고딕"/>
+        <a:font script="Hans" typeface="等线 Light"/>
+        <a:font script="Hant" typeface="新細明體"/>
+        <a:font script="Arab" typeface="Times New Roman"/>
+        <a:font script="Hebr" typeface="Times New Roman"/>
+        <a:font script="Thai" typeface="Angsana New"/>
+        <a:font script="Ethi" typeface="Nyala"/>
+        <a:font script="Beng" typeface="Vrinda"/>
+        <a:font script="Gujr" typeface="Shruti"/>
+        <a:font script="Khmr" typeface="MoolBoran"/>
+        <a:font script="Knda" typeface="Tunga"/>
+        <a:font script="Guru" typeface="Raavi"/>
+        <a:font script="Cans" typeface="Euphemia"/>
+        <a:font script="Cher" typeface="Plantagenet Cherokee"/>
+        <a:font script="Yiii" typeface="Microsoft Yi Baiti"/>
+        <a:font script="Tibt" typeface="Microsoft Himalaya"/>
+        <a:font script="Thaa" typeface="MV Boli"/>
+        <a:font script="Deva" typeface="Mangal"/>
+        <a:font script="Telu" typeface="Gautami"/>
+        <a:font script="Taml" typeface="Latha"/>
+        <a:font script="Syrc" typeface="Estrangelo Edessa"/>
+        <a:font script="Orya" typeface="Kalinga"/>
+        <a:font script="Mlym" typeface="Kartika"/>
+        <a:font script="Laoo" typeface="DokChampa"/>
+        <a:font script="Sinh" typeface="Iskoola Pota"/>
+        <a:font script="Mong" typeface="Mongolian Baiti"/>
+        <a:font script="Viet" typeface="Times New Roman"/>
+        <a:font script="Uigh" typeface="Microsoft Uighur"/>
+        <a:font script="Geor" typeface="Sylfaen"/>
+        <a:font script="Armn" typeface="Arial"/>
+        <a:font script="Bugi" typeface="Leelawadee UI"/>
+        <a:font script="Bopo" typeface="Microsoft JhengHei"/>
+        <a:font script="Java" typeface="Javanese Text"/>
+        <a:font script="Lisu" typeface="Segoe UI"/>
+        <a:font script="Mymr" typeface="Myanmar Text"/>
+        <a:font script="Nkoo" typeface="Ebrima"/>
+        <a:font script="Olck" typeface="Nirmala UI"/>
+        <a:font script="Osma" typeface="Ebrima"/>
+        <a:font script="Phag" typeface="Phagspa"/>
+        <a:font script="Syrn" typeface="Estrangelo Edessa"/>
+        <a:font script="Syrj" typeface="Estrangelo Edessa"/>
+        <a:font script="Syre" typeface="Estrangelo Edessa"/>
+        <a:font script="Sora" typeface="Nirmala UI"/>
+        <a:font script="Tale" typeface="Microsoft Tai Le"/>
+        <a:font script="Talu" typeface="Microsoft New Tai Lue"/>
+        <a:font script="Tfng" typeface="Ebrima"/>
+      </a:majorFont>
+      <a:minorFont>
+        <a:latin typeface="Calibri" panose="020F0502020204030204"/>
+        <a:ea typeface=""/>
+        <a:cs typeface=""/>
+        <a:font script="Jpan" typeface="游ゴシック"/>
+        <a:font script="Hang" typeface="맑은 고딕"/>
+        <a:font script="Hans" typeface="等线"/>
+        <a:font script="Hant" typeface="新細明體"/>
+        <a:font script="Arab" typeface="Arial"/>
+        <a:font script="Hebr" typeface="Arial"/>
+        <a:font script="Thai" typeface="Cordia New"/>
+        <a:font script="Ethi" typeface="Nyala"/>
+        <a:font script="Beng" typeface="Vrinda"/>
+        <a:font script="Gujr" typeface="Shruti"/>
+        <a:font script="Khmr" typeface="DaunPenh"/>
+        <a:font script="Knda" typeface="Tunga"/>
+        <a:font script="Guru" typeface="Raavi"/>
+        <a:font script="Cans" typeface="Euphemia"/>
+        <a:font script="Cher" typeface="Plantagenet Cherokee"/>
+        <a:font script="Yiii" typeface="Microsoft Yi Baiti"/>
+        <a:font script="Tibt" typeface="Microsoft Himalaya"/>
+        <a:font script="Thaa" typeface="MV Boli"/>
+        <a:font script="Deva" typeface="Mangal"/>
+        <a:font script="Telu" typeface="Gautami"/>
+        <a:font script="Taml" typeface="Latha"/>
+        <a:font script="Syrc" typeface="Estrangelo Edessa"/>
+        <a:font script="Orya" typeface="Kalinga"/>
+        <a:font script="Mlym" typeface="Kartika"/>
+        <a:font script="Laoo" typeface="DokChampa"/>
+        <a:font script="Sinh" typeface="Iskoola Pota"/>
+        <a:font script="Mong" typeface="Mongolian Baiti"/>
+        <a:font script="Viet" typeface="Arial"/>
+        <a:font script="Uigh" typeface="Microsoft Uighur"/>
+        <a:font script="Geor" typeface="Sylfaen"/>
+        <a:font script="Armn" typeface="Arial"/>
+        <a:font script="Bugi" typeface="Leelawadee UI"/>
+        <a:font script="Bopo" typeface="Microsoft JhengHei"/>
+        <a:font script="Java" typeface="Javanese Text"/>
+        <a:font script="Lisu" typeface="Segoe UI"/>
+        <a:font script="Mymr" typeface="Myanmar Text"/>
+        <a:font script="Nkoo" typeface="Ebrima"/>
+        <a:font script="Olck" typeface="Nirmala UI"/>
+        <a:font script="Osma" typeface="Ebrima"/>
+        <a:font script="Phag" typeface="Phagspa"/>
+        <a:font script="Syrn" typeface="Estrangelo Edessa"/>
+        <a:font script="Syrj" typeface="Estrangelo Edessa"/>
+        <a:font script="Syre" typeface="Estrangelo Edessa"/>
+        <a:font script="Sora" typeface="Nirmala UI"/>
+        <a:font script="Tale" typeface="Microsoft Tai Le"/>
+        <a:font script="Talu" typeface="Microsoft New Tai Lue"/>
+        <a:font script="Tfng" typeface="Ebrima"/>
+      </a:minorFont>
+    </a:fontScheme>
+    <a:fmtScheme name="Office">
+      <a:fillStyleLst>
+        <a:solidFill>
+          <a:schemeClr val="phClr"/>
+        </a:solidFill>
+        <a:gradFill rotWithShape="1">
+          <a:gsLst>
+            <a:gs pos="0">
+              <a:schemeClr val="phClr">
+                <a:lumMod val="110000"/>
+                <a:satMod val="105000"/>
+                <a:tint val="67000"/>
+              </a:schemeClr>
+            </a:gs>
+            <a:gs pos="50000">
+              <a:schemeClr val="phClr">
+                <a:lumMod val="105000"/>
+                <a:satMod val="103000"/>
+                <a:tint val="73000"/>
+              </a:schemeClr>
+            </a:gs>
+            <a:gs pos="100000">
+              <a:schemeClr val="phClr">
+                <a:lumMod val="105000"/>
+                <a:satMod val="109000"/>
+                <a:tint val="81000"/>
+              </a:schemeClr>
+            </a:gs>
+          </a:gsLst>
+          <a:lin ang="5400000" scaled="0"/>
+        </a:gradFill>
+        <a:gradFill rotWithShape="1">
+          <a:gsLst>
+            <a:gs pos="0">
+              <a:schemeClr val="phClr">
+                <a:satMod val="103000"/>
+                <a:lumMod val="102000"/>
+                <a:tint val="94000"/>
+              </a:schemeClr>
+            </a:gs>
+            <a:gs pos="50000">
+              <a:schemeClr val="phClr">
+                <a:satMod val="110000"/>
+                <a:lumMod val="100000"/>
+                <a:shade val="100000"/>
+              </a:schemeClr>
+            </a:gs>
+            <a:gs pos="100000">
+              <a:schemeClr val="phClr">
+                <a:lumMod val="99000"/>
+                <a:satMod val="120000"/>
+                <a:shade val="78000"/>
+              </a:schemeClr>
+            </a:gs>
+          </a:gsLst>
+          <a:lin ang="5400000" scaled="0"/>
+        </a:gradFill>
+      </a:fillStyleLst>
+      <a:lnStyleLst>
+        <a:ln w="6350" cap="flat" cmpd="sng" algn="ctr">
+          <a:solidFill>
+            <a:schemeClr val="phClr"/>
+          </a:solidFill>
+          <a:prstDash val="solid"/>
+          <a:miter lim="800000"/>
+        </a:ln>
+        <a:ln w="12700" cap="flat" cmpd="sng" algn="ctr">
+          <a:solidFill>
+            <a:schemeClr val="phClr"/>
+          </a:solidFill>
+          <a:prstDash val="solid"/>
+          <a:miter lim="800000"/>
+        </a:ln>
+        <a:ln w="19050" cap="flat" cmpd="sng" algn="ctr">
+          <a:solidFill>
+            <a:schemeClr val="phClr"/>
+          </a:solidFill>
+          <a:prstDash val="solid"/>
+          <a:miter lim="800000"/>
+        </a:ln>
+      </a:lnStyleLst>
+      <a:effectStyleLst>
+        <a:effectStyle>
+          <a:effectLst/>
+        </a:effectStyle>
+        <a:effectStyle>
+          <a:effectLst/>
+        </a:effectStyle>
+        <a:effectStyle>
+          <a:effectLst>
+            <a:outerShdw blurRad="57150" dist="19050" dir="5400000" algn="ctr" rotWithShape="0">
+              <a:srgbClr val="000000">
+                <a:alpha val="63000"/>
+              </a:srgbClr>
+            </a:outerShdw>
+          </a:effectLst>
+        </a:effectStyle>
+      </a:effectStyleLst>
+      <a:bgFillStyleLst>
+        <a:solidFill>
+          <a:schemeClr val="phClr"/>
+        </a:solidFill>
+        <a:solidFill>
+          <a:schemeClr val="phClr">
+            <a:tint val="95000"/>
+            <a:satMod val="170000"/>
+          </a:schemeClr>
+        </a:solidFill>
+        <a:gradFill rotWithShape="1">
+          <a:gsLst>
+            <a:gs pos="0">
+              <a:schemeClr val="phClr">
+                <a:tint val="93000"/>
+                <a:satMod val="150000"/>
+                <a:shade val="98000"/>
+                <a:lumMod val="102000"/>
+              </a:schemeClr>
+            </a:gs>
+            <a:gs pos="50000">
+              <a:schemeClr val="phClr">
+                <a:tint val="98000"/>
+                <a:satMod val="130000"/>
+                <a:shade val="90000"/>
+                <a:lumMod val="103000"/>
+              </a:schemeClr>
+            </a:gs>
+            <a:gs pos="100000">
+              <a:schemeClr val="phClr">
+                <a:shade val="63000"/>
+                <a:satMod val="120000"/>
+              </a:schemeClr>
+            </a:gs>
+          </a:gsLst>
+          <a:lin ang="5400000" scaled="0"/>
+        </a:gradFill>
+      </a:bgFillStyleLst>
+    </a:fmtScheme>
+  </a:themeElements>
+  <a:objectDefaults/>
+  <a:extraClrSchemeLst/>
+  <a:extLst>
+    <a:ext uri="{05A4C25C-085E-4340-85A3-A5531E510DB2}">
+      <thm15:themeFamily xmlns:thm15="http://schemas.microsoft.com/office/thememl/2012/main" name="Office Theme" id="{62F939B6-93AF-4DB8-9C6B-D6C7DFDC589F}" vid="{4A3C46E8-61CC-4603-A589-7422A47A8E4A}"/>
+    </a:ext>
+  </a:extLst>
+</a:theme>
 </file>
</xml_diff>